<commit_message>
Add slides (first draft)
</commit_message>
<xml_diff>
--- a/Rendu/PresentationFinale/Binome13PresentationFinalePRT.pptx
+++ b/Rendu/PresentationFinale/Binome13PresentationFinalePRT.pptx
@@ -4,9 +4,22 @@
   <p:sldMasterIdLst>
     <p:sldMasterId id="2147483653" r:id="rId1"/>
   </p:sldMasterIdLst>
+  <p:notesMasterIdLst>
+    <p:notesMasterId r:id="rId14"/>
+  </p:notesMasterIdLst>
   <p:sldIdLst>
     <p:sldId id="256" r:id="rId2"/>
     <p:sldId id="257" r:id="rId3"/>
+    <p:sldId id="258" r:id="rId4"/>
+    <p:sldId id="259" r:id="rId5"/>
+    <p:sldId id="260" r:id="rId6"/>
+    <p:sldId id="261" r:id="rId7"/>
+    <p:sldId id="262" r:id="rId8"/>
+    <p:sldId id="263" r:id="rId9"/>
+    <p:sldId id="264" r:id="rId10"/>
+    <p:sldId id="265" r:id="rId11"/>
+    <p:sldId id="266" r:id="rId12"/>
+    <p:sldId id="267" r:id="rId13"/>
   </p:sldIdLst>
   <p:sldSz cx="9144000" cy="6858000" type="screen4x3"/>
   <p:notesSz cx="6858000" cy="9144000"/>
@@ -138,6 +151,1194 @@
 </p:presentation>
 </file>
 
+<file path=ppt/notesMasters/notesMaster1.xml><?xml version="1.0" encoding="utf-8"?>
+<p:notesMaster xmlns:a="http://schemas.openxmlformats.org/drawingml/2006/main" xmlns:r="http://schemas.openxmlformats.org/officeDocument/2006/relationships" xmlns:p="http://schemas.openxmlformats.org/presentationml/2006/main">
+  <p:cSld>
+    <p:bg>
+      <p:bgRef idx="1001">
+        <a:schemeClr val="bg1"/>
+      </p:bgRef>
+    </p:bg>
+    <p:spTree>
+      <p:nvGrpSpPr>
+        <p:cNvPr id="1" name=""/>
+        <p:cNvGrpSpPr/>
+        <p:nvPr/>
+      </p:nvGrpSpPr>
+      <p:grpSpPr>
+        <a:xfrm>
+          <a:off x="0" y="0"/>
+          <a:ext cx="0" cy="0"/>
+          <a:chOff x="0" y="0"/>
+          <a:chExt cx="0" cy="0"/>
+        </a:xfrm>
+      </p:grpSpPr>
+      <p:sp>
+        <p:nvSpPr>
+          <p:cNvPr id="2" name="Header Placeholder 1"/>
+          <p:cNvSpPr>
+            <a:spLocks noGrp="1"/>
+          </p:cNvSpPr>
+          <p:nvPr>
+            <p:ph type="hdr" sz="quarter"/>
+          </p:nvPr>
+        </p:nvSpPr>
+        <p:spPr>
+          <a:xfrm>
+            <a:off x="0" y="0"/>
+            <a:ext cx="2971800" cy="457200"/>
+          </a:xfrm>
+          <a:prstGeom prst="rect">
+            <a:avLst/>
+          </a:prstGeom>
+        </p:spPr>
+        <p:txBody>
+          <a:bodyPr vert="horz" lIns="91440" tIns="45720" rIns="91440" bIns="45720" rtlCol="0"/>
+          <a:lstStyle>
+            <a:lvl1pPr algn="l">
+              <a:defRPr sz="1200"/>
+            </a:lvl1pPr>
+          </a:lstStyle>
+          <a:p>
+            <a:endParaRPr lang="fr-FR"/>
+          </a:p>
+        </p:txBody>
+      </p:sp>
+      <p:sp>
+        <p:nvSpPr>
+          <p:cNvPr id="3" name="Date Placeholder 2"/>
+          <p:cNvSpPr>
+            <a:spLocks noGrp="1"/>
+          </p:cNvSpPr>
+          <p:nvPr>
+            <p:ph type="dt" idx="1"/>
+          </p:nvPr>
+        </p:nvSpPr>
+        <p:spPr>
+          <a:xfrm>
+            <a:off x="3884613" y="0"/>
+            <a:ext cx="2971800" cy="457200"/>
+          </a:xfrm>
+          <a:prstGeom prst="rect">
+            <a:avLst/>
+          </a:prstGeom>
+        </p:spPr>
+        <p:txBody>
+          <a:bodyPr vert="horz" lIns="91440" tIns="45720" rIns="91440" bIns="45720" rtlCol="0"/>
+          <a:lstStyle>
+            <a:lvl1pPr algn="r">
+              <a:defRPr sz="1200"/>
+            </a:lvl1pPr>
+          </a:lstStyle>
+          <a:p>
+            <a:fld id="{45ACAB89-1F3E-4162-94CA-EF529DBC97EB}" type="datetimeFigureOut">
+              <a:rPr lang="fr-FR" smtClean="0"/>
+              <a:t>07/06/2015</a:t>
+            </a:fld>
+            <a:endParaRPr lang="fr-FR"/>
+          </a:p>
+        </p:txBody>
+      </p:sp>
+      <p:sp>
+        <p:nvSpPr>
+          <p:cNvPr id="4" name="Slide Image Placeholder 3"/>
+          <p:cNvSpPr>
+            <a:spLocks noGrp="1" noRot="1" noChangeAspect="1"/>
+          </p:cNvSpPr>
+          <p:nvPr>
+            <p:ph type="sldImg" idx="2"/>
+          </p:nvPr>
+        </p:nvSpPr>
+        <p:spPr>
+          <a:xfrm>
+            <a:off x="1143000" y="685800"/>
+            <a:ext cx="4572000" cy="3429000"/>
+          </a:xfrm>
+          <a:prstGeom prst="rect">
+            <a:avLst/>
+          </a:prstGeom>
+          <a:noFill/>
+          <a:ln w="12700">
+            <a:solidFill>
+              <a:prstClr val="black"/>
+            </a:solidFill>
+          </a:ln>
+        </p:spPr>
+        <p:txBody>
+          <a:bodyPr vert="horz" lIns="91440" tIns="45720" rIns="91440" bIns="45720" rtlCol="0" anchor="ctr"/>
+          <a:lstStyle/>
+          <a:p>
+            <a:endParaRPr lang="fr-FR"/>
+          </a:p>
+        </p:txBody>
+      </p:sp>
+      <p:sp>
+        <p:nvSpPr>
+          <p:cNvPr id="5" name="Notes Placeholder 4"/>
+          <p:cNvSpPr>
+            <a:spLocks noGrp="1"/>
+          </p:cNvSpPr>
+          <p:nvPr>
+            <p:ph type="body" sz="quarter" idx="3"/>
+          </p:nvPr>
+        </p:nvSpPr>
+        <p:spPr>
+          <a:xfrm>
+            <a:off x="685800" y="4343400"/>
+            <a:ext cx="5486400" cy="4114800"/>
+          </a:xfrm>
+          <a:prstGeom prst="rect">
+            <a:avLst/>
+          </a:prstGeom>
+        </p:spPr>
+        <p:txBody>
+          <a:bodyPr vert="horz" lIns="91440" tIns="45720" rIns="91440" bIns="45720" rtlCol="0"/>
+          <a:lstStyle/>
+          <a:p>
+            <a:pPr lvl="0"/>
+            <a:r>
+              <a:rPr lang="en-US" smtClean="0"/>
+              <a:t>Click to edit Master text styles</a:t>
+            </a:r>
+          </a:p>
+          <a:p>
+            <a:pPr lvl="1"/>
+            <a:r>
+              <a:rPr lang="en-US" smtClean="0"/>
+              <a:t>Second level</a:t>
+            </a:r>
+          </a:p>
+          <a:p>
+            <a:pPr lvl="2"/>
+            <a:r>
+              <a:rPr lang="en-US" smtClean="0"/>
+              <a:t>Third level</a:t>
+            </a:r>
+          </a:p>
+          <a:p>
+            <a:pPr lvl="3"/>
+            <a:r>
+              <a:rPr lang="en-US" smtClean="0"/>
+              <a:t>Fourth level</a:t>
+            </a:r>
+          </a:p>
+          <a:p>
+            <a:pPr lvl="4"/>
+            <a:r>
+              <a:rPr lang="en-US" smtClean="0"/>
+              <a:t>Fifth level</a:t>
+            </a:r>
+            <a:endParaRPr lang="fr-FR"/>
+          </a:p>
+        </p:txBody>
+      </p:sp>
+      <p:sp>
+        <p:nvSpPr>
+          <p:cNvPr id="6" name="Footer Placeholder 5"/>
+          <p:cNvSpPr>
+            <a:spLocks noGrp="1"/>
+          </p:cNvSpPr>
+          <p:nvPr>
+            <p:ph type="ftr" sz="quarter" idx="4"/>
+          </p:nvPr>
+        </p:nvSpPr>
+        <p:spPr>
+          <a:xfrm>
+            <a:off x="0" y="8685213"/>
+            <a:ext cx="2971800" cy="457200"/>
+          </a:xfrm>
+          <a:prstGeom prst="rect">
+            <a:avLst/>
+          </a:prstGeom>
+        </p:spPr>
+        <p:txBody>
+          <a:bodyPr vert="horz" lIns="91440" tIns="45720" rIns="91440" bIns="45720" rtlCol="0" anchor="b"/>
+          <a:lstStyle>
+            <a:lvl1pPr algn="l">
+              <a:defRPr sz="1200"/>
+            </a:lvl1pPr>
+          </a:lstStyle>
+          <a:p>
+            <a:endParaRPr lang="fr-FR"/>
+          </a:p>
+        </p:txBody>
+      </p:sp>
+      <p:sp>
+        <p:nvSpPr>
+          <p:cNvPr id="7" name="Slide Number Placeholder 6"/>
+          <p:cNvSpPr>
+            <a:spLocks noGrp="1"/>
+          </p:cNvSpPr>
+          <p:nvPr>
+            <p:ph type="sldNum" sz="quarter" idx="5"/>
+          </p:nvPr>
+        </p:nvSpPr>
+        <p:spPr>
+          <a:xfrm>
+            <a:off x="3884613" y="8685213"/>
+            <a:ext cx="2971800" cy="457200"/>
+          </a:xfrm>
+          <a:prstGeom prst="rect">
+            <a:avLst/>
+          </a:prstGeom>
+        </p:spPr>
+        <p:txBody>
+          <a:bodyPr vert="horz" lIns="91440" tIns="45720" rIns="91440" bIns="45720" rtlCol="0" anchor="b"/>
+          <a:lstStyle>
+            <a:lvl1pPr algn="r">
+              <a:defRPr sz="1200"/>
+            </a:lvl1pPr>
+          </a:lstStyle>
+          <a:p>
+            <a:fld id="{CB2D9C16-2529-4A25-A30D-87EB28A90E76}" type="slidenum">
+              <a:rPr lang="fr-FR" smtClean="0"/>
+              <a:t>‹#›</a:t>
+            </a:fld>
+            <a:endParaRPr lang="fr-FR"/>
+          </a:p>
+        </p:txBody>
+      </p:sp>
+    </p:spTree>
+    <p:extLst>
+      <p:ext uri="{BB962C8B-B14F-4D97-AF65-F5344CB8AC3E}">
+        <p14:creationId xmlns:p14="http://schemas.microsoft.com/office/powerpoint/2010/main" val="1937178928"/>
+      </p:ext>
+    </p:extLst>
+  </p:cSld>
+  <p:clrMap bg1="lt1" tx1="dk1" bg2="lt2" tx2="dk2" accent1="accent1" accent2="accent2" accent3="accent3" accent4="accent4" accent5="accent5" accent6="accent6" hlink="hlink" folHlink="folHlink"/>
+  <p:notesStyle>
+    <a:lvl1pPr marL="0" algn="l" defTabSz="914400" rtl="0" eaLnBrk="1" latinLnBrk="0" hangingPunct="1">
+      <a:defRPr sz="1200" kern="1200">
+        <a:solidFill>
+          <a:schemeClr val="tx1"/>
+        </a:solidFill>
+        <a:latin typeface="+mn-lt"/>
+        <a:ea typeface="+mn-ea"/>
+        <a:cs typeface="+mn-cs"/>
+      </a:defRPr>
+    </a:lvl1pPr>
+    <a:lvl2pPr marL="457200" algn="l" defTabSz="914400" rtl="0" eaLnBrk="1" latinLnBrk="0" hangingPunct="1">
+      <a:defRPr sz="1200" kern="1200">
+        <a:solidFill>
+          <a:schemeClr val="tx1"/>
+        </a:solidFill>
+        <a:latin typeface="+mn-lt"/>
+        <a:ea typeface="+mn-ea"/>
+        <a:cs typeface="+mn-cs"/>
+      </a:defRPr>
+    </a:lvl2pPr>
+    <a:lvl3pPr marL="914400" algn="l" defTabSz="914400" rtl="0" eaLnBrk="1" latinLnBrk="0" hangingPunct="1">
+      <a:defRPr sz="1200" kern="1200">
+        <a:solidFill>
+          <a:schemeClr val="tx1"/>
+        </a:solidFill>
+        <a:latin typeface="+mn-lt"/>
+        <a:ea typeface="+mn-ea"/>
+        <a:cs typeface="+mn-cs"/>
+      </a:defRPr>
+    </a:lvl3pPr>
+    <a:lvl4pPr marL="1371600" algn="l" defTabSz="914400" rtl="0" eaLnBrk="1" latinLnBrk="0" hangingPunct="1">
+      <a:defRPr sz="1200" kern="1200">
+        <a:solidFill>
+          <a:schemeClr val="tx1"/>
+        </a:solidFill>
+        <a:latin typeface="+mn-lt"/>
+        <a:ea typeface="+mn-ea"/>
+        <a:cs typeface="+mn-cs"/>
+      </a:defRPr>
+    </a:lvl4pPr>
+    <a:lvl5pPr marL="1828800" algn="l" defTabSz="914400" rtl="0" eaLnBrk="1" latinLnBrk="0" hangingPunct="1">
+      <a:defRPr sz="1200" kern="1200">
+        <a:solidFill>
+          <a:schemeClr val="tx1"/>
+        </a:solidFill>
+        <a:latin typeface="+mn-lt"/>
+        <a:ea typeface="+mn-ea"/>
+        <a:cs typeface="+mn-cs"/>
+      </a:defRPr>
+    </a:lvl5pPr>
+    <a:lvl6pPr marL="2286000" algn="l" defTabSz="914400" rtl="0" eaLnBrk="1" latinLnBrk="0" hangingPunct="1">
+      <a:defRPr sz="1200" kern="1200">
+        <a:solidFill>
+          <a:schemeClr val="tx1"/>
+        </a:solidFill>
+        <a:latin typeface="+mn-lt"/>
+        <a:ea typeface="+mn-ea"/>
+        <a:cs typeface="+mn-cs"/>
+      </a:defRPr>
+    </a:lvl6pPr>
+    <a:lvl7pPr marL="2743200" algn="l" defTabSz="914400" rtl="0" eaLnBrk="1" latinLnBrk="0" hangingPunct="1">
+      <a:defRPr sz="1200" kern="1200">
+        <a:solidFill>
+          <a:schemeClr val="tx1"/>
+        </a:solidFill>
+        <a:latin typeface="+mn-lt"/>
+        <a:ea typeface="+mn-ea"/>
+        <a:cs typeface="+mn-cs"/>
+      </a:defRPr>
+    </a:lvl7pPr>
+    <a:lvl8pPr marL="3200400" algn="l" defTabSz="914400" rtl="0" eaLnBrk="1" latinLnBrk="0" hangingPunct="1">
+      <a:defRPr sz="1200" kern="1200">
+        <a:solidFill>
+          <a:schemeClr val="tx1"/>
+        </a:solidFill>
+        <a:latin typeface="+mn-lt"/>
+        <a:ea typeface="+mn-ea"/>
+        <a:cs typeface="+mn-cs"/>
+      </a:defRPr>
+    </a:lvl8pPr>
+    <a:lvl9pPr marL="3657600" algn="l" defTabSz="914400" rtl="0" eaLnBrk="1" latinLnBrk="0" hangingPunct="1">
+      <a:defRPr sz="1200" kern="1200">
+        <a:solidFill>
+          <a:schemeClr val="tx1"/>
+        </a:solidFill>
+        <a:latin typeface="+mn-lt"/>
+        <a:ea typeface="+mn-ea"/>
+        <a:cs typeface="+mn-cs"/>
+      </a:defRPr>
+    </a:lvl9pPr>
+  </p:notesStyle>
+</p:notesMaster>
+</file>
+
+<file path=ppt/notesSlides/notesSlide1.xml><?xml version="1.0" encoding="utf-8"?>
+<p:notes xmlns:a="http://schemas.openxmlformats.org/drawingml/2006/main" xmlns:r="http://schemas.openxmlformats.org/officeDocument/2006/relationships" xmlns:p="http://schemas.openxmlformats.org/presentationml/2006/main">
+  <p:cSld>
+    <p:spTree>
+      <p:nvGrpSpPr>
+        <p:cNvPr id="1" name=""/>
+        <p:cNvGrpSpPr/>
+        <p:nvPr/>
+      </p:nvGrpSpPr>
+      <p:grpSpPr>
+        <a:xfrm>
+          <a:off x="0" y="0"/>
+          <a:ext cx="0" cy="0"/>
+          <a:chOff x="0" y="0"/>
+          <a:chExt cx="0" cy="0"/>
+        </a:xfrm>
+      </p:grpSpPr>
+      <p:sp>
+        <p:nvSpPr>
+          <p:cNvPr id="2" name="Slide Image Placeholder 1"/>
+          <p:cNvSpPr>
+            <a:spLocks noGrp="1" noRot="1" noChangeAspect="1"/>
+          </p:cNvSpPr>
+          <p:nvPr>
+            <p:ph type="sldImg"/>
+          </p:nvPr>
+        </p:nvSpPr>
+        <p:spPr/>
+      </p:sp>
+      <p:sp>
+        <p:nvSpPr>
+          <p:cNvPr id="3" name="Notes Placeholder 2"/>
+          <p:cNvSpPr>
+            <a:spLocks noGrp="1"/>
+          </p:cNvSpPr>
+          <p:nvPr>
+            <p:ph type="body" idx="1"/>
+          </p:nvPr>
+        </p:nvSpPr>
+        <p:spPr/>
+        <p:txBody>
+          <a:bodyPr/>
+          <a:lstStyle/>
+          <a:p>
+            <a:r>
+              <a:rPr lang="fr-FR" dirty="0" smtClean="0"/>
+              <a:t>Réalisabilité</a:t>
+            </a:r>
+            <a:r>
+              <a:rPr lang="fr-FR" baseline="0" dirty="0" smtClean="0"/>
+              <a:t> </a:t>
+            </a:r>
+            <a:r>
+              <a:rPr lang="fr-FR" dirty="0" smtClean="0"/>
+              <a:t>Hard et Soft</a:t>
+            </a:r>
+            <a:endParaRPr lang="fr-FR" dirty="0"/>
+          </a:p>
+        </p:txBody>
+      </p:sp>
+      <p:sp>
+        <p:nvSpPr>
+          <p:cNvPr id="4" name="Slide Number Placeholder 3"/>
+          <p:cNvSpPr>
+            <a:spLocks noGrp="1"/>
+          </p:cNvSpPr>
+          <p:nvPr>
+            <p:ph type="sldNum" sz="quarter" idx="10"/>
+          </p:nvPr>
+        </p:nvSpPr>
+        <p:spPr/>
+        <p:txBody>
+          <a:bodyPr/>
+          <a:lstStyle/>
+          <a:p>
+            <a:fld id="{CB2D9C16-2529-4A25-A30D-87EB28A90E76}" type="slidenum">
+              <a:rPr lang="fr-FR" smtClean="0"/>
+              <a:t>4</a:t>
+            </a:fld>
+            <a:endParaRPr lang="fr-FR" dirty="0"/>
+          </a:p>
+        </p:txBody>
+      </p:sp>
+    </p:spTree>
+    <p:extLst>
+      <p:ext uri="{BB962C8B-B14F-4D97-AF65-F5344CB8AC3E}">
+        <p14:creationId xmlns:p14="http://schemas.microsoft.com/office/powerpoint/2010/main" val="873504980"/>
+      </p:ext>
+    </p:extLst>
+  </p:cSld>
+  <p:clrMapOvr>
+    <a:masterClrMapping/>
+  </p:clrMapOvr>
+</p:notes>
+</file>
+
+<file path=ppt/notesSlides/notesSlide2.xml><?xml version="1.0" encoding="utf-8"?>
+<p:notes xmlns:a="http://schemas.openxmlformats.org/drawingml/2006/main" xmlns:r="http://schemas.openxmlformats.org/officeDocument/2006/relationships" xmlns:p="http://schemas.openxmlformats.org/presentationml/2006/main">
+  <p:cSld>
+    <p:spTree>
+      <p:nvGrpSpPr>
+        <p:cNvPr id="1" name=""/>
+        <p:cNvGrpSpPr/>
+        <p:nvPr/>
+      </p:nvGrpSpPr>
+      <p:grpSpPr>
+        <a:xfrm>
+          <a:off x="0" y="0"/>
+          <a:ext cx="0" cy="0"/>
+          <a:chOff x="0" y="0"/>
+          <a:chExt cx="0" cy="0"/>
+        </a:xfrm>
+      </p:grpSpPr>
+      <p:sp>
+        <p:nvSpPr>
+          <p:cNvPr id="2" name="Slide Image Placeholder 1"/>
+          <p:cNvSpPr>
+            <a:spLocks noGrp="1" noRot="1" noChangeAspect="1"/>
+          </p:cNvSpPr>
+          <p:nvPr>
+            <p:ph type="sldImg"/>
+          </p:nvPr>
+        </p:nvSpPr>
+        <p:spPr/>
+      </p:sp>
+      <p:sp>
+        <p:nvSpPr>
+          <p:cNvPr id="3" name="Notes Placeholder 2"/>
+          <p:cNvSpPr>
+            <a:spLocks noGrp="1"/>
+          </p:cNvSpPr>
+          <p:nvPr>
+            <p:ph type="body" idx="1"/>
+          </p:nvPr>
+        </p:nvSpPr>
+        <p:spPr/>
+        <p:txBody>
+          <a:bodyPr/>
+          <a:lstStyle/>
+          <a:p>
+            <a:endParaRPr lang="fr-FR" dirty="0"/>
+          </a:p>
+        </p:txBody>
+      </p:sp>
+      <p:sp>
+        <p:nvSpPr>
+          <p:cNvPr id="4" name="Slide Number Placeholder 3"/>
+          <p:cNvSpPr>
+            <a:spLocks noGrp="1"/>
+          </p:cNvSpPr>
+          <p:nvPr>
+            <p:ph type="sldNum" sz="quarter" idx="10"/>
+          </p:nvPr>
+        </p:nvSpPr>
+        <p:spPr/>
+        <p:txBody>
+          <a:bodyPr/>
+          <a:lstStyle/>
+          <a:p>
+            <a:fld id="{CB2D9C16-2529-4A25-A30D-87EB28A90E76}" type="slidenum">
+              <a:rPr lang="fr-FR" smtClean="0"/>
+              <a:t>5</a:t>
+            </a:fld>
+            <a:endParaRPr lang="fr-FR"/>
+          </a:p>
+        </p:txBody>
+      </p:sp>
+    </p:spTree>
+    <p:extLst>
+      <p:ext uri="{BB962C8B-B14F-4D97-AF65-F5344CB8AC3E}">
+        <p14:creationId xmlns:p14="http://schemas.microsoft.com/office/powerpoint/2010/main" val="2906603285"/>
+      </p:ext>
+    </p:extLst>
+  </p:cSld>
+  <p:clrMapOvr>
+    <a:masterClrMapping/>
+  </p:clrMapOvr>
+</p:notes>
+</file>
+
+<file path=ppt/notesSlides/notesSlide3.xml><?xml version="1.0" encoding="utf-8"?>
+<p:notes xmlns:a="http://schemas.openxmlformats.org/drawingml/2006/main" xmlns:r="http://schemas.openxmlformats.org/officeDocument/2006/relationships" xmlns:p="http://schemas.openxmlformats.org/presentationml/2006/main">
+  <p:cSld>
+    <p:spTree>
+      <p:nvGrpSpPr>
+        <p:cNvPr id="1" name=""/>
+        <p:cNvGrpSpPr/>
+        <p:nvPr/>
+      </p:nvGrpSpPr>
+      <p:grpSpPr>
+        <a:xfrm>
+          <a:off x="0" y="0"/>
+          <a:ext cx="0" cy="0"/>
+          <a:chOff x="0" y="0"/>
+          <a:chExt cx="0" cy="0"/>
+        </a:xfrm>
+      </p:grpSpPr>
+      <p:sp>
+        <p:nvSpPr>
+          <p:cNvPr id="2" name="Slide Image Placeholder 1"/>
+          <p:cNvSpPr>
+            <a:spLocks noGrp="1" noRot="1" noChangeAspect="1"/>
+          </p:cNvSpPr>
+          <p:nvPr>
+            <p:ph type="sldImg"/>
+          </p:nvPr>
+        </p:nvSpPr>
+        <p:spPr/>
+      </p:sp>
+      <p:sp>
+        <p:nvSpPr>
+          <p:cNvPr id="3" name="Notes Placeholder 2"/>
+          <p:cNvSpPr>
+            <a:spLocks noGrp="1"/>
+          </p:cNvSpPr>
+          <p:nvPr>
+            <p:ph type="body" idx="1"/>
+          </p:nvPr>
+        </p:nvSpPr>
+        <p:spPr/>
+        <p:txBody>
+          <a:bodyPr/>
+          <a:lstStyle/>
+          <a:p>
+            <a:pPr marL="0" marR="0" indent="0" algn="l" defTabSz="914400" rtl="0" eaLnBrk="1" fontAlgn="auto" latinLnBrk="0" hangingPunct="1">
+              <a:lnSpc>
+                <a:spcPct val="100000"/>
+              </a:lnSpc>
+              <a:spcBef>
+                <a:spcPts val="0"/>
+              </a:spcBef>
+              <a:spcAft>
+                <a:spcPts val="0"/>
+              </a:spcAft>
+              <a:buClrTx/>
+              <a:buSzTx/>
+              <a:buFontTx/>
+              <a:buNone/>
+              <a:tabLst/>
+              <a:defRPr/>
+            </a:pPr>
+            <a:r>
+              <a:rPr lang="fr-FR" dirty="0" smtClean="0"/>
+              <a:t>Réalisabilité Hard et disponibilité driver</a:t>
+            </a:r>
+            <a:r>
+              <a:rPr lang="fr-FR" baseline="0" dirty="0" smtClean="0"/>
+              <a:t> Soft</a:t>
+            </a:r>
+            <a:endParaRPr lang="fr-FR" dirty="0" smtClean="0"/>
+          </a:p>
+          <a:p>
+            <a:endParaRPr lang="fr-FR" dirty="0"/>
+          </a:p>
+        </p:txBody>
+      </p:sp>
+      <p:sp>
+        <p:nvSpPr>
+          <p:cNvPr id="4" name="Slide Number Placeholder 3"/>
+          <p:cNvSpPr>
+            <a:spLocks noGrp="1"/>
+          </p:cNvSpPr>
+          <p:nvPr>
+            <p:ph type="sldNum" sz="quarter" idx="10"/>
+          </p:nvPr>
+        </p:nvSpPr>
+        <p:spPr/>
+        <p:txBody>
+          <a:bodyPr/>
+          <a:lstStyle/>
+          <a:p>
+            <a:fld id="{CB2D9C16-2529-4A25-A30D-87EB28A90E76}" type="slidenum">
+              <a:rPr lang="fr-FR" smtClean="0"/>
+              <a:t>6</a:t>
+            </a:fld>
+            <a:endParaRPr lang="fr-FR"/>
+          </a:p>
+        </p:txBody>
+      </p:sp>
+    </p:spTree>
+    <p:extLst>
+      <p:ext uri="{BB962C8B-B14F-4D97-AF65-F5344CB8AC3E}">
+        <p14:creationId xmlns:p14="http://schemas.microsoft.com/office/powerpoint/2010/main" val="2591285659"/>
+      </p:ext>
+    </p:extLst>
+  </p:cSld>
+  <p:clrMapOvr>
+    <a:masterClrMapping/>
+  </p:clrMapOvr>
+</p:notes>
+</file>
+
+<file path=ppt/notesSlides/notesSlide4.xml><?xml version="1.0" encoding="utf-8"?>
+<p:notes xmlns:a="http://schemas.openxmlformats.org/drawingml/2006/main" xmlns:r="http://schemas.openxmlformats.org/officeDocument/2006/relationships" xmlns:p="http://schemas.openxmlformats.org/presentationml/2006/main">
+  <p:cSld>
+    <p:spTree>
+      <p:nvGrpSpPr>
+        <p:cNvPr id="1" name=""/>
+        <p:cNvGrpSpPr/>
+        <p:nvPr/>
+      </p:nvGrpSpPr>
+      <p:grpSpPr>
+        <a:xfrm>
+          <a:off x="0" y="0"/>
+          <a:ext cx="0" cy="0"/>
+          <a:chOff x="0" y="0"/>
+          <a:chExt cx="0" cy="0"/>
+        </a:xfrm>
+      </p:grpSpPr>
+      <p:sp>
+        <p:nvSpPr>
+          <p:cNvPr id="2" name="Slide Image Placeholder 1"/>
+          <p:cNvSpPr>
+            <a:spLocks noGrp="1" noRot="1" noChangeAspect="1"/>
+          </p:cNvSpPr>
+          <p:nvPr>
+            <p:ph type="sldImg"/>
+          </p:nvPr>
+        </p:nvSpPr>
+        <p:spPr/>
+      </p:sp>
+      <p:sp>
+        <p:nvSpPr>
+          <p:cNvPr id="3" name="Notes Placeholder 2"/>
+          <p:cNvSpPr>
+            <a:spLocks noGrp="1"/>
+          </p:cNvSpPr>
+          <p:nvPr>
+            <p:ph type="body" idx="1"/>
+          </p:nvPr>
+        </p:nvSpPr>
+        <p:spPr/>
+        <p:txBody>
+          <a:bodyPr/>
+          <a:lstStyle/>
+          <a:p>
+            <a:r>
+              <a:rPr lang="fr-FR" dirty="0" smtClean="0"/>
+              <a:t>RD/BY et RGB</a:t>
+            </a:r>
+          </a:p>
+          <a:p>
+            <a:r>
+              <a:rPr lang="fr-FR" dirty="0" smtClean="0"/>
+              <a:t>Changement des composants et revalidation (mémoire</a:t>
+            </a:r>
+            <a:r>
+              <a:rPr lang="fr-FR" baseline="0" dirty="0" smtClean="0"/>
+              <a:t>s)</a:t>
+            </a:r>
+            <a:endParaRPr lang="fr-FR" dirty="0"/>
+          </a:p>
+        </p:txBody>
+      </p:sp>
+      <p:sp>
+        <p:nvSpPr>
+          <p:cNvPr id="4" name="Slide Number Placeholder 3"/>
+          <p:cNvSpPr>
+            <a:spLocks noGrp="1"/>
+          </p:cNvSpPr>
+          <p:nvPr>
+            <p:ph type="sldNum" sz="quarter" idx="10"/>
+          </p:nvPr>
+        </p:nvSpPr>
+        <p:spPr/>
+        <p:txBody>
+          <a:bodyPr/>
+          <a:lstStyle/>
+          <a:p>
+            <a:fld id="{CB2D9C16-2529-4A25-A30D-87EB28A90E76}" type="slidenum">
+              <a:rPr lang="fr-FR" smtClean="0"/>
+              <a:t>7</a:t>
+            </a:fld>
+            <a:endParaRPr lang="fr-FR"/>
+          </a:p>
+        </p:txBody>
+      </p:sp>
+    </p:spTree>
+    <p:extLst>
+      <p:ext uri="{BB962C8B-B14F-4D97-AF65-F5344CB8AC3E}">
+        <p14:creationId xmlns:p14="http://schemas.microsoft.com/office/powerpoint/2010/main" val="113897337"/>
+      </p:ext>
+    </p:extLst>
+  </p:cSld>
+  <p:clrMapOvr>
+    <a:masterClrMapping/>
+  </p:clrMapOvr>
+</p:notes>
+</file>
+
+<file path=ppt/notesSlides/notesSlide5.xml><?xml version="1.0" encoding="utf-8"?>
+<p:notes xmlns:a="http://schemas.openxmlformats.org/drawingml/2006/main" xmlns:r="http://schemas.openxmlformats.org/officeDocument/2006/relationships" xmlns:p="http://schemas.openxmlformats.org/presentationml/2006/main">
+  <p:cSld>
+    <p:spTree>
+      <p:nvGrpSpPr>
+        <p:cNvPr id="1" name=""/>
+        <p:cNvGrpSpPr/>
+        <p:nvPr/>
+      </p:nvGrpSpPr>
+      <p:grpSpPr>
+        <a:xfrm>
+          <a:off x="0" y="0"/>
+          <a:ext cx="0" cy="0"/>
+          <a:chOff x="0" y="0"/>
+          <a:chExt cx="0" cy="0"/>
+        </a:xfrm>
+      </p:grpSpPr>
+      <p:sp>
+        <p:nvSpPr>
+          <p:cNvPr id="2" name="Slide Image Placeholder 1"/>
+          <p:cNvSpPr>
+            <a:spLocks noGrp="1" noRot="1" noChangeAspect="1"/>
+          </p:cNvSpPr>
+          <p:nvPr>
+            <p:ph type="sldImg"/>
+          </p:nvPr>
+        </p:nvSpPr>
+        <p:spPr/>
+      </p:sp>
+      <p:sp>
+        <p:nvSpPr>
+          <p:cNvPr id="3" name="Notes Placeholder 2"/>
+          <p:cNvSpPr>
+            <a:spLocks noGrp="1"/>
+          </p:cNvSpPr>
+          <p:nvPr>
+            <p:ph type="body" idx="1"/>
+          </p:nvPr>
+        </p:nvSpPr>
+        <p:spPr/>
+        <p:txBody>
+          <a:bodyPr/>
+          <a:lstStyle/>
+          <a:p>
+            <a:endParaRPr lang="fr-FR" dirty="0"/>
+          </a:p>
+        </p:txBody>
+      </p:sp>
+      <p:sp>
+        <p:nvSpPr>
+          <p:cNvPr id="4" name="Slide Number Placeholder 3"/>
+          <p:cNvSpPr>
+            <a:spLocks noGrp="1"/>
+          </p:cNvSpPr>
+          <p:nvPr>
+            <p:ph type="sldNum" sz="quarter" idx="10"/>
+          </p:nvPr>
+        </p:nvSpPr>
+        <p:spPr/>
+        <p:txBody>
+          <a:bodyPr/>
+          <a:lstStyle/>
+          <a:p>
+            <a:fld id="{CB2D9C16-2529-4A25-A30D-87EB28A90E76}" type="slidenum">
+              <a:rPr lang="fr-FR" smtClean="0"/>
+              <a:t>8</a:t>
+            </a:fld>
+            <a:endParaRPr lang="fr-FR"/>
+          </a:p>
+        </p:txBody>
+      </p:sp>
+    </p:spTree>
+    <p:extLst>
+      <p:ext uri="{BB962C8B-B14F-4D97-AF65-F5344CB8AC3E}">
+        <p14:creationId xmlns:p14="http://schemas.microsoft.com/office/powerpoint/2010/main" val="113897337"/>
+      </p:ext>
+    </p:extLst>
+  </p:cSld>
+  <p:clrMapOvr>
+    <a:masterClrMapping/>
+  </p:clrMapOvr>
+</p:notes>
+</file>
+
+<file path=ppt/notesSlides/notesSlide6.xml><?xml version="1.0" encoding="utf-8"?>
+<p:notes xmlns:a="http://schemas.openxmlformats.org/drawingml/2006/main" xmlns:r="http://schemas.openxmlformats.org/officeDocument/2006/relationships" xmlns:p="http://schemas.openxmlformats.org/presentationml/2006/main">
+  <p:cSld>
+    <p:spTree>
+      <p:nvGrpSpPr>
+        <p:cNvPr id="1" name=""/>
+        <p:cNvGrpSpPr/>
+        <p:nvPr/>
+      </p:nvGrpSpPr>
+      <p:grpSpPr>
+        <a:xfrm>
+          <a:off x="0" y="0"/>
+          <a:ext cx="0" cy="0"/>
+          <a:chOff x="0" y="0"/>
+          <a:chExt cx="0" cy="0"/>
+        </a:xfrm>
+      </p:grpSpPr>
+      <p:sp>
+        <p:nvSpPr>
+          <p:cNvPr id="2" name="Slide Image Placeholder 1"/>
+          <p:cNvSpPr>
+            <a:spLocks noGrp="1" noRot="1" noChangeAspect="1"/>
+          </p:cNvSpPr>
+          <p:nvPr>
+            <p:ph type="sldImg"/>
+          </p:nvPr>
+        </p:nvSpPr>
+        <p:spPr/>
+      </p:sp>
+      <p:sp>
+        <p:nvSpPr>
+          <p:cNvPr id="3" name="Notes Placeholder 2"/>
+          <p:cNvSpPr>
+            <a:spLocks noGrp="1"/>
+          </p:cNvSpPr>
+          <p:nvPr>
+            <p:ph type="body" idx="1"/>
+          </p:nvPr>
+        </p:nvSpPr>
+        <p:spPr/>
+        <p:txBody>
+          <a:bodyPr/>
+          <a:lstStyle/>
+          <a:p>
+            <a:endParaRPr lang="fr-FR" dirty="0"/>
+          </a:p>
+        </p:txBody>
+      </p:sp>
+      <p:sp>
+        <p:nvSpPr>
+          <p:cNvPr id="4" name="Slide Number Placeholder 3"/>
+          <p:cNvSpPr>
+            <a:spLocks noGrp="1"/>
+          </p:cNvSpPr>
+          <p:nvPr>
+            <p:ph type="sldNum" sz="quarter" idx="10"/>
+          </p:nvPr>
+        </p:nvSpPr>
+        <p:spPr/>
+        <p:txBody>
+          <a:bodyPr/>
+          <a:lstStyle/>
+          <a:p>
+            <a:fld id="{CB2D9C16-2529-4A25-A30D-87EB28A90E76}" type="slidenum">
+              <a:rPr lang="fr-FR" smtClean="0"/>
+              <a:t>9</a:t>
+            </a:fld>
+            <a:endParaRPr lang="fr-FR"/>
+          </a:p>
+        </p:txBody>
+      </p:sp>
+    </p:spTree>
+    <p:extLst>
+      <p:ext uri="{BB962C8B-B14F-4D97-AF65-F5344CB8AC3E}">
+        <p14:creationId xmlns:p14="http://schemas.microsoft.com/office/powerpoint/2010/main" val="113897337"/>
+      </p:ext>
+    </p:extLst>
+  </p:cSld>
+  <p:clrMapOvr>
+    <a:masterClrMapping/>
+  </p:clrMapOvr>
+</p:notes>
+</file>
+
+<file path=ppt/notesSlides/notesSlide7.xml><?xml version="1.0" encoding="utf-8"?>
+<p:notes xmlns:a="http://schemas.openxmlformats.org/drawingml/2006/main" xmlns:r="http://schemas.openxmlformats.org/officeDocument/2006/relationships" xmlns:p="http://schemas.openxmlformats.org/presentationml/2006/main">
+  <p:cSld>
+    <p:spTree>
+      <p:nvGrpSpPr>
+        <p:cNvPr id="1" name=""/>
+        <p:cNvGrpSpPr/>
+        <p:nvPr/>
+      </p:nvGrpSpPr>
+      <p:grpSpPr>
+        <a:xfrm>
+          <a:off x="0" y="0"/>
+          <a:ext cx="0" cy="0"/>
+          <a:chOff x="0" y="0"/>
+          <a:chExt cx="0" cy="0"/>
+        </a:xfrm>
+      </p:grpSpPr>
+      <p:sp>
+        <p:nvSpPr>
+          <p:cNvPr id="2" name="Slide Image Placeholder 1"/>
+          <p:cNvSpPr>
+            <a:spLocks noGrp="1" noRot="1" noChangeAspect="1"/>
+          </p:cNvSpPr>
+          <p:nvPr>
+            <p:ph type="sldImg"/>
+          </p:nvPr>
+        </p:nvSpPr>
+        <p:spPr/>
+      </p:sp>
+      <p:sp>
+        <p:nvSpPr>
+          <p:cNvPr id="3" name="Notes Placeholder 2"/>
+          <p:cNvSpPr>
+            <a:spLocks noGrp="1"/>
+          </p:cNvSpPr>
+          <p:nvPr>
+            <p:ph type="body" idx="1"/>
+          </p:nvPr>
+        </p:nvSpPr>
+        <p:spPr/>
+        <p:txBody>
+          <a:bodyPr/>
+          <a:lstStyle/>
+          <a:p>
+            <a:r>
+              <a:rPr lang="fr-FR" dirty="0" smtClean="0"/>
+              <a:t>On a passé beaucoup de temps en formation</a:t>
+            </a:r>
+            <a:r>
+              <a:rPr lang="fr-FR" baseline="0" dirty="0" smtClean="0"/>
+              <a:t> et étude préliminaires de faisabilité (FMC entre autre)</a:t>
+            </a:r>
+            <a:endParaRPr lang="fr-FR" dirty="0"/>
+          </a:p>
+        </p:txBody>
+      </p:sp>
+      <p:sp>
+        <p:nvSpPr>
+          <p:cNvPr id="4" name="Slide Number Placeholder 3"/>
+          <p:cNvSpPr>
+            <a:spLocks noGrp="1"/>
+          </p:cNvSpPr>
+          <p:nvPr>
+            <p:ph type="sldNum" sz="quarter" idx="10"/>
+          </p:nvPr>
+        </p:nvSpPr>
+        <p:spPr/>
+        <p:txBody>
+          <a:bodyPr/>
+          <a:lstStyle/>
+          <a:p>
+            <a:fld id="{CB2D9C16-2529-4A25-A30D-87EB28A90E76}" type="slidenum">
+              <a:rPr lang="fr-FR" smtClean="0"/>
+              <a:t>10</a:t>
+            </a:fld>
+            <a:endParaRPr lang="fr-FR"/>
+          </a:p>
+        </p:txBody>
+      </p:sp>
+    </p:spTree>
+    <p:extLst>
+      <p:ext uri="{BB962C8B-B14F-4D97-AF65-F5344CB8AC3E}">
+        <p14:creationId xmlns:p14="http://schemas.microsoft.com/office/powerpoint/2010/main" val="113897337"/>
+      </p:ext>
+    </p:extLst>
+  </p:cSld>
+  <p:clrMapOvr>
+    <a:masterClrMapping/>
+  </p:clrMapOvr>
+</p:notes>
+</file>
+
+<file path=ppt/notesSlides/notesSlide8.xml><?xml version="1.0" encoding="utf-8"?>
+<p:notes xmlns:a="http://schemas.openxmlformats.org/drawingml/2006/main" xmlns:r="http://schemas.openxmlformats.org/officeDocument/2006/relationships" xmlns:p="http://schemas.openxmlformats.org/presentationml/2006/main">
+  <p:cSld>
+    <p:spTree>
+      <p:nvGrpSpPr>
+        <p:cNvPr id="1" name=""/>
+        <p:cNvGrpSpPr/>
+        <p:nvPr/>
+      </p:nvGrpSpPr>
+      <p:grpSpPr>
+        <a:xfrm>
+          <a:off x="0" y="0"/>
+          <a:ext cx="0" cy="0"/>
+          <a:chOff x="0" y="0"/>
+          <a:chExt cx="0" cy="0"/>
+        </a:xfrm>
+      </p:grpSpPr>
+      <p:sp>
+        <p:nvSpPr>
+          <p:cNvPr id="2" name="Slide Image Placeholder 1"/>
+          <p:cNvSpPr>
+            <a:spLocks noGrp="1" noRot="1" noChangeAspect="1"/>
+          </p:cNvSpPr>
+          <p:nvPr>
+            <p:ph type="sldImg"/>
+          </p:nvPr>
+        </p:nvSpPr>
+        <p:spPr/>
+      </p:sp>
+      <p:sp>
+        <p:nvSpPr>
+          <p:cNvPr id="3" name="Notes Placeholder 2"/>
+          <p:cNvSpPr>
+            <a:spLocks noGrp="1"/>
+          </p:cNvSpPr>
+          <p:nvPr>
+            <p:ph type="body" idx="1"/>
+          </p:nvPr>
+        </p:nvSpPr>
+        <p:spPr/>
+        <p:txBody>
+          <a:bodyPr/>
+          <a:lstStyle/>
+          <a:p>
+            <a:r>
+              <a:rPr lang="fr-FR" dirty="0" smtClean="0"/>
+              <a:t>On a passé beaucoup de temps en formation</a:t>
+            </a:r>
+            <a:r>
+              <a:rPr lang="fr-FR" baseline="0" dirty="0" smtClean="0"/>
+              <a:t> et étude préliminaires </a:t>
+            </a:r>
+            <a:r>
+              <a:rPr lang="fr-FR" baseline="0" smtClean="0"/>
+              <a:t>de faisabilité (FMC entre autre)</a:t>
+            </a:r>
+            <a:endParaRPr lang="fr-FR" dirty="0"/>
+          </a:p>
+        </p:txBody>
+      </p:sp>
+      <p:sp>
+        <p:nvSpPr>
+          <p:cNvPr id="4" name="Slide Number Placeholder 3"/>
+          <p:cNvSpPr>
+            <a:spLocks noGrp="1"/>
+          </p:cNvSpPr>
+          <p:nvPr>
+            <p:ph type="sldNum" sz="quarter" idx="10"/>
+          </p:nvPr>
+        </p:nvSpPr>
+        <p:spPr/>
+        <p:txBody>
+          <a:bodyPr/>
+          <a:lstStyle/>
+          <a:p>
+            <a:fld id="{CB2D9C16-2529-4A25-A30D-87EB28A90E76}" type="slidenum">
+              <a:rPr lang="fr-FR" smtClean="0"/>
+              <a:t>11</a:t>
+            </a:fld>
+            <a:endParaRPr lang="fr-FR"/>
+          </a:p>
+        </p:txBody>
+      </p:sp>
+    </p:spTree>
+    <p:extLst>
+      <p:ext uri="{BB962C8B-B14F-4D97-AF65-F5344CB8AC3E}">
+        <p14:creationId xmlns:p14="http://schemas.microsoft.com/office/powerpoint/2010/main" val="113897337"/>
+      </p:ext>
+    </p:extLst>
+  </p:cSld>
+  <p:clrMapOvr>
+    <a:masterClrMapping/>
+  </p:clrMapOvr>
+</p:notes>
+</file>
+
+<file path=ppt/notesSlides/notesSlide9.xml><?xml version="1.0" encoding="utf-8"?>
+<p:notes xmlns:a="http://schemas.openxmlformats.org/drawingml/2006/main" xmlns:r="http://schemas.openxmlformats.org/officeDocument/2006/relationships" xmlns:p="http://schemas.openxmlformats.org/presentationml/2006/main">
+  <p:cSld>
+    <p:spTree>
+      <p:nvGrpSpPr>
+        <p:cNvPr id="1" name=""/>
+        <p:cNvGrpSpPr/>
+        <p:nvPr/>
+      </p:nvGrpSpPr>
+      <p:grpSpPr>
+        <a:xfrm>
+          <a:off x="0" y="0"/>
+          <a:ext cx="0" cy="0"/>
+          <a:chOff x="0" y="0"/>
+          <a:chExt cx="0" cy="0"/>
+        </a:xfrm>
+      </p:grpSpPr>
+      <p:sp>
+        <p:nvSpPr>
+          <p:cNvPr id="2" name="Slide Image Placeholder 1"/>
+          <p:cNvSpPr>
+            <a:spLocks noGrp="1" noRot="1" noChangeAspect="1"/>
+          </p:cNvSpPr>
+          <p:nvPr>
+            <p:ph type="sldImg"/>
+          </p:nvPr>
+        </p:nvSpPr>
+        <p:spPr/>
+      </p:sp>
+      <p:sp>
+        <p:nvSpPr>
+          <p:cNvPr id="3" name="Notes Placeholder 2"/>
+          <p:cNvSpPr>
+            <a:spLocks noGrp="1"/>
+          </p:cNvSpPr>
+          <p:nvPr>
+            <p:ph type="body" idx="1"/>
+          </p:nvPr>
+        </p:nvSpPr>
+        <p:spPr/>
+        <p:txBody>
+          <a:bodyPr/>
+          <a:lstStyle/>
+          <a:p>
+            <a:r>
+              <a:rPr lang="fr-FR" dirty="0" smtClean="0"/>
+              <a:t>On a passé beaucoup de temps en formation</a:t>
+            </a:r>
+            <a:r>
+              <a:rPr lang="fr-FR" baseline="0" dirty="0" smtClean="0"/>
+              <a:t> et étude préliminaires de faisabilité (FMC entre autre)</a:t>
+            </a:r>
+            <a:endParaRPr lang="fr-FR" dirty="0"/>
+          </a:p>
+        </p:txBody>
+      </p:sp>
+      <p:sp>
+        <p:nvSpPr>
+          <p:cNvPr id="4" name="Slide Number Placeholder 3"/>
+          <p:cNvSpPr>
+            <a:spLocks noGrp="1"/>
+          </p:cNvSpPr>
+          <p:nvPr>
+            <p:ph type="sldNum" sz="quarter" idx="10"/>
+          </p:nvPr>
+        </p:nvSpPr>
+        <p:spPr/>
+        <p:txBody>
+          <a:bodyPr/>
+          <a:lstStyle/>
+          <a:p>
+            <a:fld id="{CB2D9C16-2529-4A25-A30D-87EB28A90E76}" type="slidenum">
+              <a:rPr lang="fr-FR" smtClean="0"/>
+              <a:t>12</a:t>
+            </a:fld>
+            <a:endParaRPr lang="fr-FR" dirty="0"/>
+          </a:p>
+        </p:txBody>
+      </p:sp>
+    </p:spTree>
+    <p:extLst>
+      <p:ext uri="{BB962C8B-B14F-4D97-AF65-F5344CB8AC3E}">
+        <p14:creationId xmlns:p14="http://schemas.microsoft.com/office/powerpoint/2010/main" val="113897337"/>
+      </p:ext>
+    </p:extLst>
+  </p:cSld>
+  <p:clrMapOvr>
+    <a:masterClrMapping/>
+  </p:clrMapOvr>
+</p:notes>
+</file>
+
 <file path=ppt/slideLayouts/slideLayout1.xml><?xml version="1.0" encoding="utf-8"?>
 <p:sldLayout xmlns:a="http://schemas.openxmlformats.org/drawingml/2006/main" xmlns:r="http://schemas.openxmlformats.org/officeDocument/2006/relationships" xmlns:p="http://schemas.openxmlformats.org/presentationml/2006/main" showMasterSp="0" type="title" preserve="1">
   <p:cSld name="Title Slide">
@@ -229,7 +1430,7 @@
             <a:lstStyle/>
             <a:p>
               <a:pPr algn="ctr" eaLnBrk="1" hangingPunct="1"/>
-              <a:endParaRPr lang="fr-FR" altLang="fr-FR" sz="2400">
+              <a:endParaRPr lang="fr-FR" altLang="fr-FR" sz="2400" dirty="0">
                 <a:latin typeface="Times New Roman" pitchFamily="18" charset="0"/>
               </a:endParaRPr>
             </a:p>
@@ -275,7 +1476,7 @@
             <a:lstStyle/>
             <a:p>
               <a:pPr eaLnBrk="1" hangingPunct="1"/>
-              <a:endParaRPr lang="fr-FR" altLang="fr-FR" sz="2400">
+              <a:endParaRPr lang="fr-FR" altLang="fr-FR" sz="2400" dirty="0">
                 <a:latin typeface="Times New Roman" pitchFamily="18" charset="0"/>
               </a:endParaRPr>
             </a:p>
@@ -337,7 +1538,7 @@
               <a:lstStyle/>
               <a:p>
                 <a:pPr eaLnBrk="1" hangingPunct="1"/>
-                <a:endParaRPr lang="fr-FR" altLang="fr-FR" sz="2400">
+                <a:endParaRPr lang="fr-FR" altLang="fr-FR" sz="2400" dirty="0">
                   <a:latin typeface="Times New Roman" pitchFamily="18" charset="0"/>
                 </a:endParaRPr>
               </a:p>
@@ -383,7 +1584,7 @@
               <a:lstStyle/>
               <a:p>
                 <a:pPr eaLnBrk="1" hangingPunct="1"/>
-                <a:endParaRPr lang="fr-FR" altLang="fr-FR" sz="2400">
+                <a:endParaRPr lang="fr-FR" altLang="fr-FR" sz="2400" dirty="0">
                   <a:latin typeface="Times New Roman" pitchFamily="18" charset="0"/>
                 </a:endParaRPr>
               </a:p>
@@ -429,7 +1630,7 @@
               <a:lstStyle/>
               <a:p>
                 <a:pPr eaLnBrk="1" hangingPunct="1"/>
-                <a:endParaRPr lang="fr-FR" altLang="fr-FR" sz="2400">
+                <a:endParaRPr lang="fr-FR" altLang="fr-FR" sz="2400" dirty="0">
                   <a:latin typeface="Times New Roman" pitchFamily="18" charset="0"/>
                 </a:endParaRPr>
               </a:p>
@@ -475,7 +1676,7 @@
               <a:lstStyle/>
               <a:p>
                 <a:pPr eaLnBrk="1" hangingPunct="1"/>
-                <a:endParaRPr lang="fr-FR" altLang="fr-FR" sz="2400">
+                <a:endParaRPr lang="fr-FR" altLang="fr-FR" sz="2400" dirty="0">
                   <a:latin typeface="Times New Roman" pitchFamily="18" charset="0"/>
                 </a:endParaRPr>
               </a:p>
@@ -521,7 +1722,7 @@
               <a:lstStyle/>
               <a:p>
                 <a:pPr eaLnBrk="1" hangingPunct="1"/>
-                <a:endParaRPr lang="fr-FR" altLang="fr-FR" sz="2400">
+                <a:endParaRPr lang="fr-FR" altLang="fr-FR" sz="2400" dirty="0">
                   <a:latin typeface="Times New Roman" pitchFamily="18" charset="0"/>
                 </a:endParaRPr>
               </a:p>
@@ -567,7 +1768,7 @@
               <a:lstStyle/>
               <a:p>
                 <a:pPr eaLnBrk="1" hangingPunct="1"/>
-                <a:endParaRPr lang="fr-FR" altLang="fr-FR" sz="2400">
+                <a:endParaRPr lang="fr-FR" altLang="fr-FR" sz="2400" dirty="0">
                   <a:latin typeface="Times New Roman" pitchFamily="18" charset="0"/>
                 </a:endParaRPr>
               </a:p>
@@ -613,7 +1814,7 @@
               <a:lstStyle/>
               <a:p>
                 <a:pPr eaLnBrk="1" hangingPunct="1"/>
-                <a:endParaRPr lang="fr-FR" altLang="fr-FR" sz="2400">
+                <a:endParaRPr lang="fr-FR" altLang="fr-FR" sz="2400" dirty="0">
                   <a:latin typeface="Times New Roman" pitchFamily="18" charset="0"/>
                 </a:endParaRPr>
               </a:p>
@@ -659,7 +1860,7 @@
               <a:lstStyle/>
               <a:p>
                 <a:pPr eaLnBrk="1" hangingPunct="1"/>
-                <a:endParaRPr lang="fr-FR" altLang="fr-FR" sz="2400">
+                <a:endParaRPr lang="fr-FR" altLang="fr-FR" sz="2400" dirty="0">
                   <a:latin typeface="Times New Roman" pitchFamily="18" charset="0"/>
                 </a:endParaRPr>
               </a:p>
@@ -705,7 +1906,7 @@
               <a:lstStyle/>
               <a:p>
                 <a:pPr eaLnBrk="1" hangingPunct="1"/>
-                <a:endParaRPr lang="fr-FR" altLang="fr-FR" sz="2400">
+                <a:endParaRPr lang="fr-FR" altLang="fr-FR" sz="2400" dirty="0">
                   <a:latin typeface="Times New Roman" pitchFamily="18" charset="0"/>
                 </a:endParaRPr>
               </a:p>
@@ -751,7 +1952,7 @@
               <a:lstStyle/>
               <a:p>
                 <a:pPr eaLnBrk="1" hangingPunct="1"/>
-                <a:endParaRPr lang="fr-FR" altLang="fr-FR" sz="2400">
+                <a:endParaRPr lang="fr-FR" altLang="fr-FR" sz="2400" dirty="0">
                   <a:latin typeface="Times New Roman" pitchFamily="18" charset="0"/>
                 </a:endParaRPr>
               </a:p>
@@ -783,7 +1984,7 @@
             </a:lvl1pPr>
           </a:lstStyle>
           <a:p>
-            <a:endParaRPr lang="fr-FR" altLang="fr-FR"/>
+            <a:endParaRPr lang="fr-FR" altLang="fr-FR" dirty="0"/>
           </a:p>
         </p:txBody>
       </p:sp>
@@ -806,7 +2007,7 @@
             </a:lvl1pPr>
           </a:lstStyle>
           <a:p>
-            <a:endParaRPr lang="fr-FR" altLang="fr-FR"/>
+            <a:endParaRPr lang="fr-FR" altLang="fr-FR" dirty="0"/>
           </a:p>
         </p:txBody>
       </p:sp>
@@ -834,7 +2035,7 @@
               <a:pPr/>
               <a:t>‹#›</a:t>
             </a:fld>
-            <a:endParaRPr lang="fr-FR" altLang="fr-FR"/>
+            <a:endParaRPr lang="fr-FR" altLang="fr-FR" dirty="0"/>
           </a:p>
         </p:txBody>
       </p:sp>
@@ -1395,7 +2596,7 @@
             </a:lvl1pPr>
           </a:lstStyle>
           <a:p>
-            <a:endParaRPr lang="fr-FR" altLang="fr-FR"/>
+            <a:endParaRPr lang="fr-FR" altLang="fr-FR" dirty="0"/>
           </a:p>
         </p:txBody>
       </p:sp>
@@ -1423,7 +2624,7 @@
               <a:pPr/>
               <a:t>‹#›</a:t>
             </a:fld>
-            <a:endParaRPr lang="fr-FR" altLang="fr-FR"/>
+            <a:endParaRPr lang="fr-FR" altLang="fr-FR" dirty="0"/>
           </a:p>
         </p:txBody>
       </p:sp>
@@ -1446,7 +2647,7 @@
             </a:lvl1pPr>
           </a:lstStyle>
           <a:p>
-            <a:endParaRPr lang="fr-FR" altLang="fr-FR"/>
+            <a:endParaRPr lang="fr-FR" altLang="fr-FR" dirty="0"/>
           </a:p>
         </p:txBody>
       </p:sp>
@@ -1596,7 +2797,7 @@
             </a:lvl1pPr>
           </a:lstStyle>
           <a:p>
-            <a:endParaRPr lang="fr-FR" altLang="fr-FR"/>
+            <a:endParaRPr lang="fr-FR" altLang="fr-FR" dirty="0"/>
           </a:p>
         </p:txBody>
       </p:sp>
@@ -1624,7 +2825,7 @@
               <a:pPr/>
               <a:t>‹#›</a:t>
             </a:fld>
-            <a:endParaRPr lang="fr-FR" altLang="fr-FR"/>
+            <a:endParaRPr lang="fr-FR" altLang="fr-FR" dirty="0"/>
           </a:p>
         </p:txBody>
       </p:sp>
@@ -1647,7 +2848,7 @@
             </a:lvl1pPr>
           </a:lstStyle>
           <a:p>
-            <a:endParaRPr lang="fr-FR" altLang="fr-FR"/>
+            <a:endParaRPr lang="fr-FR" altLang="fr-FR" dirty="0"/>
           </a:p>
         </p:txBody>
       </p:sp>
@@ -1893,7 +3094,7 @@
             </a:lvl1pPr>
           </a:lstStyle>
           <a:p>
-            <a:endParaRPr lang="fr-FR" altLang="fr-FR"/>
+            <a:endParaRPr lang="fr-FR" altLang="fr-FR" dirty="0"/>
           </a:p>
         </p:txBody>
       </p:sp>
@@ -1921,7 +3122,7 @@
               <a:pPr/>
               <a:t>‹#›</a:t>
             </a:fld>
-            <a:endParaRPr lang="fr-FR" altLang="fr-FR"/>
+            <a:endParaRPr lang="fr-FR" altLang="fr-FR" dirty="0"/>
           </a:p>
         </p:txBody>
       </p:sp>
@@ -1944,7 +3145,7 @@
             </a:lvl1pPr>
           </a:lstStyle>
           <a:p>
-            <a:endParaRPr lang="fr-FR" altLang="fr-FR"/>
+            <a:endParaRPr lang="fr-FR" altLang="fr-FR" dirty="0"/>
           </a:p>
         </p:txBody>
       </p:sp>
@@ -2329,7 +3530,7 @@
             </a:lvl1pPr>
           </a:lstStyle>
           <a:p>
-            <a:endParaRPr lang="fr-FR" altLang="fr-FR"/>
+            <a:endParaRPr lang="fr-FR" altLang="fr-FR" dirty="0"/>
           </a:p>
         </p:txBody>
       </p:sp>
@@ -2357,7 +3558,7 @@
               <a:pPr/>
               <a:t>‹#›</a:t>
             </a:fld>
-            <a:endParaRPr lang="fr-FR" altLang="fr-FR"/>
+            <a:endParaRPr lang="fr-FR" altLang="fr-FR" dirty="0"/>
           </a:p>
         </p:txBody>
       </p:sp>
@@ -2380,7 +3581,7 @@
             </a:lvl1pPr>
           </a:lstStyle>
           <a:p>
-            <a:endParaRPr lang="fr-FR" altLang="fr-FR"/>
+            <a:endParaRPr lang="fr-FR" altLang="fr-FR" dirty="0"/>
           </a:p>
         </p:txBody>
       </p:sp>
@@ -2456,7 +3657,7 @@
             </a:lvl1pPr>
           </a:lstStyle>
           <a:p>
-            <a:endParaRPr lang="fr-FR" altLang="fr-FR"/>
+            <a:endParaRPr lang="fr-FR" altLang="fr-FR" dirty="0"/>
           </a:p>
         </p:txBody>
       </p:sp>
@@ -2484,7 +3685,7 @@
               <a:pPr/>
               <a:t>‹#›</a:t>
             </a:fld>
-            <a:endParaRPr lang="fr-FR" altLang="fr-FR"/>
+            <a:endParaRPr lang="fr-FR" altLang="fr-FR" dirty="0"/>
           </a:p>
         </p:txBody>
       </p:sp>
@@ -2507,7 +3708,7 @@
             </a:lvl1pPr>
           </a:lstStyle>
           <a:p>
-            <a:endParaRPr lang="fr-FR" altLang="fr-FR"/>
+            <a:endParaRPr lang="fr-FR" altLang="fr-FR" dirty="0"/>
           </a:p>
         </p:txBody>
       </p:sp>
@@ -2560,7 +3761,7 @@
             </a:lvl1pPr>
           </a:lstStyle>
           <a:p>
-            <a:endParaRPr lang="fr-FR" altLang="fr-FR"/>
+            <a:endParaRPr lang="fr-FR" altLang="fr-FR" dirty="0"/>
           </a:p>
         </p:txBody>
       </p:sp>
@@ -2588,7 +3789,7 @@
               <a:pPr/>
               <a:t>‹#›</a:t>
             </a:fld>
-            <a:endParaRPr lang="fr-FR" altLang="fr-FR"/>
+            <a:endParaRPr lang="fr-FR" altLang="fr-FR" dirty="0"/>
           </a:p>
         </p:txBody>
       </p:sp>
@@ -2611,7 +3812,7 @@
             </a:lvl1pPr>
           </a:lstStyle>
           <a:p>
-            <a:endParaRPr lang="fr-FR" altLang="fr-FR"/>
+            <a:endParaRPr lang="fr-FR" altLang="fr-FR" dirty="0"/>
           </a:p>
         </p:txBody>
       </p:sp>
@@ -2846,7 +4047,7 @@
             </a:lvl1pPr>
           </a:lstStyle>
           <a:p>
-            <a:endParaRPr lang="fr-FR" altLang="fr-FR"/>
+            <a:endParaRPr lang="fr-FR" altLang="fr-FR" dirty="0"/>
           </a:p>
         </p:txBody>
       </p:sp>
@@ -2874,7 +4075,7 @@
               <a:pPr/>
               <a:t>‹#›</a:t>
             </a:fld>
-            <a:endParaRPr lang="fr-FR" altLang="fr-FR"/>
+            <a:endParaRPr lang="fr-FR" altLang="fr-FR" dirty="0"/>
           </a:p>
         </p:txBody>
       </p:sp>
@@ -2897,7 +4098,7 @@
             </a:lvl1pPr>
           </a:lstStyle>
           <a:p>
-            <a:endParaRPr lang="fr-FR" altLang="fr-FR"/>
+            <a:endParaRPr lang="fr-FR" altLang="fr-FR" dirty="0"/>
           </a:p>
         </p:txBody>
       </p:sp>
@@ -3021,10 +4222,30 @@
           </a:lstStyle>
           <a:p>
             <a:r>
-              <a:rPr lang="fr-FR" smtClean="0"/>
-              <a:t>Click icon to add picture</a:t>
-            </a:r>
-            <a:endParaRPr lang="fr-FR"/>
+              <a:rPr lang="fr-FR" dirty="0" smtClean="0"/>
+              <a:t>Click </a:t>
+            </a:r>
+            <a:r>
+              <a:rPr lang="fr-FR" dirty="0" err="1" smtClean="0"/>
+              <a:t>icon</a:t>
+            </a:r>
+            <a:r>
+              <a:rPr lang="fr-FR" dirty="0" smtClean="0"/>
+              <a:t> to </a:t>
+            </a:r>
+            <a:r>
+              <a:rPr lang="fr-FR" dirty="0" err="1" smtClean="0"/>
+              <a:t>add</a:t>
+            </a:r>
+            <a:r>
+              <a:rPr lang="fr-FR" dirty="0" smtClean="0"/>
+              <a:t> </a:t>
+            </a:r>
+            <a:r>
+              <a:rPr lang="fr-FR" dirty="0" err="1" smtClean="0"/>
+              <a:t>picture</a:t>
+            </a:r>
+            <a:endParaRPr lang="fr-FR" dirty="0"/>
           </a:p>
         </p:txBody>
       </p:sp>
@@ -3269,7 +4490,7 @@
             </a:lvl1pPr>
           </a:lstStyle>
           <a:p>
-            <a:endParaRPr lang="fr-FR" altLang="fr-FR"/>
+            <a:endParaRPr lang="fr-FR" altLang="fr-FR" dirty="0"/>
           </a:p>
         </p:txBody>
       </p:sp>
@@ -3344,7 +4565,7 @@
               <a:pPr/>
               <a:t>‹#›</a:t>
             </a:fld>
-            <a:endParaRPr lang="fr-FR" altLang="fr-FR"/>
+            <a:endParaRPr lang="fr-FR" altLang="fr-FR" dirty="0"/>
           </a:p>
         </p:txBody>
       </p:sp>
@@ -3422,7 +4643,7 @@
             <a:lstStyle/>
             <a:p>
               <a:pPr algn="ctr" eaLnBrk="1" hangingPunct="1"/>
-              <a:endParaRPr lang="fr-FR" altLang="fr-FR" sz="2400">
+              <a:endParaRPr lang="fr-FR" altLang="fr-FR" sz="2400" dirty="0">
                 <a:latin typeface="Times New Roman" pitchFamily="18" charset="0"/>
               </a:endParaRPr>
             </a:p>
@@ -3476,7 +4697,7 @@
             <a:lstStyle/>
             <a:p>
               <a:pPr eaLnBrk="1" hangingPunct="1"/>
-              <a:endParaRPr lang="fr-FR" altLang="fr-FR" sz="2400">
+              <a:endParaRPr lang="fr-FR" altLang="fr-FR" sz="2400" dirty="0">
                 <a:latin typeface="Times New Roman" pitchFamily="18" charset="0"/>
               </a:endParaRPr>
             </a:p>
@@ -3522,7 +4743,7 @@
             <a:lstStyle/>
             <a:p>
               <a:pPr eaLnBrk="1" hangingPunct="1"/>
-              <a:endParaRPr lang="fr-FR" altLang="fr-FR">
+              <a:endParaRPr lang="fr-FR" altLang="fr-FR" dirty="0">
                 <a:solidFill>
                   <a:schemeClr val="hlink"/>
                 </a:solidFill>
@@ -3570,7 +4791,7 @@
             <a:lstStyle/>
             <a:p>
               <a:pPr eaLnBrk="1" hangingPunct="1"/>
-              <a:endParaRPr lang="fr-FR" altLang="fr-FR">
+              <a:endParaRPr lang="fr-FR" altLang="fr-FR" dirty="0">
                 <a:solidFill>
                   <a:schemeClr val="hlink"/>
                 </a:solidFill>
@@ -3618,7 +4839,7 @@
             <a:lstStyle/>
             <a:p>
               <a:pPr eaLnBrk="1" hangingPunct="1"/>
-              <a:endParaRPr lang="fr-FR" altLang="fr-FR">
+              <a:endParaRPr lang="fr-FR" altLang="fr-FR" dirty="0">
                 <a:solidFill>
                   <a:schemeClr val="accent2"/>
                 </a:solidFill>
@@ -3666,7 +4887,7 @@
             <a:lstStyle/>
             <a:p>
               <a:pPr eaLnBrk="1" hangingPunct="1"/>
-              <a:endParaRPr lang="fr-FR" altLang="fr-FR">
+              <a:endParaRPr lang="fr-FR" altLang="fr-FR" dirty="0">
                 <a:solidFill>
                   <a:schemeClr val="hlink"/>
                 </a:solidFill>
@@ -3714,7 +4935,7 @@
             <a:lstStyle/>
             <a:p>
               <a:pPr eaLnBrk="1" hangingPunct="1"/>
-              <a:endParaRPr lang="fr-FR" altLang="fr-FR" sz="2400">
+              <a:endParaRPr lang="fr-FR" altLang="fr-FR" sz="2400" dirty="0">
                 <a:latin typeface="Times New Roman" pitchFamily="18" charset="0"/>
               </a:endParaRPr>
             </a:p>
@@ -3760,7 +4981,7 @@
             <a:lstStyle/>
             <a:p>
               <a:pPr eaLnBrk="1" hangingPunct="1"/>
-              <a:endParaRPr lang="fr-FR" altLang="fr-FR">
+              <a:endParaRPr lang="fr-FR" altLang="fr-FR" dirty="0">
                 <a:solidFill>
                   <a:schemeClr val="accent2"/>
                 </a:solidFill>
@@ -3808,7 +5029,7 @@
             <a:lstStyle/>
             <a:p>
               <a:pPr eaLnBrk="1" hangingPunct="1"/>
-              <a:endParaRPr lang="fr-FR" altLang="fr-FR">
+              <a:endParaRPr lang="fr-FR" altLang="fr-FR" dirty="0">
                 <a:solidFill>
                   <a:schemeClr val="accent2"/>
                 </a:solidFill>
@@ -4047,7 +5268,7 @@
             </a:lvl1pPr>
           </a:lstStyle>
           <a:p>
-            <a:endParaRPr lang="fr-FR" altLang="fr-FR"/>
+            <a:endParaRPr lang="fr-FR" altLang="fr-FR" dirty="0"/>
           </a:p>
         </p:txBody>
       </p:sp>
@@ -4540,6 +5761,12 @@
           <a:p>
             <a:r>
               <a:rPr lang="fr-FR" sz="2000" dirty="0" smtClean="0"/>
+              <a:t>Binôme 13</a:t>
+            </a:r>
+          </a:p>
+          <a:p>
+            <a:r>
+              <a:rPr lang="fr-FR" sz="2000" dirty="0" smtClean="0"/>
               <a:t>Badr BOUSLIKHIN</a:t>
             </a:r>
           </a:p>
@@ -4547,6 +5774,19 @@
             <a:r>
               <a:rPr lang="fr-FR" sz="2000" dirty="0" smtClean="0"/>
               <a:t>Douglas RAILLARD</a:t>
+            </a:r>
+          </a:p>
+          <a:p>
+            <a:endParaRPr lang="fr-FR" sz="2000" dirty="0"/>
+          </a:p>
+          <a:p>
+            <a:endParaRPr lang="fr-FR" sz="2000" dirty="0" smtClean="0"/>
+          </a:p>
+          <a:p>
+            <a:pPr algn="r"/>
+            <a:r>
+              <a:rPr lang="fr-FR" sz="2000" dirty="0" smtClean="0"/>
+              <a:t>Juin 2015</a:t>
             </a:r>
           </a:p>
           <a:p>
@@ -4564,6 +5804,380 @@
   <p:clrMapOvr>
     <a:masterClrMapping/>
   </p:clrMapOvr>
+  <p:timing>
+    <p:tnLst>
+      <p:par>
+        <p:cTn id="1" dur="indefinite" restart="never" nodeType="tmRoot"/>
+      </p:par>
+    </p:tnLst>
+  </p:timing>
+</p:sld>
+</file>
+
+<file path=ppt/slides/slide10.xml><?xml version="1.0" encoding="utf-8"?>
+<p:sld xmlns:a="http://schemas.openxmlformats.org/drawingml/2006/main" xmlns:r="http://schemas.openxmlformats.org/officeDocument/2006/relationships" xmlns:p="http://schemas.openxmlformats.org/presentationml/2006/main">
+  <p:cSld>
+    <p:spTree>
+      <p:nvGrpSpPr>
+        <p:cNvPr id="1" name=""/>
+        <p:cNvGrpSpPr/>
+        <p:nvPr/>
+      </p:nvGrpSpPr>
+      <p:grpSpPr>
+        <a:xfrm>
+          <a:off x="0" y="0"/>
+          <a:ext cx="0" cy="0"/>
+          <a:chOff x="0" y="0"/>
+          <a:chExt cx="0" cy="0"/>
+        </a:xfrm>
+      </p:grpSpPr>
+      <p:sp>
+        <p:nvSpPr>
+          <p:cNvPr id="2" name="Title 1"/>
+          <p:cNvSpPr>
+            <a:spLocks noGrp="1"/>
+          </p:cNvSpPr>
+          <p:nvPr>
+            <p:ph type="title"/>
+          </p:nvPr>
+        </p:nvSpPr>
+        <p:spPr/>
+        <p:txBody>
+          <a:bodyPr/>
+          <a:lstStyle/>
+          <a:p>
+            <a:r>
+              <a:rPr lang="fr-FR" dirty="0" smtClean="0"/>
+              <a:t>Résultats</a:t>
+            </a:r>
+            <a:endParaRPr lang="fr-FR" dirty="0"/>
+          </a:p>
+        </p:txBody>
+      </p:sp>
+      <p:sp>
+        <p:nvSpPr>
+          <p:cNvPr id="3" name="Content Placeholder 2"/>
+          <p:cNvSpPr>
+            <a:spLocks noGrp="1"/>
+          </p:cNvSpPr>
+          <p:nvPr>
+            <p:ph idx="1"/>
+          </p:nvPr>
+        </p:nvSpPr>
+        <p:spPr>
+          <a:xfrm>
+            <a:off x="457200" y="1981200"/>
+            <a:ext cx="8229600" cy="3464024"/>
+          </a:xfrm>
+        </p:spPr>
+        <p:txBody>
+          <a:bodyPr/>
+          <a:lstStyle/>
+          <a:p>
+            <a:r>
+              <a:rPr lang="fr-FR" dirty="0" smtClean="0"/>
+              <a:t>Carte routée</a:t>
+            </a:r>
+          </a:p>
+          <a:p>
+            <a:r>
+              <a:rPr lang="fr-FR" dirty="0" smtClean="0"/>
+              <a:t>Système </a:t>
+            </a:r>
+            <a:r>
+              <a:rPr lang="fr-FR" dirty="0" err="1" smtClean="0"/>
+              <a:t>bootable</a:t>
+            </a:r>
+            <a:r>
+              <a:rPr lang="fr-FR" dirty="0" smtClean="0"/>
+              <a:t> et chaîne de construction du firmware</a:t>
+            </a:r>
+          </a:p>
+          <a:p>
+            <a:pPr marL="0" indent="0">
+              <a:buNone/>
+            </a:pPr>
+            <a:endParaRPr lang="fr-FR" dirty="0" smtClean="0"/>
+          </a:p>
+          <a:p>
+            <a:r>
+              <a:rPr lang="fr-FR" dirty="0" smtClean="0"/>
+              <a:t>Poursuite du projet pendant l’été</a:t>
+            </a:r>
+          </a:p>
+          <a:p>
+            <a:endParaRPr lang="fr-FR" dirty="0"/>
+          </a:p>
+          <a:p>
+            <a:pPr marL="0" indent="0">
+              <a:buNone/>
+            </a:pPr>
+            <a:endParaRPr lang="fr-FR" dirty="0"/>
+          </a:p>
+        </p:txBody>
+      </p:sp>
+    </p:spTree>
+    <p:extLst>
+      <p:ext uri="{BB962C8B-B14F-4D97-AF65-F5344CB8AC3E}">
+        <p14:creationId xmlns:p14="http://schemas.microsoft.com/office/powerpoint/2010/main" val="2742570832"/>
+      </p:ext>
+    </p:extLst>
+  </p:cSld>
+  <p:clrMapOvr>
+    <a:masterClrMapping/>
+  </p:clrMapOvr>
+  <p:timing>
+    <p:tnLst>
+      <p:par>
+        <p:cTn id="1" dur="indefinite" restart="never" nodeType="tmRoot"/>
+      </p:par>
+    </p:tnLst>
+  </p:timing>
+</p:sld>
+</file>
+
+<file path=ppt/slides/slide11.xml><?xml version="1.0" encoding="utf-8"?>
+<p:sld xmlns:a="http://schemas.openxmlformats.org/drawingml/2006/main" xmlns:r="http://schemas.openxmlformats.org/officeDocument/2006/relationships" xmlns:p="http://schemas.openxmlformats.org/presentationml/2006/main">
+  <p:cSld>
+    <p:spTree>
+      <p:nvGrpSpPr>
+        <p:cNvPr id="1" name=""/>
+        <p:cNvGrpSpPr/>
+        <p:nvPr/>
+      </p:nvGrpSpPr>
+      <p:grpSpPr>
+        <a:xfrm>
+          <a:off x="0" y="0"/>
+          <a:ext cx="0" cy="0"/>
+          <a:chOff x="0" y="0"/>
+          <a:chExt cx="0" cy="0"/>
+        </a:xfrm>
+      </p:grpSpPr>
+      <p:sp>
+        <p:nvSpPr>
+          <p:cNvPr id="2" name="Title 1"/>
+          <p:cNvSpPr>
+            <a:spLocks noGrp="1"/>
+          </p:cNvSpPr>
+          <p:nvPr>
+            <p:ph type="title"/>
+          </p:nvPr>
+        </p:nvSpPr>
+        <p:spPr/>
+        <p:txBody>
+          <a:bodyPr/>
+          <a:lstStyle/>
+          <a:p>
+            <a:r>
+              <a:rPr lang="fr-FR" dirty="0" smtClean="0"/>
+              <a:t>Ce que nous avons appris</a:t>
+            </a:r>
+            <a:endParaRPr lang="fr-FR" dirty="0"/>
+          </a:p>
+        </p:txBody>
+      </p:sp>
+      <p:sp>
+        <p:nvSpPr>
+          <p:cNvPr id="3" name="Content Placeholder 2"/>
+          <p:cNvSpPr>
+            <a:spLocks noGrp="1"/>
+          </p:cNvSpPr>
+          <p:nvPr>
+            <p:ph idx="1"/>
+          </p:nvPr>
+        </p:nvSpPr>
+        <p:spPr>
+          <a:xfrm>
+            <a:off x="457200" y="1981200"/>
+            <a:ext cx="8229600" cy="4112096"/>
+          </a:xfrm>
+        </p:spPr>
+        <p:txBody>
+          <a:bodyPr/>
+          <a:lstStyle/>
+          <a:p>
+            <a:r>
+              <a:rPr lang="fr-FR" dirty="0" smtClean="0"/>
+              <a:t>Connaissances techniques</a:t>
+            </a:r>
+          </a:p>
+          <a:p>
+            <a:pPr lvl="1"/>
+            <a:r>
+              <a:rPr lang="fr-FR" dirty="0" smtClean="0"/>
+              <a:t>ARM</a:t>
+            </a:r>
+          </a:p>
+          <a:p>
+            <a:pPr lvl="1"/>
+            <a:r>
+              <a:rPr lang="fr-FR" dirty="0" smtClean="0"/>
+              <a:t>Choix des composants (mémoires)</a:t>
+            </a:r>
+          </a:p>
+          <a:p>
+            <a:pPr lvl="1"/>
+            <a:r>
+              <a:rPr lang="fr-FR" dirty="0" smtClean="0"/>
+              <a:t>Eléments d’un système GNU/Linux</a:t>
+            </a:r>
+          </a:p>
+          <a:p>
+            <a:pPr marL="457200" lvl="1" indent="0">
+              <a:buNone/>
+            </a:pPr>
+            <a:endParaRPr lang="fr-FR" dirty="0" smtClean="0"/>
+          </a:p>
+          <a:p>
+            <a:r>
+              <a:rPr lang="fr-FR" dirty="0" smtClean="0"/>
+              <a:t>Connaissance du workflow</a:t>
+            </a:r>
+          </a:p>
+          <a:p>
+            <a:pPr lvl="1"/>
+            <a:r>
+              <a:rPr lang="fr-FR" dirty="0" smtClean="0"/>
+              <a:t>Couplage </a:t>
+            </a:r>
+            <a:r>
+              <a:rPr lang="fr-FR" dirty="0" err="1" smtClean="0"/>
+              <a:t>Hard</a:t>
+            </a:r>
+            <a:r>
+              <a:rPr lang="fr-FR" dirty="0" err="1" smtClean="0">
+                <a:sym typeface="Wingdings" panose="05000000000000000000" pitchFamily="2" charset="2"/>
+              </a:rPr>
+              <a:t>Soft</a:t>
+            </a:r>
+            <a:r>
+              <a:rPr lang="fr-FR" dirty="0" smtClean="0">
+                <a:sym typeface="Wingdings" panose="05000000000000000000" pitchFamily="2" charset="2"/>
+              </a:rPr>
+              <a:t> à </a:t>
+            </a:r>
+            <a:r>
+              <a:rPr lang="fr-FR" b="1" dirty="0" smtClean="0">
+                <a:sym typeface="Wingdings" panose="05000000000000000000" pitchFamily="2" charset="2"/>
+              </a:rPr>
+              <a:t>TOUTES</a:t>
+            </a:r>
+            <a:r>
+              <a:rPr lang="fr-FR" dirty="0" smtClean="0">
+                <a:sym typeface="Wingdings" panose="05000000000000000000" pitchFamily="2" charset="2"/>
+              </a:rPr>
+              <a:t> les étapes</a:t>
+            </a:r>
+            <a:endParaRPr lang="fr-FR" dirty="0"/>
+          </a:p>
+          <a:p>
+            <a:pPr marL="0" indent="0">
+              <a:buNone/>
+            </a:pPr>
+            <a:endParaRPr lang="fr-FR" dirty="0"/>
+          </a:p>
+        </p:txBody>
+      </p:sp>
+    </p:spTree>
+    <p:extLst>
+      <p:ext uri="{BB962C8B-B14F-4D97-AF65-F5344CB8AC3E}">
+        <p14:creationId xmlns:p14="http://schemas.microsoft.com/office/powerpoint/2010/main" val="1220433421"/>
+      </p:ext>
+    </p:extLst>
+  </p:cSld>
+  <p:clrMapOvr>
+    <a:masterClrMapping/>
+  </p:clrMapOvr>
+  <p:timing>
+    <p:tnLst>
+      <p:par>
+        <p:cTn id="1" dur="indefinite" restart="never" nodeType="tmRoot"/>
+      </p:par>
+    </p:tnLst>
+  </p:timing>
+</p:sld>
+</file>
+
+<file path=ppt/slides/slide12.xml><?xml version="1.0" encoding="utf-8"?>
+<p:sld xmlns:a="http://schemas.openxmlformats.org/drawingml/2006/main" xmlns:r="http://schemas.openxmlformats.org/officeDocument/2006/relationships" xmlns:p="http://schemas.openxmlformats.org/presentationml/2006/main">
+  <p:cSld>
+    <p:spTree>
+      <p:nvGrpSpPr>
+        <p:cNvPr id="1" name=""/>
+        <p:cNvGrpSpPr/>
+        <p:nvPr/>
+      </p:nvGrpSpPr>
+      <p:grpSpPr>
+        <a:xfrm>
+          <a:off x="0" y="0"/>
+          <a:ext cx="0" cy="0"/>
+          <a:chOff x="0" y="0"/>
+          <a:chExt cx="0" cy="0"/>
+        </a:xfrm>
+      </p:grpSpPr>
+      <p:sp>
+        <p:nvSpPr>
+          <p:cNvPr id="2" name="Title 1"/>
+          <p:cNvSpPr>
+            <a:spLocks noGrp="1"/>
+          </p:cNvSpPr>
+          <p:nvPr>
+            <p:ph type="title"/>
+          </p:nvPr>
+        </p:nvSpPr>
+        <p:spPr/>
+        <p:txBody>
+          <a:bodyPr/>
+          <a:lstStyle/>
+          <a:p>
+            <a:pPr algn="ctr"/>
+            <a:endParaRPr lang="fr-FR" dirty="0"/>
+          </a:p>
+        </p:txBody>
+      </p:sp>
+      <p:sp>
+        <p:nvSpPr>
+          <p:cNvPr id="4" name="Content Placeholder 3"/>
+          <p:cNvSpPr>
+            <a:spLocks noGrp="1"/>
+          </p:cNvSpPr>
+          <p:nvPr>
+            <p:ph idx="1"/>
+          </p:nvPr>
+        </p:nvSpPr>
+        <p:spPr/>
+        <p:txBody>
+          <a:bodyPr anchor="ctr"/>
+          <a:lstStyle/>
+          <a:p>
+            <a:pPr marL="0" indent="0" algn="ctr">
+              <a:buNone/>
+            </a:pPr>
+            <a:r>
+              <a:rPr lang="fr-FR" sz="6600" dirty="0" smtClean="0"/>
+              <a:t>Merci !</a:t>
+            </a:r>
+            <a:endParaRPr lang="fr-FR" sz="6600" dirty="0"/>
+          </a:p>
+        </p:txBody>
+      </p:sp>
+    </p:spTree>
+    <p:extLst>
+      <p:ext uri="{BB962C8B-B14F-4D97-AF65-F5344CB8AC3E}">
+        <p14:creationId xmlns:p14="http://schemas.microsoft.com/office/powerpoint/2010/main" val="3509245870"/>
+      </p:ext>
+    </p:extLst>
+  </p:cSld>
+  <p:clrMapOvr>
+    <a:masterClrMapping/>
+  </p:clrMapOvr>
+  <p:timing>
+    <p:tnLst>
+      <p:par>
+        <p:cTn id="1" dur="indefinite" restart="never" nodeType="tmRoot"/>
+      </p:par>
+    </p:tnLst>
+  </p:timing>
 </p:sld>
 </file>
 
@@ -4599,7 +6213,11 @@
           <a:bodyPr/>
           <a:lstStyle/>
           <a:p>
-            <a:endParaRPr lang="fr-FR"/>
+            <a:r>
+              <a:rPr lang="fr-FR" dirty="0" smtClean="0"/>
+              <a:t>Plan</a:t>
+            </a:r>
+            <a:endParaRPr lang="fr-FR" dirty="0"/>
           </a:p>
         </p:txBody>
       </p:sp>
@@ -4613,12 +6231,38 @@
             <p:ph idx="1"/>
           </p:nvPr>
         </p:nvSpPr>
-        <p:spPr/>
+        <p:spPr>
+          <a:xfrm>
+            <a:off x="457200" y="2989312"/>
+            <a:ext cx="8229600" cy="2095872"/>
+          </a:xfrm>
+        </p:spPr>
         <p:txBody>
           <a:bodyPr/>
           <a:lstStyle/>
           <a:p>
-            <a:endParaRPr lang="fr-FR"/>
+            <a:r>
+              <a:rPr lang="fr-FR" dirty="0" smtClean="0"/>
+              <a:t>Objectifs</a:t>
+            </a:r>
+          </a:p>
+          <a:p>
+            <a:r>
+              <a:rPr lang="fr-FR" dirty="0" smtClean="0"/>
+              <a:t>Démarche de développement</a:t>
+            </a:r>
+          </a:p>
+          <a:p>
+            <a:r>
+              <a:rPr lang="fr-FR" dirty="0" smtClean="0"/>
+              <a:t>Résultats</a:t>
+            </a:r>
+          </a:p>
+          <a:p>
+            <a:pPr marL="0" indent="0">
+              <a:buNone/>
+            </a:pPr>
+            <a:endParaRPr lang="fr-FR" dirty="0"/>
           </a:p>
         </p:txBody>
       </p:sp>
@@ -4626,6 +6270,1464 @@
     <p:extLst>
       <p:ext uri="{BB962C8B-B14F-4D97-AF65-F5344CB8AC3E}">
         <p14:creationId xmlns:p14="http://schemas.microsoft.com/office/powerpoint/2010/main" val="3234234127"/>
+      </p:ext>
+    </p:extLst>
+  </p:cSld>
+  <p:clrMapOvr>
+    <a:masterClrMapping/>
+  </p:clrMapOvr>
+  <p:timing>
+    <p:tnLst>
+      <p:par>
+        <p:cTn id="1" dur="indefinite" restart="never" nodeType="tmRoot"/>
+      </p:par>
+    </p:tnLst>
+  </p:timing>
+</p:sld>
+</file>
+
+<file path=ppt/slides/slide3.xml><?xml version="1.0" encoding="utf-8"?>
+<p:sld xmlns:a="http://schemas.openxmlformats.org/drawingml/2006/main" xmlns:r="http://schemas.openxmlformats.org/officeDocument/2006/relationships" xmlns:p="http://schemas.openxmlformats.org/presentationml/2006/main">
+  <p:cSld>
+    <p:spTree>
+      <p:nvGrpSpPr>
+        <p:cNvPr id="1" name=""/>
+        <p:cNvGrpSpPr/>
+        <p:nvPr/>
+      </p:nvGrpSpPr>
+      <p:grpSpPr>
+        <a:xfrm>
+          <a:off x="0" y="0"/>
+          <a:ext cx="0" cy="0"/>
+          <a:chOff x="0" y="0"/>
+          <a:chExt cx="0" cy="0"/>
+        </a:xfrm>
+      </p:grpSpPr>
+      <p:sp>
+        <p:nvSpPr>
+          <p:cNvPr id="2" name="Title 1"/>
+          <p:cNvSpPr>
+            <a:spLocks noGrp="1"/>
+          </p:cNvSpPr>
+          <p:nvPr>
+            <p:ph type="title"/>
+          </p:nvPr>
+        </p:nvSpPr>
+        <p:spPr/>
+        <p:txBody>
+          <a:bodyPr/>
+          <a:lstStyle/>
+          <a:p>
+            <a:r>
+              <a:rPr lang="fr-FR" dirty="0" smtClean="0"/>
+              <a:t>Objectifs d’a</a:t>
+            </a:r>
+            <a:r>
+              <a:rPr lang="fr-FR" dirty="0" smtClean="0"/>
+              <a:t>utoformation</a:t>
+            </a:r>
+            <a:endParaRPr lang="fr-FR" dirty="0"/>
+          </a:p>
+        </p:txBody>
+      </p:sp>
+      <p:sp>
+        <p:nvSpPr>
+          <p:cNvPr id="3" name="Content Placeholder 2"/>
+          <p:cNvSpPr>
+            <a:spLocks noGrp="1"/>
+          </p:cNvSpPr>
+          <p:nvPr>
+            <p:ph idx="1"/>
+          </p:nvPr>
+        </p:nvSpPr>
+        <p:spPr>
+          <a:xfrm>
+            <a:off x="457200" y="2413248"/>
+            <a:ext cx="8229600" cy="2887960"/>
+          </a:xfrm>
+        </p:spPr>
+        <p:txBody>
+          <a:bodyPr/>
+          <a:lstStyle/>
+          <a:p>
+            <a:pPr lvl="1">
+              <a:lnSpc>
+                <a:spcPct val="150000"/>
+              </a:lnSpc>
+            </a:pPr>
+            <a:r>
+              <a:rPr lang="fr-FR" dirty="0" smtClean="0"/>
+              <a:t>Architecture ARM</a:t>
+            </a:r>
+          </a:p>
+          <a:p>
+            <a:pPr lvl="1">
+              <a:lnSpc>
+                <a:spcPct val="150000"/>
+              </a:lnSpc>
+            </a:pPr>
+            <a:r>
+              <a:rPr lang="fr-FR" dirty="0" smtClean="0"/>
+              <a:t>Linux embarqué</a:t>
+            </a:r>
+          </a:p>
+          <a:p>
+            <a:pPr lvl="1">
+              <a:lnSpc>
+                <a:spcPct val="150000"/>
+              </a:lnSpc>
+            </a:pPr>
+            <a:r>
+              <a:rPr lang="fr-FR" dirty="0" smtClean="0"/>
+              <a:t>Développement d’une carte</a:t>
+            </a:r>
+          </a:p>
+          <a:p>
+            <a:pPr lvl="1">
+              <a:lnSpc>
+                <a:spcPct val="150000"/>
+              </a:lnSpc>
+            </a:pPr>
+            <a:r>
+              <a:rPr lang="fr-FR" dirty="0" smtClean="0"/>
+              <a:t>Travail d’équipe multidisciplinaire</a:t>
+            </a:r>
+          </a:p>
+        </p:txBody>
+      </p:sp>
+    </p:spTree>
+    <p:extLst>
+      <p:ext uri="{BB962C8B-B14F-4D97-AF65-F5344CB8AC3E}">
+        <p14:creationId xmlns:p14="http://schemas.microsoft.com/office/powerpoint/2010/main" val="432318626"/>
+      </p:ext>
+    </p:extLst>
+  </p:cSld>
+  <p:clrMapOvr>
+    <a:masterClrMapping/>
+  </p:clrMapOvr>
+  <p:timing>
+    <p:tnLst>
+      <p:par>
+        <p:cTn id="1" dur="indefinite" restart="never" nodeType="tmRoot"/>
+      </p:par>
+    </p:tnLst>
+  </p:timing>
+</p:sld>
+</file>
+
+<file path=ppt/slides/slide4.xml><?xml version="1.0" encoding="utf-8"?>
+<p:sld xmlns:a="http://schemas.openxmlformats.org/drawingml/2006/main" xmlns:r="http://schemas.openxmlformats.org/officeDocument/2006/relationships" xmlns:p="http://schemas.openxmlformats.org/presentationml/2006/main">
+  <p:cSld>
+    <p:spTree>
+      <p:nvGrpSpPr>
+        <p:cNvPr id="1" name=""/>
+        <p:cNvGrpSpPr/>
+        <p:nvPr/>
+      </p:nvGrpSpPr>
+      <p:grpSpPr>
+        <a:xfrm>
+          <a:off x="0" y="0"/>
+          <a:ext cx="0" cy="0"/>
+          <a:chOff x="0" y="0"/>
+          <a:chExt cx="0" cy="0"/>
+        </a:xfrm>
+      </p:grpSpPr>
+      <p:sp>
+        <p:nvSpPr>
+          <p:cNvPr id="2" name="Title 1"/>
+          <p:cNvSpPr>
+            <a:spLocks noGrp="1"/>
+          </p:cNvSpPr>
+          <p:nvPr>
+            <p:ph type="title"/>
+          </p:nvPr>
+        </p:nvSpPr>
+        <p:spPr/>
+        <p:txBody>
+          <a:bodyPr/>
+          <a:lstStyle/>
+          <a:p>
+            <a:r>
+              <a:rPr lang="fr-FR" dirty="0" smtClean="0"/>
+              <a:t>Démarche de développement</a:t>
+            </a:r>
+            <a:br>
+              <a:rPr lang="fr-FR" dirty="0" smtClean="0"/>
+            </a:br>
+            <a:endParaRPr lang="fr-FR" dirty="0"/>
+          </a:p>
+        </p:txBody>
+      </p:sp>
+      <p:sp>
+        <p:nvSpPr>
+          <p:cNvPr id="3" name="Content Placeholder 2"/>
+          <p:cNvSpPr>
+            <a:spLocks noGrp="1"/>
+          </p:cNvSpPr>
+          <p:nvPr>
+            <p:ph idx="1"/>
+          </p:nvPr>
+        </p:nvSpPr>
+        <p:spPr/>
+        <p:txBody>
+          <a:bodyPr/>
+          <a:lstStyle/>
+          <a:p>
+            <a:r>
+              <a:rPr lang="fr-FR" dirty="0" smtClean="0"/>
+              <a:t>Cahier des Charges</a:t>
+            </a:r>
+          </a:p>
+          <a:p>
+            <a:pPr lvl="1"/>
+            <a:r>
+              <a:rPr lang="fr-FR" dirty="0" smtClean="0"/>
+              <a:t>Portage du noyau Linux/uClinux </a:t>
+            </a:r>
+            <a:endParaRPr lang="fr-FR" dirty="0" smtClean="0"/>
+          </a:p>
+          <a:p>
+            <a:pPr lvl="1"/>
+            <a:r>
+              <a:rPr lang="fr-FR" dirty="0" smtClean="0"/>
+              <a:t>Carte réalisable (moyens financiers, connaissances, temps de travail)</a:t>
+            </a:r>
+          </a:p>
+          <a:p>
+            <a:pPr lvl="1"/>
+            <a:r>
+              <a:rPr lang="fr-FR" dirty="0" smtClean="0"/>
+              <a:t>Périphériques IHM et M2M</a:t>
+            </a:r>
+          </a:p>
+          <a:p>
+            <a:pPr marL="457200" lvl="1" indent="0">
+              <a:buNone/>
+            </a:pPr>
+            <a:endParaRPr lang="fr-FR" dirty="0"/>
+          </a:p>
+        </p:txBody>
+      </p:sp>
+    </p:spTree>
+    <p:extLst>
+      <p:ext uri="{BB962C8B-B14F-4D97-AF65-F5344CB8AC3E}">
+        <p14:creationId xmlns:p14="http://schemas.microsoft.com/office/powerpoint/2010/main" val="3338568253"/>
+      </p:ext>
+    </p:extLst>
+  </p:cSld>
+  <p:clrMapOvr>
+    <a:masterClrMapping/>
+  </p:clrMapOvr>
+  <p:timing>
+    <p:tnLst>
+      <p:par>
+        <p:cTn id="1" dur="indefinite" restart="never" nodeType="tmRoot"/>
+      </p:par>
+    </p:tnLst>
+  </p:timing>
+</p:sld>
+</file>
+
+<file path=ppt/slides/slide5.xml><?xml version="1.0" encoding="utf-8"?>
+<p:sld xmlns:a="http://schemas.openxmlformats.org/drawingml/2006/main" xmlns:r="http://schemas.openxmlformats.org/officeDocument/2006/relationships" xmlns:p="http://schemas.openxmlformats.org/presentationml/2006/main">
+  <p:cSld>
+    <p:spTree>
+      <p:nvGrpSpPr>
+        <p:cNvPr id="1" name=""/>
+        <p:cNvGrpSpPr/>
+        <p:nvPr/>
+      </p:nvGrpSpPr>
+      <p:grpSpPr>
+        <a:xfrm>
+          <a:off x="0" y="0"/>
+          <a:ext cx="0" cy="0"/>
+          <a:chOff x="0" y="0"/>
+          <a:chExt cx="0" cy="0"/>
+        </a:xfrm>
+      </p:grpSpPr>
+      <p:sp>
+        <p:nvSpPr>
+          <p:cNvPr id="2" name="Title 1"/>
+          <p:cNvSpPr>
+            <a:spLocks noGrp="1"/>
+          </p:cNvSpPr>
+          <p:nvPr>
+            <p:ph type="title"/>
+          </p:nvPr>
+        </p:nvSpPr>
+        <p:spPr/>
+        <p:txBody>
+          <a:bodyPr/>
+          <a:lstStyle/>
+          <a:p>
+            <a:r>
+              <a:rPr lang="fr-FR" dirty="0" smtClean="0"/>
+              <a:t>Démarche de développement</a:t>
+            </a:r>
+            <a:br>
+              <a:rPr lang="fr-FR" dirty="0" smtClean="0"/>
+            </a:br>
+            <a:endParaRPr lang="fr-FR" dirty="0"/>
+          </a:p>
+        </p:txBody>
+      </p:sp>
+      <p:sp>
+        <p:nvSpPr>
+          <p:cNvPr id="3" name="Content Placeholder 2"/>
+          <p:cNvSpPr>
+            <a:spLocks noGrp="1"/>
+          </p:cNvSpPr>
+          <p:nvPr>
+            <p:ph idx="1"/>
+          </p:nvPr>
+        </p:nvSpPr>
+        <p:spPr/>
+        <p:txBody>
+          <a:bodyPr/>
+          <a:lstStyle/>
+          <a:p>
+            <a:r>
+              <a:rPr lang="fr-FR" dirty="0" smtClean="0"/>
+              <a:t>Choix techniques</a:t>
+            </a:r>
+          </a:p>
+          <a:p>
+            <a:pPr lvl="1"/>
+            <a:r>
+              <a:rPr lang="fr-FR" dirty="0" smtClean="0"/>
+              <a:t>Microcontrôleur (prix de la carte et difficulté de mise en œuvre/</a:t>
+            </a:r>
+            <a:r>
+              <a:rPr lang="fr-FR" dirty="0" err="1" smtClean="0"/>
+              <a:t>debug</a:t>
+            </a:r>
+            <a:r>
+              <a:rPr lang="fr-FR" dirty="0" smtClean="0"/>
+              <a:t>)</a:t>
+            </a:r>
+          </a:p>
+          <a:p>
+            <a:pPr lvl="1"/>
+            <a:r>
+              <a:rPr lang="fr-FR" dirty="0" smtClean="0"/>
+              <a:t>LCD</a:t>
+            </a:r>
+          </a:p>
+          <a:p>
+            <a:pPr lvl="1"/>
+            <a:r>
+              <a:rPr lang="fr-FR" dirty="0" smtClean="0"/>
+              <a:t>USB</a:t>
+            </a:r>
+          </a:p>
+          <a:p>
+            <a:pPr lvl="1"/>
+            <a:r>
+              <a:rPr lang="fr-FR" dirty="0" smtClean="0"/>
+              <a:t>UART</a:t>
+            </a:r>
+          </a:p>
+          <a:p>
+            <a:pPr lvl="1"/>
+            <a:r>
+              <a:rPr lang="fr-FR" dirty="0" smtClean="0"/>
+              <a:t>GPIO</a:t>
+            </a:r>
+          </a:p>
+          <a:p>
+            <a:pPr lvl="1"/>
+            <a:endParaRPr lang="fr-FR" dirty="0" smtClean="0"/>
+          </a:p>
+          <a:p>
+            <a:pPr marL="457200" lvl="1" indent="0">
+              <a:buNone/>
+            </a:pPr>
+            <a:endParaRPr lang="fr-FR" dirty="0"/>
+          </a:p>
+        </p:txBody>
+      </p:sp>
+    </p:spTree>
+    <p:extLst>
+      <p:ext uri="{BB962C8B-B14F-4D97-AF65-F5344CB8AC3E}">
+        <p14:creationId xmlns:p14="http://schemas.microsoft.com/office/powerpoint/2010/main" val="1747106552"/>
+      </p:ext>
+    </p:extLst>
+  </p:cSld>
+  <p:clrMapOvr>
+    <a:masterClrMapping/>
+  </p:clrMapOvr>
+  <p:timing>
+    <p:tnLst>
+      <p:par>
+        <p:cTn id="1" dur="indefinite" restart="never" nodeType="tmRoot"/>
+      </p:par>
+    </p:tnLst>
+  </p:timing>
+</p:sld>
+</file>
+
+<file path=ppt/slides/slide6.xml><?xml version="1.0" encoding="utf-8"?>
+<p:sld xmlns:a="http://schemas.openxmlformats.org/drawingml/2006/main" xmlns:r="http://schemas.openxmlformats.org/officeDocument/2006/relationships" xmlns:p="http://schemas.openxmlformats.org/presentationml/2006/main">
+  <p:cSld>
+    <p:spTree>
+      <p:nvGrpSpPr>
+        <p:cNvPr id="1" name=""/>
+        <p:cNvGrpSpPr/>
+        <p:nvPr/>
+      </p:nvGrpSpPr>
+      <p:grpSpPr>
+        <a:xfrm>
+          <a:off x="0" y="0"/>
+          <a:ext cx="0" cy="0"/>
+          <a:chOff x="0" y="0"/>
+          <a:chExt cx="0" cy="0"/>
+        </a:xfrm>
+      </p:grpSpPr>
+      <p:sp>
+        <p:nvSpPr>
+          <p:cNvPr id="2" name="Title 1"/>
+          <p:cNvSpPr>
+            <a:spLocks noGrp="1"/>
+          </p:cNvSpPr>
+          <p:nvPr>
+            <p:ph type="title"/>
+          </p:nvPr>
+        </p:nvSpPr>
+        <p:spPr/>
+        <p:txBody>
+          <a:bodyPr/>
+          <a:lstStyle/>
+          <a:p>
+            <a:r>
+              <a:rPr lang="fr-FR" dirty="0" smtClean="0"/>
+              <a:t>Démarche de développement</a:t>
+            </a:r>
+            <a:br>
+              <a:rPr lang="fr-FR" dirty="0" smtClean="0"/>
+            </a:br>
+            <a:endParaRPr lang="fr-FR" dirty="0"/>
+          </a:p>
+        </p:txBody>
+      </p:sp>
+      <p:sp>
+        <p:nvSpPr>
+          <p:cNvPr id="3" name="Content Placeholder 2"/>
+          <p:cNvSpPr>
+            <a:spLocks noGrp="1"/>
+          </p:cNvSpPr>
+          <p:nvPr>
+            <p:ph idx="1"/>
+          </p:nvPr>
+        </p:nvSpPr>
+        <p:spPr/>
+        <p:txBody>
+          <a:bodyPr/>
+          <a:lstStyle/>
+          <a:p>
+            <a:r>
+              <a:rPr lang="fr-FR" dirty="0" smtClean="0"/>
+              <a:t>Choix des composants</a:t>
+            </a:r>
+          </a:p>
+          <a:p>
+            <a:pPr lvl="1"/>
+            <a:r>
+              <a:rPr lang="fr-FR" dirty="0" smtClean="0"/>
+              <a:t>SMT32F429ZI</a:t>
+            </a:r>
+          </a:p>
+          <a:p>
+            <a:pPr lvl="1"/>
+            <a:r>
+              <a:rPr lang="fr-FR" dirty="0" smtClean="0"/>
+              <a:t>LCD: écran New </a:t>
+            </a:r>
+            <a:r>
+              <a:rPr lang="fr-FR" dirty="0" err="1" smtClean="0"/>
+              <a:t>Haven</a:t>
+            </a:r>
+            <a:r>
+              <a:rPr lang="fr-FR" smtClean="0"/>
+              <a:t> Display </a:t>
+            </a:r>
+            <a:r>
+              <a:rPr lang="fr-FR" dirty="0" smtClean="0"/>
+              <a:t>récupéré avec driver </a:t>
+            </a:r>
+            <a:r>
+              <a:rPr lang="fr-FR" dirty="0" err="1" smtClean="0"/>
+              <a:t>Orise</a:t>
+            </a:r>
+            <a:endParaRPr lang="fr-FR" dirty="0" smtClean="0"/>
+          </a:p>
+          <a:p>
+            <a:pPr lvl="1"/>
+            <a:r>
+              <a:rPr lang="fr-FR" dirty="0" smtClean="0"/>
+              <a:t>USB: PHY intégré au STM32F429</a:t>
+            </a:r>
+          </a:p>
+          <a:p>
+            <a:pPr lvl="1"/>
+            <a:r>
+              <a:rPr lang="fr-FR" dirty="0" smtClean="0"/>
+              <a:t>UART</a:t>
+            </a:r>
+          </a:p>
+          <a:p>
+            <a:pPr lvl="1"/>
+            <a:r>
+              <a:rPr lang="fr-FR" dirty="0" smtClean="0"/>
+              <a:t>GPIO</a:t>
+            </a:r>
+          </a:p>
+          <a:p>
+            <a:pPr lvl="1"/>
+            <a:endParaRPr lang="fr-FR" dirty="0" smtClean="0"/>
+          </a:p>
+          <a:p>
+            <a:pPr marL="457200" lvl="1" indent="0">
+              <a:buNone/>
+            </a:pPr>
+            <a:endParaRPr lang="fr-FR" dirty="0"/>
+          </a:p>
+        </p:txBody>
+      </p:sp>
+    </p:spTree>
+    <p:extLst>
+      <p:ext uri="{BB962C8B-B14F-4D97-AF65-F5344CB8AC3E}">
+        <p14:creationId xmlns:p14="http://schemas.microsoft.com/office/powerpoint/2010/main" val="903325845"/>
+      </p:ext>
+    </p:extLst>
+  </p:cSld>
+  <p:clrMapOvr>
+    <a:masterClrMapping/>
+  </p:clrMapOvr>
+  <p:timing>
+    <p:tnLst>
+      <p:par>
+        <p:cTn id="1" dur="indefinite" restart="never" nodeType="tmRoot"/>
+      </p:par>
+    </p:tnLst>
+  </p:timing>
+</p:sld>
+</file>
+
+<file path=ppt/slides/slide7.xml><?xml version="1.0" encoding="utf-8"?>
+<p:sld xmlns:a="http://schemas.openxmlformats.org/drawingml/2006/main" xmlns:r="http://schemas.openxmlformats.org/officeDocument/2006/relationships" xmlns:p="http://schemas.openxmlformats.org/presentationml/2006/main">
+  <p:cSld>
+    <p:spTree>
+      <p:nvGrpSpPr>
+        <p:cNvPr id="1" name=""/>
+        <p:cNvGrpSpPr/>
+        <p:nvPr/>
+      </p:nvGrpSpPr>
+      <p:grpSpPr>
+        <a:xfrm>
+          <a:off x="0" y="0"/>
+          <a:ext cx="0" cy="0"/>
+          <a:chOff x="0" y="0"/>
+          <a:chExt cx="0" cy="0"/>
+        </a:xfrm>
+      </p:grpSpPr>
+      <p:sp>
+        <p:nvSpPr>
+          <p:cNvPr id="2" name="Title 1"/>
+          <p:cNvSpPr>
+            <a:spLocks noGrp="1"/>
+          </p:cNvSpPr>
+          <p:nvPr>
+            <p:ph type="title"/>
+          </p:nvPr>
+        </p:nvSpPr>
+        <p:spPr/>
+        <p:txBody>
+          <a:bodyPr/>
+          <a:lstStyle/>
+          <a:p>
+            <a:r>
+              <a:rPr lang="fr-FR" dirty="0" smtClean="0"/>
+              <a:t>Démarche de développement</a:t>
+            </a:r>
+            <a:br>
+              <a:rPr lang="fr-FR" dirty="0" smtClean="0"/>
+            </a:br>
+            <a:endParaRPr lang="fr-FR" dirty="0"/>
+          </a:p>
+        </p:txBody>
+      </p:sp>
+      <p:sp>
+        <p:nvSpPr>
+          <p:cNvPr id="3" name="Content Placeholder 2"/>
+          <p:cNvSpPr>
+            <a:spLocks noGrp="1"/>
+          </p:cNvSpPr>
+          <p:nvPr>
+            <p:ph idx="1"/>
+          </p:nvPr>
+        </p:nvSpPr>
+        <p:spPr>
+          <a:xfrm>
+            <a:off x="457200" y="1981200"/>
+            <a:ext cx="8229600" cy="2239888"/>
+          </a:xfrm>
+        </p:spPr>
+        <p:txBody>
+          <a:bodyPr/>
+          <a:lstStyle/>
+          <a:p>
+            <a:r>
+              <a:rPr lang="fr-FR" dirty="0" smtClean="0"/>
+              <a:t>Implantation de la carte</a:t>
+            </a:r>
+          </a:p>
+          <a:p>
+            <a:pPr lvl="1"/>
+            <a:r>
+              <a:rPr lang="fr-FR" dirty="0" smtClean="0"/>
+              <a:t>Schémas: </a:t>
+            </a:r>
+            <a:r>
+              <a:rPr lang="fr-FR" dirty="0" smtClean="0"/>
+              <a:t>Altium</a:t>
+            </a:r>
+          </a:p>
+          <a:p>
+            <a:pPr lvl="1"/>
+            <a:r>
+              <a:rPr lang="fr-FR" dirty="0" smtClean="0"/>
+              <a:t>Construction du firmware: uClinux, U-Boot, </a:t>
+            </a:r>
+            <a:r>
+              <a:rPr lang="fr-FR" dirty="0" err="1" smtClean="0"/>
+              <a:t>BusyBox</a:t>
+            </a:r>
+            <a:endParaRPr lang="fr-FR" dirty="0"/>
+          </a:p>
+        </p:txBody>
+      </p:sp>
+      <p:sp>
+        <p:nvSpPr>
+          <p:cNvPr id="4" name="Content Placeholder 2"/>
+          <p:cNvSpPr txBox="1">
+            <a:spLocks/>
+          </p:cNvSpPr>
+          <p:nvPr/>
+        </p:nvSpPr>
+        <p:spPr bwMode="auto">
+          <a:xfrm>
+            <a:off x="590736" y="4436233"/>
+            <a:ext cx="8229600" cy="864975"/>
+          </a:xfrm>
+          <a:prstGeom prst="rect">
+            <a:avLst/>
+          </a:prstGeom>
+          <a:noFill/>
+          <a:ln>
+            <a:noFill/>
+          </a:ln>
+          <a:effectLst/>
+          <a:extLst>
+            <a:ext uri="{909E8E84-426E-40DD-AFC4-6F175D3DCCD1}">
+              <a14:hiddenFill xmlns:a14="http://schemas.microsoft.com/office/drawing/2010/main">
+                <a:solidFill>
+                  <a:schemeClr val="accent1"/>
+                </a:solidFill>
+              </a14:hiddenFill>
+            </a:ext>
+            <a:ext uri="{91240B29-F687-4F45-9708-019B960494DF}">
+              <a14:hiddenLine xmlns:a14="http://schemas.microsoft.com/office/drawing/2010/main" w="9525">
+                <a:solidFill>
+                  <a:schemeClr val="tx1"/>
+                </a:solidFill>
+                <a:miter lim="800000"/>
+                <a:headEnd/>
+                <a:tailEnd/>
+              </a14:hiddenLine>
+            </a:ext>
+            <a:ext uri="{AF507438-7753-43E0-B8FC-AC1667EBCBE1}">
+              <a14:hiddenEffects xmlns:a14="http://schemas.microsoft.com/office/drawing/2010/main">
+                <a:effectLst>
+                  <a:outerShdw dist="35921" dir="2700000" algn="ctr" rotWithShape="0">
+                    <a:schemeClr val="bg2"/>
+                  </a:outerShdw>
+                </a:effectLst>
+              </a14:hiddenEffects>
+            </a:ext>
+          </a:extLst>
+        </p:spPr>
+        <p:txBody>
+          <a:bodyPr vert="horz" wrap="square" lIns="91440" tIns="45720" rIns="91440" bIns="45720" numCol="1" anchor="t" anchorCtr="0" compatLnSpc="1">
+            <a:prstTxWarp prst="textNoShape">
+              <a:avLst/>
+            </a:prstTxWarp>
+          </a:bodyPr>
+          <a:lstStyle>
+            <a:lvl1pPr marL="342900" indent="-342900" algn="l" rtl="0" eaLnBrk="1" fontAlgn="base" hangingPunct="1">
+              <a:spcBef>
+                <a:spcPct val="20000"/>
+              </a:spcBef>
+              <a:spcAft>
+                <a:spcPct val="0"/>
+              </a:spcAft>
+              <a:buClr>
+                <a:schemeClr val="bg2"/>
+              </a:buClr>
+              <a:buSzPct val="75000"/>
+              <a:buFont typeface="Wingdings" pitchFamily="2" charset="2"/>
+              <a:buChar char="n"/>
+              <a:defRPr sz="3200">
+                <a:solidFill>
+                  <a:schemeClr val="tx1"/>
+                </a:solidFill>
+                <a:latin typeface="+mn-lt"/>
+                <a:ea typeface="+mn-ea"/>
+                <a:cs typeface="+mn-cs"/>
+              </a:defRPr>
+            </a:lvl1pPr>
+            <a:lvl2pPr marL="742950" indent="-285750" algn="l" rtl="0" eaLnBrk="1" fontAlgn="base" hangingPunct="1">
+              <a:spcBef>
+                <a:spcPct val="20000"/>
+              </a:spcBef>
+              <a:spcAft>
+                <a:spcPct val="0"/>
+              </a:spcAft>
+              <a:buClr>
+                <a:schemeClr val="accent2"/>
+              </a:buClr>
+              <a:buSzPct val="80000"/>
+              <a:buFont typeface="Wingdings" pitchFamily="2" charset="2"/>
+              <a:buChar char="¨"/>
+              <a:defRPr sz="2800">
+                <a:solidFill>
+                  <a:schemeClr val="tx1"/>
+                </a:solidFill>
+                <a:latin typeface="+mn-lt"/>
+              </a:defRPr>
+            </a:lvl2pPr>
+            <a:lvl3pPr marL="1143000" indent="-228600" algn="l" rtl="0" eaLnBrk="1" fontAlgn="base" hangingPunct="1">
+              <a:spcBef>
+                <a:spcPct val="20000"/>
+              </a:spcBef>
+              <a:spcAft>
+                <a:spcPct val="0"/>
+              </a:spcAft>
+              <a:buClr>
+                <a:schemeClr val="bg2"/>
+              </a:buClr>
+              <a:buSzPct val="65000"/>
+              <a:buFont typeface="Wingdings" pitchFamily="2" charset="2"/>
+              <a:buChar char="n"/>
+              <a:defRPr sz="2400">
+                <a:solidFill>
+                  <a:schemeClr val="tx1"/>
+                </a:solidFill>
+                <a:latin typeface="+mn-lt"/>
+              </a:defRPr>
+            </a:lvl3pPr>
+            <a:lvl4pPr marL="1600200" indent="-228600" algn="l" rtl="0" eaLnBrk="1" fontAlgn="base" hangingPunct="1">
+              <a:spcBef>
+                <a:spcPct val="20000"/>
+              </a:spcBef>
+              <a:spcAft>
+                <a:spcPct val="0"/>
+              </a:spcAft>
+              <a:buClr>
+                <a:schemeClr val="accent2"/>
+              </a:buClr>
+              <a:buSzPct val="70000"/>
+              <a:buFont typeface="Wingdings" pitchFamily="2" charset="2"/>
+              <a:buChar char="¨"/>
+              <a:defRPr sz="2000">
+                <a:solidFill>
+                  <a:schemeClr val="tx1"/>
+                </a:solidFill>
+                <a:latin typeface="+mn-lt"/>
+              </a:defRPr>
+            </a:lvl4pPr>
+            <a:lvl5pPr marL="2057400" indent="-228600" algn="l" rtl="0" eaLnBrk="1" fontAlgn="base" hangingPunct="1">
+              <a:spcBef>
+                <a:spcPct val="20000"/>
+              </a:spcBef>
+              <a:spcAft>
+                <a:spcPct val="0"/>
+              </a:spcAft>
+              <a:buClr>
+                <a:schemeClr val="bg2"/>
+              </a:buClr>
+              <a:buFont typeface="Wingdings" pitchFamily="2" charset="2"/>
+              <a:buChar char="§"/>
+              <a:defRPr sz="2000">
+                <a:solidFill>
+                  <a:schemeClr val="tx1"/>
+                </a:solidFill>
+                <a:latin typeface="+mn-lt"/>
+              </a:defRPr>
+            </a:lvl5pPr>
+            <a:lvl6pPr marL="2514600" indent="-228600" algn="l" rtl="0" eaLnBrk="1" fontAlgn="base" hangingPunct="1">
+              <a:spcBef>
+                <a:spcPct val="20000"/>
+              </a:spcBef>
+              <a:spcAft>
+                <a:spcPct val="0"/>
+              </a:spcAft>
+              <a:buClr>
+                <a:schemeClr val="bg2"/>
+              </a:buClr>
+              <a:buFont typeface="Wingdings" pitchFamily="2" charset="2"/>
+              <a:buChar char="§"/>
+              <a:defRPr sz="2000">
+                <a:solidFill>
+                  <a:schemeClr val="tx1"/>
+                </a:solidFill>
+                <a:latin typeface="+mn-lt"/>
+              </a:defRPr>
+            </a:lvl6pPr>
+            <a:lvl7pPr marL="2971800" indent="-228600" algn="l" rtl="0" eaLnBrk="1" fontAlgn="base" hangingPunct="1">
+              <a:spcBef>
+                <a:spcPct val="20000"/>
+              </a:spcBef>
+              <a:spcAft>
+                <a:spcPct val="0"/>
+              </a:spcAft>
+              <a:buClr>
+                <a:schemeClr val="bg2"/>
+              </a:buClr>
+              <a:buFont typeface="Wingdings" pitchFamily="2" charset="2"/>
+              <a:buChar char="§"/>
+              <a:defRPr sz="2000">
+                <a:solidFill>
+                  <a:schemeClr val="tx1"/>
+                </a:solidFill>
+                <a:latin typeface="+mn-lt"/>
+              </a:defRPr>
+            </a:lvl7pPr>
+            <a:lvl8pPr marL="3429000" indent="-228600" algn="l" rtl="0" eaLnBrk="1" fontAlgn="base" hangingPunct="1">
+              <a:spcBef>
+                <a:spcPct val="20000"/>
+              </a:spcBef>
+              <a:spcAft>
+                <a:spcPct val="0"/>
+              </a:spcAft>
+              <a:buClr>
+                <a:schemeClr val="bg2"/>
+              </a:buClr>
+              <a:buFont typeface="Wingdings" pitchFamily="2" charset="2"/>
+              <a:buChar char="§"/>
+              <a:defRPr sz="2000">
+                <a:solidFill>
+                  <a:schemeClr val="tx1"/>
+                </a:solidFill>
+                <a:latin typeface="+mn-lt"/>
+              </a:defRPr>
+            </a:lvl8pPr>
+            <a:lvl9pPr marL="3886200" indent="-228600" algn="l" rtl="0" eaLnBrk="1" fontAlgn="base" hangingPunct="1">
+              <a:spcBef>
+                <a:spcPct val="20000"/>
+              </a:spcBef>
+              <a:spcAft>
+                <a:spcPct val="0"/>
+              </a:spcAft>
+              <a:buClr>
+                <a:schemeClr val="bg2"/>
+              </a:buClr>
+              <a:buFont typeface="Wingdings" pitchFamily="2" charset="2"/>
+              <a:buChar char="§"/>
+              <a:defRPr sz="2000">
+                <a:solidFill>
+                  <a:schemeClr val="tx1"/>
+                </a:solidFill>
+                <a:latin typeface="+mn-lt"/>
+              </a:defRPr>
+            </a:lvl9pPr>
+          </a:lstStyle>
+          <a:p>
+            <a:pPr marL="0" indent="0" algn="ctr">
+              <a:buNone/>
+            </a:pPr>
+            <a:r>
+              <a:rPr lang="fr-FR" b="1" kern="0" dirty="0" smtClean="0"/>
+              <a:t>Aller retour </a:t>
+            </a:r>
+            <a:r>
+              <a:rPr lang="fr-FR" b="1" kern="0" dirty="0" err="1" smtClean="0"/>
+              <a:t>Hard</a:t>
+            </a:r>
+            <a:r>
+              <a:rPr lang="fr-FR" b="1" kern="0" dirty="0" err="1" smtClean="0">
+                <a:sym typeface="Wingdings" panose="05000000000000000000" pitchFamily="2" charset="2"/>
+              </a:rPr>
+              <a:t>Soft</a:t>
+            </a:r>
+            <a:r>
+              <a:rPr lang="fr-FR" b="1" kern="0" dirty="0" smtClean="0">
+                <a:sym typeface="Wingdings" panose="05000000000000000000" pitchFamily="2" charset="2"/>
+              </a:rPr>
+              <a:t> nécessaires</a:t>
+            </a:r>
+            <a:endParaRPr lang="fr-FR" b="1" kern="0" dirty="0"/>
+          </a:p>
+        </p:txBody>
+      </p:sp>
+    </p:spTree>
+    <p:extLst>
+      <p:ext uri="{BB962C8B-B14F-4D97-AF65-F5344CB8AC3E}">
+        <p14:creationId xmlns:p14="http://schemas.microsoft.com/office/powerpoint/2010/main" val="2403331861"/>
+      </p:ext>
+    </p:extLst>
+  </p:cSld>
+  <p:clrMapOvr>
+    <a:masterClrMapping/>
+  </p:clrMapOvr>
+  <p:timing>
+    <p:tnLst>
+      <p:par>
+        <p:cTn id="1" dur="indefinite" restart="never" nodeType="tmRoot"/>
+      </p:par>
+    </p:tnLst>
+  </p:timing>
+</p:sld>
+</file>
+
+<file path=ppt/slides/slide8.xml><?xml version="1.0" encoding="utf-8"?>
+<p:sld xmlns:a="http://schemas.openxmlformats.org/drawingml/2006/main" xmlns:r="http://schemas.openxmlformats.org/officeDocument/2006/relationships" xmlns:p="http://schemas.openxmlformats.org/presentationml/2006/main">
+  <p:cSld>
+    <p:spTree>
+      <p:nvGrpSpPr>
+        <p:cNvPr id="1" name=""/>
+        <p:cNvGrpSpPr/>
+        <p:nvPr/>
+      </p:nvGrpSpPr>
+      <p:grpSpPr>
+        <a:xfrm>
+          <a:off x="0" y="0"/>
+          <a:ext cx="0" cy="0"/>
+          <a:chOff x="0" y="0"/>
+          <a:chExt cx="0" cy="0"/>
+        </a:xfrm>
+      </p:grpSpPr>
+      <p:sp>
+        <p:nvSpPr>
+          <p:cNvPr id="2" name="Title 1"/>
+          <p:cNvSpPr>
+            <a:spLocks noGrp="1"/>
+          </p:cNvSpPr>
+          <p:nvPr>
+            <p:ph type="title"/>
+          </p:nvPr>
+        </p:nvSpPr>
+        <p:spPr/>
+        <p:txBody>
+          <a:bodyPr/>
+          <a:lstStyle/>
+          <a:p>
+            <a:r>
+              <a:rPr lang="fr-FR" dirty="0" smtClean="0"/>
+              <a:t>Démarche de développement</a:t>
+            </a:r>
+            <a:br>
+              <a:rPr lang="fr-FR" dirty="0" smtClean="0"/>
+            </a:br>
+            <a:endParaRPr lang="fr-FR" dirty="0"/>
+          </a:p>
+        </p:txBody>
+      </p:sp>
+      <p:sp>
+        <p:nvSpPr>
+          <p:cNvPr id="3" name="Content Placeholder 2"/>
+          <p:cNvSpPr>
+            <a:spLocks noGrp="1"/>
+          </p:cNvSpPr>
+          <p:nvPr>
+            <p:ph idx="1"/>
+          </p:nvPr>
+        </p:nvSpPr>
+        <p:spPr>
+          <a:xfrm>
+            <a:off x="457200" y="1981200"/>
+            <a:ext cx="8229600" cy="2239888"/>
+          </a:xfrm>
+        </p:spPr>
+        <p:txBody>
+          <a:bodyPr/>
+          <a:lstStyle/>
+          <a:p>
+            <a:r>
+              <a:rPr lang="fr-FR" dirty="0" smtClean="0"/>
+              <a:t>Tests</a:t>
+            </a:r>
+          </a:p>
+          <a:p>
+            <a:pPr lvl="1"/>
+            <a:r>
+              <a:rPr lang="fr-FR" dirty="0" smtClean="0"/>
+              <a:t>Hard: alimentations, </a:t>
+            </a:r>
+            <a:r>
+              <a:rPr lang="fr-FR" dirty="0" err="1" smtClean="0"/>
+              <a:t>court-circuits</a:t>
+            </a:r>
+            <a:endParaRPr lang="fr-FR" dirty="0" smtClean="0"/>
+          </a:p>
+          <a:p>
+            <a:pPr lvl="1"/>
+            <a:r>
+              <a:rPr lang="fr-FR" dirty="0" smtClean="0"/>
+              <a:t>Soft: mémoires (U-Boot, OpenOCD)</a:t>
+            </a:r>
+            <a:endParaRPr lang="fr-FR" dirty="0"/>
+          </a:p>
+        </p:txBody>
+      </p:sp>
+    </p:spTree>
+    <p:extLst>
+      <p:ext uri="{BB962C8B-B14F-4D97-AF65-F5344CB8AC3E}">
+        <p14:creationId xmlns:p14="http://schemas.microsoft.com/office/powerpoint/2010/main" val="854690931"/>
+      </p:ext>
+    </p:extLst>
+  </p:cSld>
+  <p:clrMapOvr>
+    <a:masterClrMapping/>
+  </p:clrMapOvr>
+  <p:timing>
+    <p:tnLst>
+      <p:par>
+        <p:cTn id="1" dur="indefinite" restart="never" nodeType="tmRoot"/>
+      </p:par>
+    </p:tnLst>
+  </p:timing>
+</p:sld>
+</file>
+
+<file path=ppt/slides/slide9.xml><?xml version="1.0" encoding="utf-8"?>
+<p:sld xmlns:a="http://schemas.openxmlformats.org/drawingml/2006/main" xmlns:r="http://schemas.openxmlformats.org/officeDocument/2006/relationships" xmlns:p="http://schemas.openxmlformats.org/presentationml/2006/main">
+  <p:cSld>
+    <p:spTree>
+      <p:nvGrpSpPr>
+        <p:cNvPr id="1" name=""/>
+        <p:cNvGrpSpPr/>
+        <p:nvPr/>
+      </p:nvGrpSpPr>
+      <p:grpSpPr>
+        <a:xfrm>
+          <a:off x="0" y="0"/>
+          <a:ext cx="0" cy="0"/>
+          <a:chOff x="0" y="0"/>
+          <a:chExt cx="0" cy="0"/>
+        </a:xfrm>
+      </p:grpSpPr>
+      <p:sp>
+        <p:nvSpPr>
+          <p:cNvPr id="2" name="Title 1"/>
+          <p:cNvSpPr>
+            <a:spLocks noGrp="1"/>
+          </p:cNvSpPr>
+          <p:nvPr>
+            <p:ph type="title"/>
+          </p:nvPr>
+        </p:nvSpPr>
+        <p:spPr/>
+        <p:txBody>
+          <a:bodyPr/>
+          <a:lstStyle/>
+          <a:p>
+            <a:r>
+              <a:rPr lang="fr-FR" dirty="0" smtClean="0"/>
+              <a:t>Démarche de développement</a:t>
+            </a:r>
+            <a:br>
+              <a:rPr lang="fr-FR" dirty="0" smtClean="0"/>
+            </a:br>
+            <a:endParaRPr lang="fr-FR" dirty="0"/>
+          </a:p>
+        </p:txBody>
+      </p:sp>
+      <p:sp>
+        <p:nvSpPr>
+          <p:cNvPr id="3" name="Content Placeholder 2"/>
+          <p:cNvSpPr>
+            <a:spLocks noGrp="1"/>
+          </p:cNvSpPr>
+          <p:nvPr>
+            <p:ph idx="1"/>
+          </p:nvPr>
+        </p:nvSpPr>
+        <p:spPr>
+          <a:xfrm>
+            <a:off x="457200" y="1981200"/>
+            <a:ext cx="8229600" cy="2239888"/>
+          </a:xfrm>
+        </p:spPr>
+        <p:txBody>
+          <a:bodyPr/>
+          <a:lstStyle/>
+          <a:p>
+            <a:r>
+              <a:rPr lang="fr-FR" dirty="0" smtClean="0"/>
+              <a:t>Pour aller plus loin</a:t>
+            </a:r>
+          </a:p>
+          <a:p>
+            <a:pPr lvl="1"/>
+            <a:r>
+              <a:rPr lang="fr-FR" dirty="0" smtClean="0"/>
+              <a:t>Création d’un application avec notre carte</a:t>
+            </a:r>
+          </a:p>
+          <a:p>
+            <a:pPr lvl="1"/>
+            <a:endParaRPr lang="fr-FR" dirty="0"/>
+          </a:p>
+          <a:p>
+            <a:pPr marL="0" indent="0">
+              <a:buNone/>
+            </a:pPr>
+            <a:endParaRPr lang="fr-FR" dirty="0"/>
+          </a:p>
+        </p:txBody>
+      </p:sp>
+      <p:sp>
+        <p:nvSpPr>
+          <p:cNvPr id="5" name="Right Arrow 4"/>
+          <p:cNvSpPr/>
+          <p:nvPr/>
+        </p:nvSpPr>
+        <p:spPr bwMode="auto">
+          <a:xfrm>
+            <a:off x="1007210" y="4034147"/>
+            <a:ext cx="978408" cy="484632"/>
+          </a:xfrm>
+          <a:prstGeom prst="rightArrow">
+            <a:avLst/>
+          </a:prstGeom>
+          <a:solidFill>
+            <a:schemeClr val="accent1"/>
+          </a:solidFill>
+          <a:ln w="9525" cap="flat" cmpd="sng" algn="ctr">
+            <a:solidFill>
+              <a:schemeClr val="tx1"/>
+            </a:solidFill>
+            <a:prstDash val="solid"/>
+            <a:round/>
+            <a:headEnd type="none" w="med" len="med"/>
+            <a:tailEnd type="none" w="med" len="med"/>
+          </a:ln>
+          <a:effectLst/>
+          <a:extLst>
+            <a:ext uri="{AF507438-7753-43E0-B8FC-AC1667EBCBE1}">
+              <a14:hiddenEffects xmlns:a14="http://schemas.microsoft.com/office/drawing/2010/main">
+                <a:effectLst>
+                  <a:outerShdw dist="35921" dir="2700000" algn="ctr" rotWithShape="0">
+                    <a:schemeClr val="bg2"/>
+                  </a:outerShdw>
+                </a:effectLst>
+              </a14:hiddenEffects>
+            </a:ext>
+          </a:extLst>
+        </p:spPr>
+        <p:txBody>
+          <a:bodyPr vert="horz" wrap="square" lIns="91440" tIns="45720" rIns="91440" bIns="45720" numCol="1" rtlCol="0" anchor="t" anchorCtr="0" compatLnSpc="1">
+            <a:prstTxWarp prst="textNoShape">
+              <a:avLst/>
+            </a:prstTxWarp>
+          </a:bodyPr>
+          <a:lstStyle/>
+          <a:p>
+            <a:pPr marL="0" marR="0" indent="0" algn="l" defTabSz="914400" rtl="0" eaLnBrk="0" fontAlgn="base" latinLnBrk="0" hangingPunct="0">
+              <a:lnSpc>
+                <a:spcPct val="100000"/>
+              </a:lnSpc>
+              <a:spcBef>
+                <a:spcPct val="0"/>
+              </a:spcBef>
+              <a:spcAft>
+                <a:spcPct val="0"/>
+              </a:spcAft>
+              <a:buClrTx/>
+              <a:buSzTx/>
+              <a:buFontTx/>
+              <a:buNone/>
+              <a:tabLst/>
+            </a:pPr>
+            <a:endParaRPr kumimoji="0" lang="fr-FR" sz="1800" b="0" i="0" u="none" strike="noStrike" cap="none" normalizeH="0" baseline="0" smtClean="0">
+              <a:ln>
+                <a:noFill/>
+              </a:ln>
+              <a:solidFill>
+                <a:schemeClr val="tx1"/>
+              </a:solidFill>
+              <a:effectLst/>
+              <a:latin typeface="Arial" charset="0"/>
+            </a:endParaRPr>
+          </a:p>
+        </p:txBody>
+      </p:sp>
+      <p:sp>
+        <p:nvSpPr>
+          <p:cNvPr id="6" name="Content Placeholder 2"/>
+          <p:cNvSpPr txBox="1">
+            <a:spLocks/>
+          </p:cNvSpPr>
+          <p:nvPr/>
+        </p:nvSpPr>
+        <p:spPr bwMode="auto">
+          <a:xfrm>
+            <a:off x="1589968" y="3933056"/>
+            <a:ext cx="5631476" cy="686814"/>
+          </a:xfrm>
+          <a:prstGeom prst="rect">
+            <a:avLst/>
+          </a:prstGeom>
+          <a:noFill/>
+          <a:ln>
+            <a:noFill/>
+          </a:ln>
+          <a:effectLst/>
+          <a:extLst>
+            <a:ext uri="{909E8E84-426E-40DD-AFC4-6F175D3DCCD1}">
+              <a14:hiddenFill xmlns:a14="http://schemas.microsoft.com/office/drawing/2010/main">
+                <a:solidFill>
+                  <a:schemeClr val="accent1"/>
+                </a:solidFill>
+              </a14:hiddenFill>
+            </a:ext>
+            <a:ext uri="{91240B29-F687-4F45-9708-019B960494DF}">
+              <a14:hiddenLine xmlns:a14="http://schemas.microsoft.com/office/drawing/2010/main" w="9525">
+                <a:solidFill>
+                  <a:schemeClr val="tx1"/>
+                </a:solidFill>
+                <a:miter lim="800000"/>
+                <a:headEnd/>
+                <a:tailEnd/>
+              </a14:hiddenLine>
+            </a:ext>
+            <a:ext uri="{AF507438-7753-43E0-B8FC-AC1667EBCBE1}">
+              <a14:hiddenEffects xmlns:a14="http://schemas.microsoft.com/office/drawing/2010/main">
+                <a:effectLst>
+                  <a:outerShdw dist="35921" dir="2700000" algn="ctr" rotWithShape="0">
+                    <a:schemeClr val="bg2"/>
+                  </a:outerShdw>
+                </a:effectLst>
+              </a14:hiddenEffects>
+            </a:ext>
+          </a:extLst>
+        </p:spPr>
+        <p:txBody>
+          <a:bodyPr vert="horz" wrap="square" lIns="91440" tIns="45720" rIns="91440" bIns="45720" numCol="1" anchor="t" anchorCtr="0" compatLnSpc="1">
+            <a:prstTxWarp prst="textNoShape">
+              <a:avLst/>
+            </a:prstTxWarp>
+          </a:bodyPr>
+          <a:lstStyle>
+            <a:lvl1pPr marL="342900" indent="-342900" algn="l" rtl="0" eaLnBrk="1" fontAlgn="base" hangingPunct="1">
+              <a:spcBef>
+                <a:spcPct val="20000"/>
+              </a:spcBef>
+              <a:spcAft>
+                <a:spcPct val="0"/>
+              </a:spcAft>
+              <a:buClr>
+                <a:schemeClr val="bg2"/>
+              </a:buClr>
+              <a:buSzPct val="75000"/>
+              <a:buFont typeface="Wingdings" pitchFamily="2" charset="2"/>
+              <a:buChar char="n"/>
+              <a:defRPr sz="3200">
+                <a:solidFill>
+                  <a:schemeClr val="tx1"/>
+                </a:solidFill>
+                <a:latin typeface="+mn-lt"/>
+                <a:ea typeface="+mn-ea"/>
+                <a:cs typeface="+mn-cs"/>
+              </a:defRPr>
+            </a:lvl1pPr>
+            <a:lvl2pPr marL="742950" indent="-285750" algn="l" rtl="0" eaLnBrk="1" fontAlgn="base" hangingPunct="1">
+              <a:spcBef>
+                <a:spcPct val="20000"/>
+              </a:spcBef>
+              <a:spcAft>
+                <a:spcPct val="0"/>
+              </a:spcAft>
+              <a:buClr>
+                <a:schemeClr val="accent2"/>
+              </a:buClr>
+              <a:buSzPct val="80000"/>
+              <a:buFont typeface="Wingdings" pitchFamily="2" charset="2"/>
+              <a:buChar char="¨"/>
+              <a:defRPr sz="2800">
+                <a:solidFill>
+                  <a:schemeClr val="tx1"/>
+                </a:solidFill>
+                <a:latin typeface="+mn-lt"/>
+              </a:defRPr>
+            </a:lvl2pPr>
+            <a:lvl3pPr marL="1143000" indent="-228600" algn="l" rtl="0" eaLnBrk="1" fontAlgn="base" hangingPunct="1">
+              <a:spcBef>
+                <a:spcPct val="20000"/>
+              </a:spcBef>
+              <a:spcAft>
+                <a:spcPct val="0"/>
+              </a:spcAft>
+              <a:buClr>
+                <a:schemeClr val="bg2"/>
+              </a:buClr>
+              <a:buSzPct val="65000"/>
+              <a:buFont typeface="Wingdings" pitchFamily="2" charset="2"/>
+              <a:buChar char="n"/>
+              <a:defRPr sz="2400">
+                <a:solidFill>
+                  <a:schemeClr val="tx1"/>
+                </a:solidFill>
+                <a:latin typeface="+mn-lt"/>
+              </a:defRPr>
+            </a:lvl3pPr>
+            <a:lvl4pPr marL="1600200" indent="-228600" algn="l" rtl="0" eaLnBrk="1" fontAlgn="base" hangingPunct="1">
+              <a:spcBef>
+                <a:spcPct val="20000"/>
+              </a:spcBef>
+              <a:spcAft>
+                <a:spcPct val="0"/>
+              </a:spcAft>
+              <a:buClr>
+                <a:schemeClr val="accent2"/>
+              </a:buClr>
+              <a:buSzPct val="70000"/>
+              <a:buFont typeface="Wingdings" pitchFamily="2" charset="2"/>
+              <a:buChar char="¨"/>
+              <a:defRPr sz="2000">
+                <a:solidFill>
+                  <a:schemeClr val="tx1"/>
+                </a:solidFill>
+                <a:latin typeface="+mn-lt"/>
+              </a:defRPr>
+            </a:lvl4pPr>
+            <a:lvl5pPr marL="2057400" indent="-228600" algn="l" rtl="0" eaLnBrk="1" fontAlgn="base" hangingPunct="1">
+              <a:spcBef>
+                <a:spcPct val="20000"/>
+              </a:spcBef>
+              <a:spcAft>
+                <a:spcPct val="0"/>
+              </a:spcAft>
+              <a:buClr>
+                <a:schemeClr val="bg2"/>
+              </a:buClr>
+              <a:buFont typeface="Wingdings" pitchFamily="2" charset="2"/>
+              <a:buChar char="§"/>
+              <a:defRPr sz="2000">
+                <a:solidFill>
+                  <a:schemeClr val="tx1"/>
+                </a:solidFill>
+                <a:latin typeface="+mn-lt"/>
+              </a:defRPr>
+            </a:lvl5pPr>
+            <a:lvl6pPr marL="2514600" indent="-228600" algn="l" rtl="0" eaLnBrk="1" fontAlgn="base" hangingPunct="1">
+              <a:spcBef>
+                <a:spcPct val="20000"/>
+              </a:spcBef>
+              <a:spcAft>
+                <a:spcPct val="0"/>
+              </a:spcAft>
+              <a:buClr>
+                <a:schemeClr val="bg2"/>
+              </a:buClr>
+              <a:buFont typeface="Wingdings" pitchFamily="2" charset="2"/>
+              <a:buChar char="§"/>
+              <a:defRPr sz="2000">
+                <a:solidFill>
+                  <a:schemeClr val="tx1"/>
+                </a:solidFill>
+                <a:latin typeface="+mn-lt"/>
+              </a:defRPr>
+            </a:lvl6pPr>
+            <a:lvl7pPr marL="2971800" indent="-228600" algn="l" rtl="0" eaLnBrk="1" fontAlgn="base" hangingPunct="1">
+              <a:spcBef>
+                <a:spcPct val="20000"/>
+              </a:spcBef>
+              <a:spcAft>
+                <a:spcPct val="0"/>
+              </a:spcAft>
+              <a:buClr>
+                <a:schemeClr val="bg2"/>
+              </a:buClr>
+              <a:buFont typeface="Wingdings" pitchFamily="2" charset="2"/>
+              <a:buChar char="§"/>
+              <a:defRPr sz="2000">
+                <a:solidFill>
+                  <a:schemeClr val="tx1"/>
+                </a:solidFill>
+                <a:latin typeface="+mn-lt"/>
+              </a:defRPr>
+            </a:lvl7pPr>
+            <a:lvl8pPr marL="3429000" indent="-228600" algn="l" rtl="0" eaLnBrk="1" fontAlgn="base" hangingPunct="1">
+              <a:spcBef>
+                <a:spcPct val="20000"/>
+              </a:spcBef>
+              <a:spcAft>
+                <a:spcPct val="0"/>
+              </a:spcAft>
+              <a:buClr>
+                <a:schemeClr val="bg2"/>
+              </a:buClr>
+              <a:buFont typeface="Wingdings" pitchFamily="2" charset="2"/>
+              <a:buChar char="§"/>
+              <a:defRPr sz="2000">
+                <a:solidFill>
+                  <a:schemeClr val="tx1"/>
+                </a:solidFill>
+                <a:latin typeface="+mn-lt"/>
+              </a:defRPr>
+            </a:lvl8pPr>
+            <a:lvl9pPr marL="3886200" indent="-228600" algn="l" rtl="0" eaLnBrk="1" fontAlgn="base" hangingPunct="1">
+              <a:spcBef>
+                <a:spcPct val="20000"/>
+              </a:spcBef>
+              <a:spcAft>
+                <a:spcPct val="0"/>
+              </a:spcAft>
+              <a:buClr>
+                <a:schemeClr val="bg2"/>
+              </a:buClr>
+              <a:buFont typeface="Wingdings" pitchFamily="2" charset="2"/>
+              <a:buChar char="§"/>
+              <a:defRPr sz="2000">
+                <a:solidFill>
+                  <a:schemeClr val="tx1"/>
+                </a:solidFill>
+                <a:latin typeface="+mn-lt"/>
+              </a:defRPr>
+            </a:lvl9pPr>
+          </a:lstStyle>
+          <a:p>
+            <a:pPr marL="457200" lvl="1" indent="0">
+              <a:buFont typeface="Wingdings" pitchFamily="2" charset="2"/>
+              <a:buNone/>
+            </a:pPr>
+            <a:r>
+              <a:rPr lang="fr-FR" kern="0" dirty="0" smtClean="0"/>
+              <a:t>Réitération du développement</a:t>
+            </a:r>
+          </a:p>
+          <a:p>
+            <a:pPr lvl="1"/>
+            <a:endParaRPr lang="fr-FR" kern="0" dirty="0" smtClean="0"/>
+          </a:p>
+          <a:p>
+            <a:pPr lvl="1"/>
+            <a:endParaRPr lang="fr-FR" kern="0" dirty="0" smtClean="0"/>
+          </a:p>
+          <a:p>
+            <a:pPr marL="0" indent="0">
+              <a:buFont typeface="Wingdings" pitchFamily="2" charset="2"/>
+              <a:buNone/>
+            </a:pPr>
+            <a:endParaRPr lang="fr-FR" kern="0" dirty="0"/>
+          </a:p>
+        </p:txBody>
+      </p:sp>
+    </p:spTree>
+    <p:extLst>
+      <p:ext uri="{BB962C8B-B14F-4D97-AF65-F5344CB8AC3E}">
+        <p14:creationId xmlns:p14="http://schemas.microsoft.com/office/powerpoint/2010/main" val="2024243597"/>
       </p:ext>
     </p:extLst>
   </p:cSld>
@@ -5498,4 +8600,289 @@
     </a:extraClrScheme>
   </a:extraClrSchemeLst>
 </a:theme>
+</file>
+
+<file path=ppt/theme/theme2.xml><?xml version="1.0" encoding="utf-8"?>
+<a:theme xmlns:a="http://schemas.openxmlformats.org/drawingml/2006/main" name="Office Theme">
+  <a:themeElements>
+    <a:clrScheme name="Office">
+      <a:dk1>
+        <a:sysClr val="windowText" lastClr="000000"/>
+      </a:dk1>
+      <a:lt1>
+        <a:sysClr val="window" lastClr="FFFFFF"/>
+      </a:lt1>
+      <a:dk2>
+        <a:srgbClr val="1F497D"/>
+      </a:dk2>
+      <a:lt2>
+        <a:srgbClr val="EEECE1"/>
+      </a:lt2>
+      <a:accent1>
+        <a:srgbClr val="4F81BD"/>
+      </a:accent1>
+      <a:accent2>
+        <a:srgbClr val="C0504D"/>
+      </a:accent2>
+      <a:accent3>
+        <a:srgbClr val="9BBB59"/>
+      </a:accent3>
+      <a:accent4>
+        <a:srgbClr val="8064A2"/>
+      </a:accent4>
+      <a:accent5>
+        <a:srgbClr val="4BACC6"/>
+      </a:accent5>
+      <a:accent6>
+        <a:srgbClr val="F79646"/>
+      </a:accent6>
+      <a:hlink>
+        <a:srgbClr val="0000FF"/>
+      </a:hlink>
+      <a:folHlink>
+        <a:srgbClr val="800080"/>
+      </a:folHlink>
+    </a:clrScheme>
+    <a:fontScheme name="Office">
+      <a:majorFont>
+        <a:latin typeface="Calibri"/>
+        <a:ea typeface=""/>
+        <a:cs typeface=""/>
+        <a:font script="Jpan" typeface="ＭＳ Ｐゴシック"/>
+        <a:font script="Hang" typeface="맑은 고딕"/>
+        <a:font script="Hans" typeface="宋体"/>
+        <a:font script="Hant" typeface="新細明體"/>
+        <a:font script="Arab" typeface="Times New Roman"/>
+        <a:font script="Hebr" typeface="Times New Roman"/>
+        <a:font script="Thai" typeface="Angsana New"/>
+        <a:font script="Ethi" typeface="Nyala"/>
+        <a:font script="Beng" typeface="Vrinda"/>
+        <a:font script="Gujr" typeface="Shruti"/>
+        <a:font script="Khmr" typeface="MoolBoran"/>
+        <a:font script="Knda" typeface="Tunga"/>
+        <a:font script="Guru" typeface="Raavi"/>
+        <a:font script="Cans" typeface="Euphemia"/>
+        <a:font script="Cher" typeface="Plantagenet Cherokee"/>
+        <a:font script="Yiii" typeface="Microsoft Yi Baiti"/>
+        <a:font script="Tibt" typeface="Microsoft Himalaya"/>
+        <a:font script="Thaa" typeface="MV Boli"/>
+        <a:font script="Deva" typeface="Mangal"/>
+        <a:font script="Telu" typeface="Gautami"/>
+        <a:font script="Taml" typeface="Latha"/>
+        <a:font script="Syrc" typeface="Estrangelo Edessa"/>
+        <a:font script="Orya" typeface="Kalinga"/>
+        <a:font script="Mlym" typeface="Kartika"/>
+        <a:font script="Laoo" typeface="DokChampa"/>
+        <a:font script="Sinh" typeface="Iskoola Pota"/>
+        <a:font script="Mong" typeface="Mongolian Baiti"/>
+        <a:font script="Viet" typeface="Times New Roman"/>
+        <a:font script="Uigh" typeface="Microsoft Uighur"/>
+        <a:font script="Geor" typeface="Sylfaen"/>
+      </a:majorFont>
+      <a:minorFont>
+        <a:latin typeface="Calibri"/>
+        <a:ea typeface=""/>
+        <a:cs typeface=""/>
+        <a:font script="Jpan" typeface="ＭＳ Ｐゴシック"/>
+        <a:font script="Hang" typeface="맑은 고딕"/>
+        <a:font script="Hans" typeface="宋体"/>
+        <a:font script="Hant" typeface="新細明體"/>
+        <a:font script="Arab" typeface="Arial"/>
+        <a:font script="Hebr" typeface="Arial"/>
+        <a:font script="Thai" typeface="Cordia New"/>
+        <a:font script="Ethi" typeface="Nyala"/>
+        <a:font script="Beng" typeface="Vrinda"/>
+        <a:font script="Gujr" typeface="Shruti"/>
+        <a:font script="Khmr" typeface="DaunPenh"/>
+        <a:font script="Knda" typeface="Tunga"/>
+        <a:font script="Guru" typeface="Raavi"/>
+        <a:font script="Cans" typeface="Euphemia"/>
+        <a:font script="Cher" typeface="Plantagenet Cherokee"/>
+        <a:font script="Yiii" typeface="Microsoft Yi Baiti"/>
+        <a:font script="Tibt" typeface="Microsoft Himalaya"/>
+        <a:font script="Thaa" typeface="MV Boli"/>
+        <a:font script="Deva" typeface="Mangal"/>
+        <a:font script="Telu" typeface="Gautami"/>
+        <a:font script="Taml" typeface="Latha"/>
+        <a:font script="Syrc" typeface="Estrangelo Edessa"/>
+        <a:font script="Orya" typeface="Kalinga"/>
+        <a:font script="Mlym" typeface="Kartika"/>
+        <a:font script="Laoo" typeface="DokChampa"/>
+        <a:font script="Sinh" typeface="Iskoola Pota"/>
+        <a:font script="Mong" typeface="Mongolian Baiti"/>
+        <a:font script="Viet" typeface="Arial"/>
+        <a:font script="Uigh" typeface="Microsoft Uighur"/>
+        <a:font script="Geor" typeface="Sylfaen"/>
+      </a:minorFont>
+    </a:fontScheme>
+    <a:fmtScheme name="Office">
+      <a:fillStyleLst>
+        <a:solidFill>
+          <a:schemeClr val="phClr"/>
+        </a:solidFill>
+        <a:gradFill rotWithShape="1">
+          <a:gsLst>
+            <a:gs pos="0">
+              <a:schemeClr val="phClr">
+                <a:tint val="50000"/>
+                <a:satMod val="300000"/>
+              </a:schemeClr>
+            </a:gs>
+            <a:gs pos="35000">
+              <a:schemeClr val="phClr">
+                <a:tint val="37000"/>
+                <a:satMod val="300000"/>
+              </a:schemeClr>
+            </a:gs>
+            <a:gs pos="100000">
+              <a:schemeClr val="phClr">
+                <a:tint val="15000"/>
+                <a:satMod val="350000"/>
+              </a:schemeClr>
+            </a:gs>
+          </a:gsLst>
+          <a:lin ang="16200000" scaled="1"/>
+        </a:gradFill>
+        <a:gradFill rotWithShape="1">
+          <a:gsLst>
+            <a:gs pos="0">
+              <a:schemeClr val="phClr">
+                <a:shade val="51000"/>
+                <a:satMod val="130000"/>
+              </a:schemeClr>
+            </a:gs>
+            <a:gs pos="80000">
+              <a:schemeClr val="phClr">
+                <a:shade val="93000"/>
+                <a:satMod val="130000"/>
+              </a:schemeClr>
+            </a:gs>
+            <a:gs pos="100000">
+              <a:schemeClr val="phClr">
+                <a:shade val="94000"/>
+                <a:satMod val="135000"/>
+              </a:schemeClr>
+            </a:gs>
+          </a:gsLst>
+          <a:lin ang="16200000" scaled="0"/>
+        </a:gradFill>
+      </a:fillStyleLst>
+      <a:lnStyleLst>
+        <a:ln w="9525" cap="flat" cmpd="sng" algn="ctr">
+          <a:solidFill>
+            <a:schemeClr val="phClr">
+              <a:shade val="95000"/>
+              <a:satMod val="105000"/>
+            </a:schemeClr>
+          </a:solidFill>
+          <a:prstDash val="solid"/>
+        </a:ln>
+        <a:ln w="25400" cap="flat" cmpd="sng" algn="ctr">
+          <a:solidFill>
+            <a:schemeClr val="phClr"/>
+          </a:solidFill>
+          <a:prstDash val="solid"/>
+        </a:ln>
+        <a:ln w="38100" cap="flat" cmpd="sng" algn="ctr">
+          <a:solidFill>
+            <a:schemeClr val="phClr"/>
+          </a:solidFill>
+          <a:prstDash val="solid"/>
+        </a:ln>
+      </a:lnStyleLst>
+      <a:effectStyleLst>
+        <a:effectStyle>
+          <a:effectLst>
+            <a:outerShdw blurRad="40000" dist="20000" dir="5400000" rotWithShape="0">
+              <a:srgbClr val="000000">
+                <a:alpha val="38000"/>
+              </a:srgbClr>
+            </a:outerShdw>
+          </a:effectLst>
+        </a:effectStyle>
+        <a:effectStyle>
+          <a:effectLst>
+            <a:outerShdw blurRad="40000" dist="23000" dir="5400000" rotWithShape="0">
+              <a:srgbClr val="000000">
+                <a:alpha val="35000"/>
+              </a:srgbClr>
+            </a:outerShdw>
+          </a:effectLst>
+        </a:effectStyle>
+        <a:effectStyle>
+          <a:effectLst>
+            <a:outerShdw blurRad="40000" dist="23000" dir="5400000" rotWithShape="0">
+              <a:srgbClr val="000000">
+                <a:alpha val="35000"/>
+              </a:srgbClr>
+            </a:outerShdw>
+          </a:effectLst>
+          <a:scene3d>
+            <a:camera prst="orthographicFront">
+              <a:rot lat="0" lon="0" rev="0"/>
+            </a:camera>
+            <a:lightRig rig="threePt" dir="t">
+              <a:rot lat="0" lon="0" rev="1200000"/>
+            </a:lightRig>
+          </a:scene3d>
+          <a:sp3d>
+            <a:bevelT w="63500" h="25400"/>
+          </a:sp3d>
+        </a:effectStyle>
+      </a:effectStyleLst>
+      <a:bgFillStyleLst>
+        <a:solidFill>
+          <a:schemeClr val="phClr"/>
+        </a:solidFill>
+        <a:gradFill rotWithShape="1">
+          <a:gsLst>
+            <a:gs pos="0">
+              <a:schemeClr val="phClr">
+                <a:tint val="40000"/>
+                <a:satMod val="350000"/>
+              </a:schemeClr>
+            </a:gs>
+            <a:gs pos="40000">
+              <a:schemeClr val="phClr">
+                <a:tint val="45000"/>
+                <a:shade val="99000"/>
+                <a:satMod val="350000"/>
+              </a:schemeClr>
+            </a:gs>
+            <a:gs pos="100000">
+              <a:schemeClr val="phClr">
+                <a:shade val="20000"/>
+                <a:satMod val="255000"/>
+              </a:schemeClr>
+            </a:gs>
+          </a:gsLst>
+          <a:path path="circle">
+            <a:fillToRect l="50000" t="-80000" r="50000" b="180000"/>
+          </a:path>
+        </a:gradFill>
+        <a:gradFill rotWithShape="1">
+          <a:gsLst>
+            <a:gs pos="0">
+              <a:schemeClr val="phClr">
+                <a:tint val="80000"/>
+                <a:satMod val="300000"/>
+              </a:schemeClr>
+            </a:gs>
+            <a:gs pos="100000">
+              <a:schemeClr val="phClr">
+                <a:shade val="30000"/>
+                <a:satMod val="200000"/>
+              </a:schemeClr>
+            </a:gs>
+          </a:gsLst>
+          <a:path path="circle">
+            <a:fillToRect l="50000" t="50000" r="50000" b="50000"/>
+          </a:path>
+        </a:gradFill>
+      </a:bgFillStyleLst>
+    </a:fmtScheme>
+  </a:themeElements>
+  <a:objectDefaults/>
+  <a:extraClrSchemeLst/>
+</a:theme>
 </file>
</xml_diff>

<commit_message>
Correction de certaines slides
</commit_message>
<xml_diff>
--- a/Rendu/PresentationFinale/Binome13PresentationFinalePRT.pptx
+++ b/Rendu/PresentationFinale/Binome13PresentationFinalePRT.pptx
@@ -545,18 +545,6 @@
           <a:bodyPr/>
           <a:lstStyle/>
           <a:p>
-            <a:r>
-              <a:rPr lang="fr-FR" dirty="0" smtClean="0"/>
-              <a:t>Réalisabilité</a:t>
-            </a:r>
-            <a:r>
-              <a:rPr lang="fr-FR" baseline="0" dirty="0" smtClean="0"/>
-              <a:t> </a:t>
-            </a:r>
-            <a:r>
-              <a:rPr lang="fr-FR" dirty="0" smtClean="0"/>
-              <a:t>Hard et Soft</a:t>
-            </a:r>
             <a:endParaRPr lang="fr-FR" dirty="0"/>
           </a:p>
         </p:txBody>
@@ -578,16 +566,108 @@
           <a:p>
             <a:fld id="{CB2D9C16-2529-4A25-A30D-87EB28A90E76}" type="slidenum">
               <a:rPr lang="fr-FR" smtClean="0"/>
-              <a:t>4</a:t>
+              <a:t>1</a:t>
             </a:fld>
-            <a:endParaRPr lang="fr-FR" dirty="0"/>
+            <a:endParaRPr lang="fr-FR"/>
           </a:p>
         </p:txBody>
       </p:sp>
     </p:spTree>
     <p:extLst>
       <p:ext uri="{BB962C8B-B14F-4D97-AF65-F5344CB8AC3E}">
-        <p14:creationId xmlns:p14="http://schemas.microsoft.com/office/powerpoint/2010/main" val="873504980"/>
+        <p14:creationId xmlns:p14="http://schemas.microsoft.com/office/powerpoint/2010/main" val="1171807373"/>
+      </p:ext>
+    </p:extLst>
+  </p:cSld>
+  <p:clrMapOvr>
+    <a:masterClrMapping/>
+  </p:clrMapOvr>
+</p:notes>
+</file>
+
+<file path=ppt/notesSlides/notesSlide10.xml><?xml version="1.0" encoding="utf-8"?>
+<p:notes xmlns:a="http://schemas.openxmlformats.org/drawingml/2006/main" xmlns:r="http://schemas.openxmlformats.org/officeDocument/2006/relationships" xmlns:p="http://schemas.openxmlformats.org/presentationml/2006/main">
+  <p:cSld>
+    <p:spTree>
+      <p:nvGrpSpPr>
+        <p:cNvPr id="1" name=""/>
+        <p:cNvGrpSpPr/>
+        <p:nvPr/>
+      </p:nvGrpSpPr>
+      <p:grpSpPr>
+        <a:xfrm>
+          <a:off x="0" y="0"/>
+          <a:ext cx="0" cy="0"/>
+          <a:chOff x="0" y="0"/>
+          <a:chExt cx="0" cy="0"/>
+        </a:xfrm>
+      </p:grpSpPr>
+      <p:sp>
+        <p:nvSpPr>
+          <p:cNvPr id="2" name="Slide Image Placeholder 1"/>
+          <p:cNvSpPr>
+            <a:spLocks noGrp="1" noRot="1" noChangeAspect="1"/>
+          </p:cNvSpPr>
+          <p:nvPr>
+            <p:ph type="sldImg"/>
+          </p:nvPr>
+        </p:nvSpPr>
+        <p:spPr/>
+      </p:sp>
+      <p:sp>
+        <p:nvSpPr>
+          <p:cNvPr id="3" name="Notes Placeholder 2"/>
+          <p:cNvSpPr>
+            <a:spLocks noGrp="1"/>
+          </p:cNvSpPr>
+          <p:nvPr>
+            <p:ph type="body" idx="1"/>
+          </p:nvPr>
+        </p:nvSpPr>
+        <p:spPr/>
+        <p:txBody>
+          <a:bodyPr/>
+          <a:lstStyle/>
+          <a:p>
+            <a:r>
+              <a:rPr lang="fr-FR" dirty="0" smtClean="0"/>
+              <a:t>On a passé beaucoup de temps en formation</a:t>
+            </a:r>
+            <a:r>
+              <a:rPr lang="fr-FR" baseline="0" dirty="0" smtClean="0"/>
+              <a:t> et étude préliminaires de faisabilité (FMC entre autre)</a:t>
+            </a:r>
+            <a:endParaRPr lang="fr-FR" dirty="0"/>
+          </a:p>
+        </p:txBody>
+      </p:sp>
+      <p:sp>
+        <p:nvSpPr>
+          <p:cNvPr id="4" name="Slide Number Placeholder 3"/>
+          <p:cNvSpPr>
+            <a:spLocks noGrp="1"/>
+          </p:cNvSpPr>
+          <p:nvPr>
+            <p:ph type="sldNum" sz="quarter" idx="10"/>
+          </p:nvPr>
+        </p:nvSpPr>
+        <p:spPr/>
+        <p:txBody>
+          <a:bodyPr/>
+          <a:lstStyle/>
+          <a:p>
+            <a:fld id="{CB2D9C16-2529-4A25-A30D-87EB28A90E76}" type="slidenum">
+              <a:rPr lang="fr-FR" smtClean="0"/>
+              <a:t>12</a:t>
+            </a:fld>
+            <a:endParaRPr lang="fr-FR" dirty="0"/>
+          </a:p>
+        </p:txBody>
+      </p:sp>
+    </p:spTree>
+    <p:extLst>
+      <p:ext uri="{BB962C8B-B14F-4D97-AF65-F5344CB8AC3E}">
+        <p14:creationId xmlns:p14="http://schemas.microsoft.com/office/powerpoint/2010/main" val="113897337"/>
       </p:ext>
     </p:extLst>
   </p:cSld>
@@ -641,6 +721,18 @@
           <a:bodyPr/>
           <a:lstStyle/>
           <a:p>
+            <a:r>
+              <a:rPr lang="fr-FR" dirty="0" smtClean="0"/>
+              <a:t>Réalisabilité</a:t>
+            </a:r>
+            <a:r>
+              <a:rPr lang="fr-FR" baseline="0" dirty="0" smtClean="0"/>
+              <a:t> </a:t>
+            </a:r>
+            <a:r>
+              <a:rPr lang="fr-FR" dirty="0" smtClean="0"/>
+              <a:t>Hard et Soft</a:t>
+            </a:r>
             <a:endParaRPr lang="fr-FR" dirty="0"/>
           </a:p>
         </p:txBody>
@@ -662,16 +754,16 @@
           <a:p>
             <a:fld id="{CB2D9C16-2529-4A25-A30D-87EB28A90E76}" type="slidenum">
               <a:rPr lang="fr-FR" smtClean="0"/>
-              <a:t>5</a:t>
+              <a:t>4</a:t>
             </a:fld>
-            <a:endParaRPr lang="fr-FR"/>
+            <a:endParaRPr lang="fr-FR" dirty="0"/>
           </a:p>
         </p:txBody>
       </p:sp>
     </p:spTree>
     <p:extLst>
       <p:ext uri="{BB962C8B-B14F-4D97-AF65-F5344CB8AC3E}">
-        <p14:creationId xmlns:p14="http://schemas.microsoft.com/office/powerpoint/2010/main" val="2906603285"/>
+        <p14:creationId xmlns:p14="http://schemas.microsoft.com/office/powerpoint/2010/main" val="873504980"/>
       </p:ext>
     </p:extLst>
   </p:cSld>
@@ -725,34 +817,6 @@
           <a:bodyPr/>
           <a:lstStyle/>
           <a:p>
-            <a:pPr marL="0" marR="0" indent="0" algn="l" defTabSz="914400" rtl="0" eaLnBrk="1" fontAlgn="auto" latinLnBrk="0" hangingPunct="1">
-              <a:lnSpc>
-                <a:spcPct val="100000"/>
-              </a:lnSpc>
-              <a:spcBef>
-                <a:spcPts val="0"/>
-              </a:spcBef>
-              <a:spcAft>
-                <a:spcPts val="0"/>
-              </a:spcAft>
-              <a:buClrTx/>
-              <a:buSzTx/>
-              <a:buFontTx/>
-              <a:buNone/>
-              <a:tabLst/>
-              <a:defRPr/>
-            </a:pPr>
-            <a:r>
-              <a:rPr lang="fr-FR" dirty="0" smtClean="0"/>
-              <a:t>Réalisabilité Hard et disponibilité driver</a:t>
-            </a:r>
-            <a:r>
-              <a:rPr lang="fr-FR" baseline="0" dirty="0" smtClean="0"/>
-              <a:t> Soft</a:t>
-            </a:r>
-            <a:endParaRPr lang="fr-FR" dirty="0" smtClean="0"/>
-          </a:p>
-          <a:p>
             <a:endParaRPr lang="fr-FR" dirty="0"/>
           </a:p>
         </p:txBody>
@@ -774,7 +838,7 @@
           <a:p>
             <a:fld id="{CB2D9C16-2529-4A25-A30D-87EB28A90E76}" type="slidenum">
               <a:rPr lang="fr-FR" smtClean="0"/>
-              <a:t>6</a:t>
+              <a:t>5</a:t>
             </a:fld>
             <a:endParaRPr lang="fr-FR"/>
           </a:p>
@@ -783,7 +847,7 @@
     </p:spTree>
     <p:extLst>
       <p:ext uri="{BB962C8B-B14F-4D97-AF65-F5344CB8AC3E}">
-        <p14:creationId xmlns:p14="http://schemas.microsoft.com/office/powerpoint/2010/main" val="2591285659"/>
+        <p14:creationId xmlns:p14="http://schemas.microsoft.com/office/powerpoint/2010/main" val="2906603285"/>
       </p:ext>
     </p:extLst>
   </p:cSld>
@@ -837,20 +901,34 @@
           <a:bodyPr/>
           <a:lstStyle/>
           <a:p>
+            <a:pPr marL="0" marR="0" indent="0" algn="l" defTabSz="914400" rtl="0" eaLnBrk="1" fontAlgn="auto" latinLnBrk="0" hangingPunct="1">
+              <a:lnSpc>
+                <a:spcPct val="100000"/>
+              </a:lnSpc>
+              <a:spcBef>
+                <a:spcPts val="0"/>
+              </a:spcBef>
+              <a:spcAft>
+                <a:spcPts val="0"/>
+              </a:spcAft>
+              <a:buClrTx/>
+              <a:buSzTx/>
+              <a:buFontTx/>
+              <a:buNone/>
+              <a:tabLst/>
+              <a:defRPr/>
+            </a:pPr>
             <a:r>
               <a:rPr lang="fr-FR" dirty="0" smtClean="0"/>
-              <a:t>RD/BY et RGB</a:t>
-            </a:r>
-          </a:p>
-          <a:p>
-            <a:r>
-              <a:rPr lang="fr-FR" dirty="0" smtClean="0"/>
-              <a:t>Changement des composants et revalidation (mémoire</a:t>
+              <a:t>Réalisabilité Hard et disponibilité driver</a:t>
             </a:r>
             <a:r>
               <a:rPr lang="fr-FR" baseline="0" dirty="0" smtClean="0"/>
-              <a:t>s)</a:t>
-            </a:r>
+              <a:t> Soft</a:t>
+            </a:r>
+            <a:endParaRPr lang="fr-FR" dirty="0" smtClean="0"/>
+          </a:p>
+          <a:p>
             <a:endParaRPr lang="fr-FR" dirty="0"/>
           </a:p>
         </p:txBody>
@@ -872,7 +950,7 @@
           <a:p>
             <a:fld id="{CB2D9C16-2529-4A25-A30D-87EB28A90E76}" type="slidenum">
               <a:rPr lang="fr-FR" smtClean="0"/>
-              <a:t>7</a:t>
+              <a:t>6</a:t>
             </a:fld>
             <a:endParaRPr lang="fr-FR"/>
           </a:p>
@@ -881,7 +959,7 @@
     </p:spTree>
     <p:extLst>
       <p:ext uri="{BB962C8B-B14F-4D97-AF65-F5344CB8AC3E}">
-        <p14:creationId xmlns:p14="http://schemas.microsoft.com/office/powerpoint/2010/main" val="113897337"/>
+        <p14:creationId xmlns:p14="http://schemas.microsoft.com/office/powerpoint/2010/main" val="2591285659"/>
       </p:ext>
     </p:extLst>
   </p:cSld>
@@ -935,6 +1013,20 @@
           <a:bodyPr/>
           <a:lstStyle/>
           <a:p>
+            <a:r>
+              <a:rPr lang="fr-FR" dirty="0" smtClean="0"/>
+              <a:t>RD/BY et RGB</a:t>
+            </a:r>
+          </a:p>
+          <a:p>
+            <a:r>
+              <a:rPr lang="fr-FR" dirty="0" smtClean="0"/>
+              <a:t>Changement des composants et revalidation (mémoire</a:t>
+            </a:r>
+            <a:r>
+              <a:rPr lang="fr-FR" baseline="0" dirty="0" smtClean="0"/>
+              <a:t>s)</a:t>
+            </a:r>
             <a:endParaRPr lang="fr-FR" dirty="0"/>
           </a:p>
         </p:txBody>
@@ -956,7 +1048,7 @@
           <a:p>
             <a:fld id="{CB2D9C16-2529-4A25-A30D-87EB28A90E76}" type="slidenum">
               <a:rPr lang="fr-FR" smtClean="0"/>
-              <a:t>8</a:t>
+              <a:t>7</a:t>
             </a:fld>
             <a:endParaRPr lang="fr-FR"/>
           </a:p>
@@ -1040,7 +1132,7 @@
           <a:p>
             <a:fld id="{CB2D9C16-2529-4A25-A30D-87EB28A90E76}" type="slidenum">
               <a:rPr lang="fr-FR" smtClean="0"/>
-              <a:t>9</a:t>
+              <a:t>8</a:t>
             </a:fld>
             <a:endParaRPr lang="fr-FR"/>
           </a:p>
@@ -1103,14 +1195,6 @@
           <a:bodyPr/>
           <a:lstStyle/>
           <a:p>
-            <a:r>
-              <a:rPr lang="fr-FR" dirty="0" smtClean="0"/>
-              <a:t>On a passé beaucoup de temps en formation</a:t>
-            </a:r>
-            <a:r>
-              <a:rPr lang="fr-FR" baseline="0" dirty="0" smtClean="0"/>
-              <a:t> et étude préliminaires de faisabilité (FMC entre autre)</a:t>
-            </a:r>
             <a:endParaRPr lang="fr-FR" dirty="0"/>
           </a:p>
         </p:txBody>
@@ -1132,7 +1216,7 @@
           <a:p>
             <a:fld id="{CB2D9C16-2529-4A25-A30D-87EB28A90E76}" type="slidenum">
               <a:rPr lang="fr-FR" smtClean="0"/>
-              <a:t>10</a:t>
+              <a:t>9</a:t>
             </a:fld>
             <a:endParaRPr lang="fr-FR"/>
           </a:p>
@@ -1201,11 +1285,7 @@
             </a:r>
             <a:r>
               <a:rPr lang="fr-FR" baseline="0" dirty="0" smtClean="0"/>
-              <a:t> et étude préliminaires </a:t>
-            </a:r>
-            <a:r>
-              <a:rPr lang="fr-FR" baseline="0" smtClean="0"/>
-              <a:t>de faisabilité (FMC entre autre)</a:t>
+              <a:t> et étude préliminaires de faisabilité (FMC entre autre)</a:t>
             </a:r>
             <a:endParaRPr lang="fr-FR" dirty="0"/>
           </a:p>
@@ -1228,7 +1308,7 @@
           <a:p>
             <a:fld id="{CB2D9C16-2529-4A25-A30D-87EB28A90E76}" type="slidenum">
               <a:rPr lang="fr-FR" smtClean="0"/>
-              <a:t>11</a:t>
+              <a:t>10</a:t>
             </a:fld>
             <a:endParaRPr lang="fr-FR"/>
           </a:p>
@@ -1297,7 +1377,11 @@
             </a:r>
             <a:r>
               <a:rPr lang="fr-FR" baseline="0" dirty="0" smtClean="0"/>
-              <a:t> et étude préliminaires de faisabilité (FMC entre autre)</a:t>
+              <a:t> et étude préliminaires </a:t>
+            </a:r>
+            <a:r>
+              <a:rPr lang="fr-FR" baseline="0" smtClean="0"/>
+              <a:t>de faisabilité (FMC entre autre)</a:t>
             </a:r>
             <a:endParaRPr lang="fr-FR" dirty="0"/>
           </a:p>
@@ -1320,9 +1404,9 @@
           <a:p>
             <a:fld id="{CB2D9C16-2529-4A25-A30D-87EB28A90E76}" type="slidenum">
               <a:rPr lang="fr-FR" smtClean="0"/>
-              <a:t>12</a:t>
+              <a:t>11</a:t>
             </a:fld>
-            <a:endParaRPr lang="fr-FR" dirty="0"/>
+            <a:endParaRPr lang="fr-FR"/>
           </a:p>
         </p:txBody>
       </p:sp>
@@ -5103,7 +5187,6 @@
               <a:rPr lang="fr-FR" altLang="fr-FR" smtClean="0"/>
               <a:t>Click to edit Master title style</a:t>
             </a:r>
-            <a:endParaRPr lang="fr-FR" altLang="fr-FR" smtClean="0"/>
           </a:p>
         </p:txBody>
       </p:sp>
@@ -5200,7 +5283,6 @@
               <a:rPr lang="fr-FR" altLang="fr-FR" smtClean="0"/>
               <a:t>Fifth level</a:t>
             </a:r>
-            <a:endParaRPr lang="fr-FR" altLang="fr-FR" smtClean="0"/>
           </a:p>
         </p:txBody>
       </p:sp>
@@ -5288,6 +5370,7 @@
     <p:sldLayoutId id="2147483663" r:id="rId10"/>
     <p:sldLayoutId id="2147483664" r:id="rId11"/>
   </p:sldLayoutIdLst>
+  <p:hf hdr="0" ftr="0" dt="0"/>
   <p:txStyles>
     <p:titleStyle>
       <a:lvl1pPr algn="l" rtl="0" eaLnBrk="1" fontAlgn="base" hangingPunct="1">
@@ -5916,6 +5999,30 @@
           </a:p>
         </p:txBody>
       </p:sp>
+      <p:sp>
+        <p:nvSpPr>
+          <p:cNvPr id="4" name="Slide Number Placeholder 3"/>
+          <p:cNvSpPr>
+            <a:spLocks noGrp="1"/>
+          </p:cNvSpPr>
+          <p:nvPr>
+            <p:ph type="sldNum" sz="quarter" idx="11"/>
+          </p:nvPr>
+        </p:nvSpPr>
+        <p:spPr/>
+        <p:txBody>
+          <a:bodyPr/>
+          <a:lstStyle/>
+          <a:p>
+            <a:fld id="{93395105-7618-4763-9D06-A2B4F6609439}" type="slidenum">
+              <a:rPr lang="fr-FR" altLang="fr-FR" smtClean="0"/>
+              <a:pPr/>
+              <a:t>10</a:t>
+            </a:fld>
+            <a:endParaRPr lang="fr-FR" altLang="fr-FR" dirty="0"/>
+          </a:p>
+        </p:txBody>
+      </p:sp>
     </p:spTree>
     <p:extLst>
       <p:ext uri="{BB962C8B-B14F-4D97-AF65-F5344CB8AC3E}">
@@ -6078,6 +6185,30 @@
           </a:p>
         </p:txBody>
       </p:sp>
+      <p:sp>
+        <p:nvSpPr>
+          <p:cNvPr id="4" name="Slide Number Placeholder 3"/>
+          <p:cNvSpPr>
+            <a:spLocks noGrp="1"/>
+          </p:cNvSpPr>
+          <p:nvPr>
+            <p:ph type="sldNum" sz="quarter" idx="11"/>
+          </p:nvPr>
+        </p:nvSpPr>
+        <p:spPr/>
+        <p:txBody>
+          <a:bodyPr/>
+          <a:lstStyle/>
+          <a:p>
+            <a:fld id="{93395105-7618-4763-9D06-A2B4F6609439}" type="slidenum">
+              <a:rPr lang="fr-FR" altLang="fr-FR" smtClean="0"/>
+              <a:pPr/>
+              <a:t>11</a:t>
+            </a:fld>
+            <a:endParaRPr lang="fr-FR" altLang="fr-FR" dirty="0"/>
+          </a:p>
+        </p:txBody>
+      </p:sp>
     </p:spTree>
     <p:extLst>
       <p:ext uri="{BB962C8B-B14F-4D97-AF65-F5344CB8AC3E}">
@@ -6161,6 +6292,30 @@
           </a:p>
         </p:txBody>
       </p:sp>
+      <p:sp>
+        <p:nvSpPr>
+          <p:cNvPr id="3" name="Slide Number Placeholder 2"/>
+          <p:cNvSpPr>
+            <a:spLocks noGrp="1"/>
+          </p:cNvSpPr>
+          <p:nvPr>
+            <p:ph type="sldNum" sz="quarter" idx="11"/>
+          </p:nvPr>
+        </p:nvSpPr>
+        <p:spPr/>
+        <p:txBody>
+          <a:bodyPr/>
+          <a:lstStyle/>
+          <a:p>
+            <a:fld id="{93395105-7618-4763-9D06-A2B4F6609439}" type="slidenum">
+              <a:rPr lang="fr-FR" altLang="fr-FR" smtClean="0"/>
+              <a:pPr/>
+              <a:t>12</a:t>
+            </a:fld>
+            <a:endParaRPr lang="fr-FR" altLang="fr-FR" dirty="0"/>
+          </a:p>
+        </p:txBody>
+      </p:sp>
     </p:spTree>
     <p:extLst>
       <p:ext uri="{BB962C8B-B14F-4D97-AF65-F5344CB8AC3E}">
@@ -6266,6 +6421,30 @@
           </a:p>
         </p:txBody>
       </p:sp>
+      <p:sp>
+        <p:nvSpPr>
+          <p:cNvPr id="4" name="Slide Number Placeholder 3"/>
+          <p:cNvSpPr>
+            <a:spLocks noGrp="1"/>
+          </p:cNvSpPr>
+          <p:nvPr>
+            <p:ph type="sldNum" sz="quarter" idx="11"/>
+          </p:nvPr>
+        </p:nvSpPr>
+        <p:spPr/>
+        <p:txBody>
+          <a:bodyPr/>
+          <a:lstStyle/>
+          <a:p>
+            <a:fld id="{93395105-7618-4763-9D06-A2B4F6609439}" type="slidenum">
+              <a:rPr lang="fr-FR" altLang="fr-FR" smtClean="0"/>
+              <a:pPr/>
+              <a:t>2</a:t>
+            </a:fld>
+            <a:endParaRPr lang="fr-FR" altLang="fr-FR" dirty="0"/>
+          </a:p>
+        </p:txBody>
+      </p:sp>
     </p:spTree>
     <p:extLst>
       <p:ext uri="{BB962C8B-B14F-4D97-AF65-F5344CB8AC3E}">
@@ -6320,11 +6499,7 @@
           <a:p>
             <a:r>
               <a:rPr lang="fr-FR" dirty="0" smtClean="0"/>
-              <a:t>Objectifs d’a</a:t>
-            </a:r>
-            <a:r>
-              <a:rPr lang="fr-FR" dirty="0" smtClean="0"/>
-              <a:t>utoformation</a:t>
+              <a:t>Objectifs d’autoformation</a:t>
             </a:r>
             <a:endParaRPr lang="fr-FR" dirty="0"/>
           </a:p>
@@ -6392,6 +6567,30 @@
               <a:rPr lang="fr-FR" dirty="0" smtClean="0"/>
               <a:t>Travail d’équipe multidisciplinaire</a:t>
             </a:r>
+          </a:p>
+        </p:txBody>
+      </p:sp>
+      <p:sp>
+        <p:nvSpPr>
+          <p:cNvPr id="4" name="Slide Number Placeholder 3"/>
+          <p:cNvSpPr>
+            <a:spLocks noGrp="1"/>
+          </p:cNvSpPr>
+          <p:nvPr>
+            <p:ph type="sldNum" sz="quarter" idx="11"/>
+          </p:nvPr>
+        </p:nvSpPr>
+        <p:spPr/>
+        <p:txBody>
+          <a:bodyPr/>
+          <a:lstStyle/>
+          <a:p>
+            <a:fld id="{93395105-7618-4763-9D06-A2B4F6609439}" type="slidenum">
+              <a:rPr lang="fr-FR" altLang="fr-FR" smtClean="0"/>
+              <a:pPr/>
+              <a:t>3</a:t>
+            </a:fld>
+            <a:endParaRPr lang="fr-FR" altLang="fr-FR" dirty="0"/>
           </a:p>
         </p:txBody>
       </p:sp>
@@ -6484,7 +6683,6 @@
               <a:rPr lang="fr-FR" dirty="0" smtClean="0"/>
               <a:t>Portage du noyau Linux/uClinux </a:t>
             </a:r>
-            <a:endParaRPr lang="fr-FR" dirty="0" smtClean="0"/>
           </a:p>
           <a:p>
             <a:pPr lvl="1"/>
@@ -6505,6 +6703,30 @@
               <a:buNone/>
             </a:pPr>
             <a:endParaRPr lang="fr-FR" dirty="0"/>
+          </a:p>
+        </p:txBody>
+      </p:sp>
+      <p:sp>
+        <p:nvSpPr>
+          <p:cNvPr id="4" name="Slide Number Placeholder 3"/>
+          <p:cNvSpPr>
+            <a:spLocks noGrp="1"/>
+          </p:cNvSpPr>
+          <p:nvPr>
+            <p:ph type="sldNum" sz="quarter" idx="11"/>
+          </p:nvPr>
+        </p:nvSpPr>
+        <p:spPr/>
+        <p:txBody>
+          <a:bodyPr/>
+          <a:lstStyle/>
+          <a:p>
+            <a:fld id="{93395105-7618-4763-9D06-A2B4F6609439}" type="slidenum">
+              <a:rPr lang="fr-FR" altLang="fr-FR" smtClean="0"/>
+              <a:pPr/>
+              <a:t>4</a:t>
+            </a:fld>
+            <a:endParaRPr lang="fr-FR" altLang="fr-FR" dirty="0"/>
           </a:p>
         </p:txBody>
       </p:sp>
@@ -6581,7 +6803,12 @@
             <p:ph idx="1"/>
           </p:nvPr>
         </p:nvSpPr>
-        <p:spPr/>
+        <p:spPr>
+          <a:xfrm>
+            <a:off x="467544" y="1556792"/>
+            <a:ext cx="8229600" cy="4968552"/>
+          </a:xfrm>
+        </p:spPr>
         <p:txBody>
           <a:bodyPr/>
           <a:lstStyle/>
@@ -6605,6 +6832,29 @@
               <a:rPr lang="fr-FR" dirty="0" smtClean="0"/>
               <a:t>)</a:t>
             </a:r>
+          </a:p>
+          <a:p>
+            <a:pPr lvl="1"/>
+            <a:r>
+              <a:rPr lang="fr-FR" dirty="0" smtClean="0"/>
+              <a:t>NOR: 32Mo, </a:t>
+            </a:r>
+            <a:r>
+              <a:rPr lang="fr-FR" dirty="0" err="1" smtClean="0"/>
+              <a:t>eXecute</a:t>
+            </a:r>
+            <a:r>
+              <a:rPr lang="fr-FR" dirty="0" smtClean="0"/>
+              <a:t> In Place</a:t>
+            </a:r>
+          </a:p>
+          <a:p>
+            <a:pPr lvl="1"/>
+            <a:r>
+              <a:rPr lang="fr-FR" dirty="0" smtClean="0"/>
+              <a:t>SDRAM: 32Mo</a:t>
+            </a:r>
+            <a:endParaRPr lang="fr-FR" dirty="0" smtClean="0"/>
           </a:p>
           <a:p>
             <a:pPr lvl="1"/>
@@ -6643,6 +6893,30 @@
               <a:buNone/>
             </a:pPr>
             <a:endParaRPr lang="fr-FR" dirty="0"/>
+          </a:p>
+        </p:txBody>
+      </p:sp>
+      <p:sp>
+        <p:nvSpPr>
+          <p:cNvPr id="4" name="Slide Number Placeholder 3"/>
+          <p:cNvSpPr>
+            <a:spLocks noGrp="1"/>
+          </p:cNvSpPr>
+          <p:nvPr>
+            <p:ph type="sldNum" sz="quarter" idx="11"/>
+          </p:nvPr>
+        </p:nvSpPr>
+        <p:spPr/>
+        <p:txBody>
+          <a:bodyPr/>
+          <a:lstStyle/>
+          <a:p>
+            <a:fld id="{93395105-7618-4763-9D06-A2B4F6609439}" type="slidenum">
+              <a:rPr lang="fr-FR" altLang="fr-FR" smtClean="0"/>
+              <a:pPr/>
+              <a:t>5</a:t>
+            </a:fld>
+            <a:endParaRPr lang="fr-FR" altLang="fr-FR" dirty="0"/>
           </a:p>
         </p:txBody>
       </p:sp>
@@ -6719,7 +6993,12 @@
             <p:ph idx="1"/>
           </p:nvPr>
         </p:nvSpPr>
-        <p:spPr/>
+        <p:spPr>
+          <a:xfrm>
+            <a:off x="467544" y="1412776"/>
+            <a:ext cx="8229600" cy="4328120"/>
+          </a:xfrm>
+        </p:spPr>
         <p:txBody>
           <a:bodyPr/>
           <a:lstStyle/>
@@ -6740,19 +7019,58 @@
             <a:pPr lvl="1"/>
             <a:r>
               <a:rPr lang="fr-FR" dirty="0" smtClean="0"/>
-              <a:t>LCD: écran New </a:t>
+              <a:t>NOR</a:t>
+            </a:r>
+            <a:r>
+              <a:rPr lang="fr-FR" dirty="0"/>
+              <a:t>: </a:t>
+            </a:r>
+            <a:r>
+              <a:rPr lang="fr-FR" dirty="0" err="1"/>
+              <a:t>Spansion</a:t>
+            </a:r>
+            <a:r>
+              <a:rPr lang="fr-FR" dirty="0"/>
+              <a:t> </a:t>
+            </a:r>
+            <a:r>
+              <a:rPr lang="fr-FR" dirty="0" smtClean="0"/>
+              <a:t>S29GL256P90TFIR20 (32Mo)</a:t>
+            </a:r>
+          </a:p>
+          <a:p>
+            <a:pPr lvl="1"/>
+            <a:r>
+              <a:rPr lang="fr-FR" dirty="0" smtClean="0"/>
+              <a:t>SDRAM</a:t>
+            </a:r>
+            <a:r>
+              <a:rPr lang="fr-FR" dirty="0"/>
+              <a:t>: Micron </a:t>
+            </a:r>
+            <a:r>
+              <a:rPr lang="fr-FR" dirty="0" smtClean="0"/>
+              <a:t>MT48LC32M8A2P7E (32Mo)</a:t>
+            </a:r>
+            <a:endParaRPr lang="fr-FR" dirty="0" smtClean="0"/>
+          </a:p>
+          <a:p>
+            <a:pPr lvl="1"/>
+            <a:r>
+              <a:rPr lang="fr-FR" dirty="0" smtClean="0"/>
+              <a:t>LCD: écran </a:t>
+            </a:r>
+            <a:r>
+              <a:rPr lang="fr-FR" dirty="0" smtClean="0"/>
+              <a:t>New </a:t>
             </a:r>
             <a:r>
               <a:rPr lang="fr-FR" dirty="0" err="1" smtClean="0"/>
               <a:t>Haven</a:t>
             </a:r>
             <a:r>
-              <a:rPr lang="fr-FR" smtClean="0"/>
-              <a:t> Display </a:t>
-            </a:r>
-            <a:r>
               <a:rPr lang="fr-FR" dirty="0" smtClean="0"/>
-              <a:t>récupéré avec driver </a:t>
+              <a:t> Display récupéré avec driver </a:t>
             </a:r>
             <a:r>
               <a:rPr lang="fr-FR" dirty="0" err="1" smtClean="0"/>
@@ -6771,18 +7089,24 @@
             <a:pPr lvl="1"/>
             <a:r>
               <a:rPr lang="fr-FR" dirty="0" smtClean="0"/>
-              <a:t>UART</a:t>
-            </a:r>
+              <a:t>UART, GPIO</a:t>
+            </a:r>
+            <a:endParaRPr lang="fr-FR" dirty="0" smtClean="0"/>
           </a:p>
           <a:p>
             <a:pPr lvl="1"/>
             <a:r>
               <a:rPr lang="fr-FR" dirty="0" smtClean="0"/>
-              <a:t>GPIO</a:t>
-            </a:r>
-          </a:p>
-          <a:p>
-            <a:pPr lvl="1"/>
+              <a:t>Alimentations: 3.3V et 21V (</a:t>
+            </a:r>
+            <a:r>
+              <a:rPr lang="fr-FR" dirty="0" err="1" smtClean="0"/>
+              <a:t>backlight</a:t>
+            </a:r>
+            <a:r>
+              <a:rPr lang="fr-FR" dirty="0" smtClean="0"/>
+              <a:t>)</a:t>
+            </a:r>
             <a:endParaRPr lang="fr-FR" dirty="0" smtClean="0"/>
           </a:p>
           <a:p>
@@ -6790,6 +7114,30 @@
               <a:buNone/>
             </a:pPr>
             <a:endParaRPr lang="fr-FR" dirty="0"/>
+          </a:p>
+        </p:txBody>
+      </p:sp>
+      <p:sp>
+        <p:nvSpPr>
+          <p:cNvPr id="4" name="Slide Number Placeholder 3"/>
+          <p:cNvSpPr>
+            <a:spLocks noGrp="1"/>
+          </p:cNvSpPr>
+          <p:nvPr>
+            <p:ph type="sldNum" sz="quarter" idx="11"/>
+          </p:nvPr>
+        </p:nvSpPr>
+        <p:spPr/>
+        <p:txBody>
+          <a:bodyPr/>
+          <a:lstStyle/>
+          <a:p>
+            <a:fld id="{93395105-7618-4763-9D06-A2B4F6609439}" type="slidenum">
+              <a:rPr lang="fr-FR" altLang="fr-FR" smtClean="0"/>
+              <a:pPr/>
+              <a:t>6</a:t>
+            </a:fld>
+            <a:endParaRPr lang="fr-FR" altLang="fr-FR" dirty="0"/>
           </a:p>
         </p:txBody>
       </p:sp>
@@ -6885,7 +7233,7 @@
             <a:pPr lvl="1"/>
             <a:r>
               <a:rPr lang="fr-FR" dirty="0" smtClean="0"/>
-              <a:t>Schémas: </a:t>
+              <a:t>Schémas/Routage: </a:t>
             </a:r>
             <a:r>
               <a:rPr lang="fr-FR" dirty="0" smtClean="0"/>
@@ -7169,6 +7517,30 @@
           </a:p>
         </p:txBody>
       </p:sp>
+      <p:sp>
+        <p:nvSpPr>
+          <p:cNvPr id="5" name="Slide Number Placeholder 4"/>
+          <p:cNvSpPr>
+            <a:spLocks noGrp="1"/>
+          </p:cNvSpPr>
+          <p:nvPr>
+            <p:ph type="sldNum" sz="quarter" idx="11"/>
+          </p:nvPr>
+        </p:nvSpPr>
+        <p:spPr/>
+        <p:txBody>
+          <a:bodyPr/>
+          <a:lstStyle/>
+          <a:p>
+            <a:fld id="{93395105-7618-4763-9D06-A2B4F6609439}" type="slidenum">
+              <a:rPr lang="fr-FR" altLang="fr-FR" smtClean="0"/>
+              <a:pPr/>
+              <a:t>7</a:t>
+            </a:fld>
+            <a:endParaRPr lang="fr-FR" altLang="fr-FR" dirty="0"/>
+          </a:p>
+        </p:txBody>
+      </p:sp>
     </p:spTree>
     <p:extLst>
       <p:ext uri="{BB962C8B-B14F-4D97-AF65-F5344CB8AC3E}">
@@ -7276,6 +7648,30 @@
               <a:t>Soft: mémoires (U-Boot, OpenOCD)</a:t>
             </a:r>
             <a:endParaRPr lang="fr-FR" dirty="0"/>
+          </a:p>
+        </p:txBody>
+      </p:sp>
+      <p:sp>
+        <p:nvSpPr>
+          <p:cNvPr id="4" name="Slide Number Placeholder 3"/>
+          <p:cNvSpPr>
+            <a:spLocks noGrp="1"/>
+          </p:cNvSpPr>
+          <p:nvPr>
+            <p:ph type="sldNum" sz="quarter" idx="11"/>
+          </p:nvPr>
+        </p:nvSpPr>
+        <p:spPr/>
+        <p:txBody>
+          <a:bodyPr/>
+          <a:lstStyle/>
+          <a:p>
+            <a:fld id="{93395105-7618-4763-9D06-A2B4F6609439}" type="slidenum">
+              <a:rPr lang="fr-FR" altLang="fr-FR" smtClean="0"/>
+              <a:pPr/>
+              <a:t>8</a:t>
+            </a:fld>
+            <a:endParaRPr lang="fr-FR" altLang="fr-FR" dirty="0"/>
           </a:p>
         </p:txBody>
       </p:sp>
@@ -7724,6 +8120,30 @@
           </a:p>
         </p:txBody>
       </p:sp>
+      <p:sp>
+        <p:nvSpPr>
+          <p:cNvPr id="4" name="Slide Number Placeholder 3"/>
+          <p:cNvSpPr>
+            <a:spLocks noGrp="1"/>
+          </p:cNvSpPr>
+          <p:nvPr>
+            <p:ph type="sldNum" sz="quarter" idx="11"/>
+          </p:nvPr>
+        </p:nvSpPr>
+        <p:spPr/>
+        <p:txBody>
+          <a:bodyPr/>
+          <a:lstStyle/>
+          <a:p>
+            <a:fld id="{93395105-7618-4763-9D06-A2B4F6609439}" type="slidenum">
+              <a:rPr lang="fr-FR" altLang="fr-FR" smtClean="0"/>
+              <a:pPr/>
+              <a:t>9</a:t>
+            </a:fld>
+            <a:endParaRPr lang="fr-FR" altLang="fr-FR" dirty="0"/>
+          </a:p>
+        </p:txBody>
+      </p:sp>
     </p:spTree>
     <p:extLst>
       <p:ext uri="{BB962C8B-B14F-4D97-AF65-F5344CB8AC3E}">
@@ -7734,6 +8154,13 @@
   <p:clrMapOvr>
     <a:masterClrMapping/>
   </p:clrMapOvr>
+  <p:timing>
+    <p:tnLst>
+      <p:par>
+        <p:cTn id="1" dur="indefinite" restart="never" nodeType="tmRoot"/>
+      </p:par>
+    </p:tnLst>
+  </p:timing>
 </p:sld>
 </file>
 

</xml_diff>

<commit_message>
Routing ongoing.. Little cleanup.
</commit_message>
<xml_diff>
--- a/Rendu/PresentationFinale/Binome13PresentationFinalePRT.pptx
+++ b/Rendu/PresentationFinale/Binome13PresentationFinalePRT.pptx
@@ -5,22 +5,23 @@
     <p:sldMasterId id="2147483653" r:id="rId1"/>
   </p:sldMasterIdLst>
   <p:notesMasterIdLst>
-    <p:notesMasterId r:id="rId15"/>
+    <p:notesMasterId r:id="rId16"/>
   </p:notesMasterIdLst>
   <p:sldIdLst>
     <p:sldId id="256" r:id="rId2"/>
     <p:sldId id="257" r:id="rId3"/>
-    <p:sldId id="258" r:id="rId4"/>
-    <p:sldId id="268" r:id="rId5"/>
-    <p:sldId id="259" r:id="rId6"/>
-    <p:sldId id="260" r:id="rId7"/>
-    <p:sldId id="261" r:id="rId8"/>
-    <p:sldId id="262" r:id="rId9"/>
-    <p:sldId id="263" r:id="rId10"/>
-    <p:sldId id="264" r:id="rId11"/>
-    <p:sldId id="265" r:id="rId12"/>
-    <p:sldId id="266" r:id="rId13"/>
-    <p:sldId id="267" r:id="rId14"/>
+    <p:sldId id="269" r:id="rId4"/>
+    <p:sldId id="258" r:id="rId5"/>
+    <p:sldId id="268" r:id="rId6"/>
+    <p:sldId id="259" r:id="rId7"/>
+    <p:sldId id="260" r:id="rId8"/>
+    <p:sldId id="261" r:id="rId9"/>
+    <p:sldId id="262" r:id="rId10"/>
+    <p:sldId id="263" r:id="rId11"/>
+    <p:sldId id="264" r:id="rId12"/>
+    <p:sldId id="265" r:id="rId13"/>
+    <p:sldId id="266" r:id="rId14"/>
+    <p:sldId id="267" r:id="rId15"/>
   </p:sldIdLst>
   <p:sldSz cx="9144000" cy="6858000" type="screen4x3"/>
   <p:notesSz cx="6858000" cy="9144000"/>
@@ -250,7 +251,7 @@
           <a:p>
             <a:fld id="{45ACAB89-1F3E-4162-94CA-EF529DBC97EB}" type="datetimeFigureOut">
               <a:rPr lang="fr-FR" smtClean="0"/>
-              <a:t>07/06/2015</a:t>
+              <a:t>08/06/2015</a:t>
             </a:fld>
             <a:endParaRPr lang="fr-FR"/>
           </a:p>
@@ -774,7 +775,7 @@
           <a:p>
             <a:fld id="{CB2D9C16-2529-4A25-A30D-87EB28A90E76}" type="slidenum">
               <a:rPr lang="fr-FR" smtClean="0"/>
-              <a:t>11</a:t>
+              <a:t>12</a:t>
             </a:fld>
             <a:endParaRPr lang="fr-FR"/>
           </a:p>
@@ -870,7 +871,7 @@
           <a:p>
             <a:fld id="{CB2D9C16-2529-4A25-A30D-87EB28A90E76}" type="slidenum">
               <a:rPr lang="fr-FR" smtClean="0"/>
-              <a:t>12</a:t>
+              <a:t>13</a:t>
             </a:fld>
             <a:endParaRPr lang="fr-FR"/>
           </a:p>
@@ -962,7 +963,7 @@
           <a:p>
             <a:fld id="{CB2D9C16-2529-4A25-A30D-87EB28A90E76}" type="slidenum">
               <a:rPr lang="fr-FR" smtClean="0"/>
-              <a:t>13</a:t>
+              <a:t>14</a:t>
             </a:fld>
             <a:endParaRPr lang="fr-FR" dirty="0"/>
           </a:p>
@@ -1031,11 +1032,7 @@
             </a:r>
             <a:r>
               <a:rPr lang="fr-FR" baseline="0" dirty="0" smtClean="0"/>
-              <a:t> ARM -&gt; </a:t>
-            </a:r>
-            <a:r>
-              <a:rPr lang="fr-FR" baseline="0" dirty="0" smtClean="0"/>
-              <a:t>Badr</a:t>
+              <a:t> ARM -&gt; Badr</a:t>
             </a:r>
           </a:p>
           <a:p>
@@ -1063,7 +1060,7 @@
           <a:p>
             <a:fld id="{CB2D9C16-2529-4A25-A30D-87EB28A90E76}" type="slidenum">
               <a:rPr lang="fr-FR" smtClean="0"/>
-              <a:t>3</a:t>
+              <a:t>4</a:t>
             </a:fld>
             <a:endParaRPr lang="fr-FR"/>
           </a:p>
@@ -1142,11 +1139,7 @@
             </a:pPr>
             <a:r>
               <a:rPr lang="fr-FR" dirty="0" smtClean="0"/>
-              <a:t>Développement d’une carte -&gt; </a:t>
-            </a:r>
-            <a:r>
-              <a:rPr lang="fr-FR" dirty="0" smtClean="0"/>
-              <a:t>Badr</a:t>
+              <a:t>Développement d’une carte -&gt; Badr</a:t>
             </a:r>
           </a:p>
           <a:p>
@@ -1208,7 +1201,7 @@
           <a:p>
             <a:fld id="{CB2D9C16-2529-4A25-A30D-87EB28A90E76}" type="slidenum">
               <a:rPr lang="fr-FR" smtClean="0"/>
-              <a:t>4</a:t>
+              <a:t>5</a:t>
             </a:fld>
             <a:endParaRPr lang="fr-FR"/>
           </a:p>
@@ -1333,11 +1326,7 @@
             </a:r>
             <a:r>
               <a:rPr lang="fr-FR" baseline="0" dirty="0" smtClean="0"/>
-              <a:t> -&gt; </a:t>
-            </a:r>
-            <a:r>
-              <a:rPr lang="fr-FR" baseline="0" dirty="0" smtClean="0"/>
-              <a:t>Badr</a:t>
+              <a:t> -&gt; Badr</a:t>
             </a:r>
           </a:p>
           <a:p>
@@ -1360,15 +1349,7 @@
             </a:pPr>
             <a:r>
               <a:rPr lang="fr-FR" dirty="0" smtClean="0"/>
-              <a:t>Du </a:t>
-            </a:r>
-            <a:r>
-              <a:rPr lang="fr-FR" dirty="0" smtClean="0"/>
-              <a:t>point de vue hardware, </a:t>
-            </a:r>
-            <a:r>
-              <a:rPr lang="fr-FR" dirty="0" smtClean="0"/>
-              <a:t>les challenges sont :</a:t>
+              <a:t>Du point de vue hardware, les challenges sont :</a:t>
             </a:r>
           </a:p>
           <a:p>
@@ -1391,11 +1372,7 @@
             </a:pPr>
             <a:r>
               <a:rPr lang="fr-FR" dirty="0" smtClean="0"/>
-              <a:t>De </a:t>
-            </a:r>
-            <a:r>
-              <a:rPr lang="fr-FR" dirty="0" smtClean="0"/>
-              <a:t>produire</a:t>
+              <a:t>De produire</a:t>
             </a:r>
             <a:r>
               <a:rPr lang="fr-FR" baseline="0" dirty="0" smtClean="0"/>
@@ -1407,11 +1384,7 @@
             </a:r>
             <a:r>
               <a:rPr lang="fr-FR" baseline="0" dirty="0" smtClean="0"/>
-              <a:t> dans un produit éventuellement par la </a:t>
-            </a:r>
-            <a:r>
-              <a:rPr lang="fr-FR" baseline="0" dirty="0" smtClean="0"/>
-              <a:t>suite</a:t>
+              <a:t> dans un produit éventuellement par la suite</a:t>
             </a:r>
           </a:p>
           <a:p>
@@ -1434,15 +1407,7 @@
             </a:pPr>
             <a:r>
               <a:rPr lang="fr-FR" baseline="0" dirty="0" smtClean="0"/>
-              <a:t>Une carte n’explosant </a:t>
-            </a:r>
-            <a:r>
-              <a:rPr lang="fr-FR" baseline="0" dirty="0" smtClean="0"/>
-              <a:t>pas le nombre de couches nécessaires à la réalisation du PCB pour rester dans les 100€ du budget </a:t>
-            </a:r>
-            <a:r>
-              <a:rPr lang="fr-FR" baseline="0" dirty="0" smtClean="0"/>
-              <a:t>PRT</a:t>
+              <a:t>Une carte n’explosant pas le nombre de couches nécessaires à la réalisation du PCB pour rester dans les 100€ du budget PRT</a:t>
             </a:r>
           </a:p>
           <a:p>
@@ -1488,13 +1453,8 @@
             </a:pPr>
             <a:r>
               <a:rPr lang="fr-FR" baseline="0" dirty="0" smtClean="0"/>
-              <a:t>Soudable </a:t>
-            </a:r>
-            <a:r>
-              <a:rPr lang="fr-FR" baseline="0" dirty="0" smtClean="0"/>
-              <a:t>à la main ou avec éventuellement une première passe dans un four quelconque </a:t>
-            </a:r>
-            <a:endParaRPr lang="fr-FR" baseline="0" dirty="0" smtClean="0"/>
+              <a:t>Soudable à la main ou avec éventuellement une première passe dans un four quelconque </a:t>
+            </a:r>
           </a:p>
           <a:p>
             <a:pPr marL="628650" marR="0" lvl="2" indent="-171450" algn="l" defTabSz="914400" rtl="0" eaLnBrk="1" fontAlgn="auto" latinLnBrk="0" hangingPunct="1">
@@ -1516,15 +1476,7 @@
             </a:pPr>
             <a:r>
               <a:rPr lang="fr-FR" baseline="0" dirty="0" smtClean="0"/>
-              <a:t>Que l’on puisse </a:t>
-            </a:r>
-            <a:r>
-              <a:rPr lang="fr-FR" baseline="0" dirty="0" smtClean="0"/>
-              <a:t>débuguer avec le matériel dont on </a:t>
-            </a:r>
-            <a:r>
-              <a:rPr lang="fr-FR" baseline="0" dirty="0" smtClean="0"/>
-              <a:t>dispose</a:t>
+              <a:t>Que l’on puisse débuguer avec le matériel dont on dispose</a:t>
             </a:r>
           </a:p>
           <a:p>
@@ -1594,7 +1546,7 @@
           <a:p>
             <a:fld id="{CB2D9C16-2529-4A25-A30D-87EB28A90E76}" type="slidenum">
               <a:rPr lang="fr-FR" smtClean="0"/>
-              <a:t>5</a:t>
+              <a:t>6</a:t>
             </a:fld>
             <a:endParaRPr lang="fr-FR" dirty="0"/>
           </a:p>
@@ -1663,11 +1615,7 @@
             </a:pPr>
             <a:r>
               <a:rPr lang="fr-FR" dirty="0" smtClean="0"/>
-              <a:t>Alimentations -&gt; </a:t>
-            </a:r>
-            <a:r>
-              <a:rPr lang="fr-FR" dirty="0" smtClean="0"/>
-              <a:t>Badr</a:t>
+              <a:t>Alimentations -&gt; Badr</a:t>
             </a:r>
           </a:p>
           <a:p>
@@ -1755,11 +1703,7 @@
             </a:r>
             <a:r>
               <a:rPr lang="fr-FR" baseline="0" dirty="0" smtClean="0"/>
-              <a:t> -&gt; </a:t>
-            </a:r>
-            <a:r>
-              <a:rPr lang="fr-FR" baseline="0" dirty="0" smtClean="0"/>
-              <a:t>Badr</a:t>
+              <a:t> -&gt; Badr</a:t>
             </a:r>
           </a:p>
           <a:p>
@@ -1805,9 +1749,16 @@
             </a:pPr>
             <a:r>
               <a:rPr lang="fr-FR" baseline="0" dirty="0" smtClean="0"/>
-              <a:t>Pour supporter tous les périphériques que nous désirons implémenter, il reste les Cortex M3, M4 et M7. Les M7 étant surdimensionnés par rapport à nos besoins, les M4 étant des M3 avec un DSP et une FPU optionnelle nous avons choisis de partir sur un M4.</a:t>
-            </a:r>
-            <a:endParaRPr lang="fr-FR" baseline="0" dirty="0" smtClean="0"/>
+              <a:t>Pour supporter tous les périphériques que nous désirons implémenter, il reste les Cortex M3, M4 et M7. Les M7 étant </a:t>
+            </a:r>
+            <a:r>
+              <a:rPr lang="fr-FR" baseline="0" smtClean="0"/>
+              <a:t>trop récents, les </a:t>
+            </a:r>
+            <a:r>
+              <a:rPr lang="fr-FR" baseline="0" dirty="0" smtClean="0"/>
+              <a:t>M4 étant des M3 avec un DSP et une FPU optionnelle nous avons choisis de partir sur un M4.</a:t>
+            </a:r>
           </a:p>
           <a:p>
             <a:pPr marL="171450" indent="-171450">
@@ -1836,11 +1787,7 @@
             </a:pPr>
             <a:r>
               <a:rPr lang="fr-FR" baseline="0" dirty="0" smtClean="0"/>
-              <a:t>LCD -&gt; Badr, on choisit un LCD parce qu’on en a récupéré </a:t>
-            </a:r>
-            <a:r>
-              <a:rPr lang="fr-FR" baseline="0" dirty="0" smtClean="0"/>
-              <a:t>un sur une carte de développement TI qui trainait au </a:t>
+              <a:t>LCD -&gt; Badr, on choisit un LCD parce qu’on en a récupéré un sur une carte de développement TI qui trainait au </a:t>
             </a:r>
             <a:r>
               <a:rPr lang="fr-FR" baseline="0" dirty="0" err="1" smtClean="0"/>
@@ -1850,7 +1797,6 @@
               <a:rPr lang="fr-FR" baseline="0" dirty="0" smtClean="0"/>
               <a:t>, le choix s’est imposé à nous.</a:t>
             </a:r>
-            <a:endParaRPr lang="fr-FR" baseline="0" dirty="0" smtClean="0"/>
           </a:p>
           <a:p>
             <a:pPr marL="171450" indent="-171450">
@@ -1859,11 +1805,7 @@
             </a:pPr>
             <a:r>
               <a:rPr lang="fr-FR" baseline="0" dirty="0" smtClean="0"/>
-              <a:t>USB -&gt; </a:t>
-            </a:r>
-            <a:r>
-              <a:rPr lang="fr-FR" baseline="0" dirty="0" smtClean="0"/>
-              <a:t>Badr</a:t>
+              <a:t>USB -&gt; Badr</a:t>
             </a:r>
           </a:p>
           <a:p>
@@ -1885,7 +1827,16 @@
               <a:rPr lang="fr-FR" baseline="0" dirty="0" smtClean="0"/>
               <a:t>Le MCU embarque un PHY (couche physique/driver de lignes D+ et D-) gérant le Full-Speed, économie de sous, de place sur le PCB et de temps d’intégration</a:t>
             </a:r>
-            <a:endParaRPr lang="fr-FR" baseline="0" dirty="0" smtClean="0"/>
+          </a:p>
+          <a:p>
+            <a:pPr marL="628650" lvl="1" indent="-171450">
+              <a:buFont typeface="Arial" panose="020B0604020202020204" pitchFamily="34" charset="0"/>
+              <a:buChar char="•"/>
+            </a:pPr>
+            <a:r>
+              <a:rPr lang="fr-FR" baseline="0" dirty="0" smtClean="0"/>
+              <a:t>Limiteur de courant</a:t>
+            </a:r>
           </a:p>
           <a:p>
             <a:pPr marL="171450" indent="-171450">
@@ -1935,7 +1886,7 @@
           <a:p>
             <a:fld id="{CB2D9C16-2529-4A25-A30D-87EB28A90E76}" type="slidenum">
               <a:rPr lang="fr-FR" smtClean="0"/>
-              <a:t>6</a:t>
+              <a:t>7</a:t>
             </a:fld>
             <a:endParaRPr lang="fr-FR"/>
           </a:p>
@@ -2029,11 +1980,7 @@
             </a:r>
             <a:r>
               <a:rPr lang="fr-FR" baseline="0" dirty="0" smtClean="0"/>
-              <a:t>-&gt; </a:t>
-            </a:r>
-            <a:r>
-              <a:rPr lang="fr-FR" baseline="0" dirty="0" smtClean="0"/>
-              <a:t>Douglas</a:t>
+              <a:t>-&gt; Douglas</a:t>
             </a:r>
           </a:p>
           <a:p>
@@ -2064,13 +2011,8 @@
                   <a:srgbClr val="FF0000"/>
                 </a:solidFill>
               </a:rPr>
-              <a:t>Douglas</a:t>
-            </a:r>
-            <a:endParaRPr lang="fr-FR" baseline="0" dirty="0" smtClean="0">
-              <a:solidFill>
-                <a:srgbClr val="FF0000"/>
-              </a:solidFill>
-            </a:endParaRPr>
+              <a:t>Badr</a:t>
+            </a:r>
           </a:p>
           <a:p>
             <a:pPr marL="171450" marR="0" indent="-171450" algn="l" defTabSz="914400" rtl="0" eaLnBrk="1" fontAlgn="auto" latinLnBrk="0" hangingPunct="1">
@@ -2204,11 +2146,6 @@
               </a:rPr>
               <a:t> Display</a:t>
             </a:r>
-            <a:endParaRPr lang="fr-FR" baseline="0" dirty="0" smtClean="0">
-              <a:solidFill>
-                <a:srgbClr val="FF0000"/>
-              </a:solidFill>
-            </a:endParaRPr>
           </a:p>
           <a:p>
             <a:pPr marL="171450" marR="0" indent="-171450" algn="l" defTabSz="914400" rtl="0" eaLnBrk="1" fontAlgn="auto" latinLnBrk="0" hangingPunct="1">
@@ -2265,7 +2202,7 @@
           <a:p>
             <a:fld id="{CB2D9C16-2529-4A25-A30D-87EB28A90E76}" type="slidenum">
               <a:rPr lang="fr-FR" smtClean="0"/>
-              <a:t>7</a:t>
+              <a:t>8</a:t>
             </a:fld>
             <a:endParaRPr lang="fr-FR"/>
           </a:p>
@@ -2349,11 +2286,7 @@
             </a:pPr>
             <a:r>
               <a:rPr lang="fr-FR" baseline="0" dirty="0" smtClean="0"/>
-              <a:t>250 signaux, 103 </a:t>
-            </a:r>
-            <a:r>
-              <a:rPr lang="fr-FR" baseline="0" dirty="0" smtClean="0"/>
-              <a:t>composants</a:t>
+              <a:t>250 signaux, 103 composants</a:t>
             </a:r>
           </a:p>
           <a:p>
@@ -2529,7 +2462,7 @@
           <a:p>
             <a:fld id="{CB2D9C16-2529-4A25-A30D-87EB28A90E76}" type="slidenum">
               <a:rPr lang="fr-FR" smtClean="0"/>
-              <a:t>8</a:t>
+              <a:t>9</a:t>
             </a:fld>
             <a:endParaRPr lang="fr-FR"/>
           </a:p>
@@ -2602,11 +2535,7 @@
             </a:r>
             <a:r>
               <a:rPr lang="fr-FR" baseline="0" dirty="0" smtClean="0"/>
-              <a:t> </a:t>
-            </a:r>
-            <a:r>
-              <a:rPr lang="fr-FR" baseline="0" dirty="0" smtClean="0"/>
-              <a:t>Badr</a:t>
+              <a:t> Badr</a:t>
             </a:r>
           </a:p>
           <a:p>
@@ -2644,11 +2573,7 @@
             </a:pPr>
             <a:r>
               <a:rPr lang="fr-FR" baseline="0" dirty="0" smtClean="0"/>
-              <a:t>Soft </a:t>
-            </a:r>
-            <a:r>
-              <a:rPr lang="fr-FR" baseline="0" dirty="0" smtClean="0"/>
-              <a:t>-&gt; Douglas</a:t>
+              <a:t>Soft -&gt; Douglas</a:t>
             </a:r>
             <a:endParaRPr lang="fr-FR" dirty="0"/>
           </a:p>
@@ -2671,7 +2596,7 @@
           <a:p>
             <a:fld id="{CB2D9C16-2529-4A25-A30D-87EB28A90E76}" type="slidenum">
               <a:rPr lang="fr-FR" smtClean="0"/>
-              <a:t>9</a:t>
+              <a:t>10</a:t>
             </a:fld>
             <a:endParaRPr lang="fr-FR"/>
           </a:p>
@@ -2780,7 +2705,7 @@
           <a:p>
             <a:fld id="{CB2D9C16-2529-4A25-A30D-87EB28A90E76}" type="slidenum">
               <a:rPr lang="fr-FR" smtClean="0"/>
-              <a:t>10</a:t>
+              <a:t>11</a:t>
             </a:fld>
             <a:endParaRPr lang="fr-FR"/>
           </a:p>
@@ -7236,6 +7161,12 @@
             </a:r>
           </a:p>
           <a:p>
+            <a:r>
+              <a:rPr lang="fr-FR" sz="2000" dirty="0" smtClean="0"/>
+              <a:t>Tuteur : Thomas GRENIER</a:t>
+            </a:r>
+          </a:p>
+          <a:p>
             <a:endParaRPr lang="fr-FR" sz="2000" dirty="0"/>
           </a:p>
           <a:p>
@@ -7274,6 +7205,203 @@
 </file>
 
 <file path=ppt/slides/slide10.xml><?xml version="1.0" encoding="utf-8"?>
+<p:sld xmlns:a="http://schemas.openxmlformats.org/drawingml/2006/main" xmlns:r="http://schemas.openxmlformats.org/officeDocument/2006/relationships" xmlns:p="http://schemas.openxmlformats.org/presentationml/2006/main">
+  <p:cSld>
+    <p:spTree>
+      <p:nvGrpSpPr>
+        <p:cNvPr id="1" name=""/>
+        <p:cNvGrpSpPr/>
+        <p:nvPr/>
+      </p:nvGrpSpPr>
+      <p:grpSpPr>
+        <a:xfrm>
+          <a:off x="0" y="0"/>
+          <a:ext cx="0" cy="0"/>
+          <a:chOff x="0" y="0"/>
+          <a:chExt cx="0" cy="0"/>
+        </a:xfrm>
+      </p:grpSpPr>
+      <p:sp>
+        <p:nvSpPr>
+          <p:cNvPr id="2" name="Title 1"/>
+          <p:cNvSpPr>
+            <a:spLocks noGrp="1"/>
+          </p:cNvSpPr>
+          <p:nvPr>
+            <p:ph type="title"/>
+          </p:nvPr>
+        </p:nvSpPr>
+        <p:spPr/>
+        <p:txBody>
+          <a:bodyPr/>
+          <a:lstStyle/>
+          <a:p>
+            <a:r>
+              <a:rPr lang="fr-FR" dirty="0" smtClean="0"/>
+              <a:t>Démarche de développement</a:t>
+            </a:r>
+            <a:br>
+              <a:rPr lang="fr-FR" dirty="0" smtClean="0"/>
+            </a:br>
+            <a:endParaRPr lang="fr-FR" dirty="0"/>
+          </a:p>
+        </p:txBody>
+      </p:sp>
+      <p:sp>
+        <p:nvSpPr>
+          <p:cNvPr id="3" name="Content Placeholder 2"/>
+          <p:cNvSpPr>
+            <a:spLocks noGrp="1"/>
+          </p:cNvSpPr>
+          <p:nvPr>
+            <p:ph idx="1"/>
+          </p:nvPr>
+        </p:nvSpPr>
+        <p:spPr>
+          <a:xfrm>
+            <a:off x="457200" y="1981200"/>
+            <a:ext cx="8229600" cy="2239888"/>
+          </a:xfrm>
+        </p:spPr>
+        <p:txBody>
+          <a:bodyPr/>
+          <a:lstStyle/>
+          <a:p>
+            <a:r>
+              <a:rPr lang="fr-FR" dirty="0" smtClean="0"/>
+              <a:t>Tests</a:t>
+            </a:r>
+          </a:p>
+          <a:p>
+            <a:pPr lvl="1"/>
+            <a:r>
+              <a:rPr lang="fr-FR" dirty="0" smtClean="0"/>
+              <a:t>Hard: alimentations, court-circuits</a:t>
+            </a:r>
+          </a:p>
+          <a:p>
+            <a:pPr lvl="1"/>
+            <a:r>
+              <a:rPr lang="fr-FR" dirty="0" smtClean="0"/>
+              <a:t>Soft: </a:t>
+            </a:r>
+          </a:p>
+          <a:p>
+            <a:pPr lvl="2"/>
+            <a:r>
+              <a:rPr lang="fr-FR" dirty="0" smtClean="0"/>
+              <a:t>Mémoires (U-Boot, </a:t>
+            </a:r>
+            <a:r>
+              <a:rPr lang="fr-FR" dirty="0" err="1" smtClean="0"/>
+              <a:t>OpenOCD</a:t>
+            </a:r>
+            <a:r>
+              <a:rPr lang="fr-FR" dirty="0" smtClean="0"/>
+              <a:t>)</a:t>
+            </a:r>
+          </a:p>
+          <a:p>
+            <a:pPr lvl="2"/>
+            <a:r>
+              <a:rPr lang="fr-FR" dirty="0" err="1" smtClean="0"/>
+              <a:t>Debug</a:t>
+            </a:r>
+            <a:r>
+              <a:rPr lang="fr-FR" dirty="0"/>
+              <a:t> </a:t>
+            </a:r>
+            <a:r>
+              <a:rPr lang="fr-FR" dirty="0" smtClean="0"/>
+              <a:t>(GDB et </a:t>
+            </a:r>
+            <a:r>
+              <a:rPr lang="fr-FR" dirty="0" err="1" smtClean="0"/>
+              <a:t>OpenOCD</a:t>
+            </a:r>
+            <a:r>
+              <a:rPr lang="fr-FR" dirty="0" smtClean="0"/>
+              <a:t>)</a:t>
+            </a:r>
+            <a:endParaRPr lang="fr-FR" dirty="0"/>
+          </a:p>
+        </p:txBody>
+      </p:sp>
+      <p:sp>
+        <p:nvSpPr>
+          <p:cNvPr id="4" name="Slide Number Placeholder 3"/>
+          <p:cNvSpPr>
+            <a:spLocks noGrp="1"/>
+          </p:cNvSpPr>
+          <p:nvPr>
+            <p:ph type="sldNum" sz="quarter" idx="11"/>
+          </p:nvPr>
+        </p:nvSpPr>
+        <p:spPr/>
+        <p:txBody>
+          <a:bodyPr/>
+          <a:lstStyle/>
+          <a:p>
+            <a:fld id="{93395105-7618-4763-9D06-A2B4F6609439}" type="slidenum">
+              <a:rPr lang="fr-FR" altLang="fr-FR" smtClean="0"/>
+              <a:pPr/>
+              <a:t>10</a:t>
+            </a:fld>
+            <a:endParaRPr lang="fr-FR" altLang="fr-FR" dirty="0"/>
+          </a:p>
+        </p:txBody>
+      </p:sp>
+      <p:pic>
+        <p:nvPicPr>
+          <p:cNvPr id="5" name="Image 4"/>
+          <p:cNvPicPr>
+            <a:picLocks noChangeAspect="1"/>
+          </p:cNvPicPr>
+          <p:nvPr/>
+        </p:nvPicPr>
+        <p:blipFill>
+          <a:blip r:embed="rId3" cstate="print">
+            <a:extLst>
+              <a:ext uri="{28A0092B-C50C-407E-A947-70E740481C1C}">
+                <a14:useLocalDpi xmlns:a14="http://schemas.microsoft.com/office/drawing/2010/main" val="0"/>
+              </a:ext>
+            </a:extLst>
+          </a:blip>
+          <a:stretch>
+            <a:fillRect/>
+          </a:stretch>
+        </p:blipFill>
+        <p:spPr>
+          <a:xfrm>
+            <a:off x="6084168" y="6209005"/>
+            <a:ext cx="2376264" cy="535990"/>
+          </a:xfrm>
+          <a:prstGeom prst="rect">
+            <a:avLst/>
+          </a:prstGeom>
+        </p:spPr>
+      </p:pic>
+    </p:spTree>
+    <p:extLst>
+      <p:ext uri="{BB962C8B-B14F-4D97-AF65-F5344CB8AC3E}">
+        <p14:creationId xmlns:p14="http://schemas.microsoft.com/office/powerpoint/2010/main" val="854690931"/>
+      </p:ext>
+    </p:extLst>
+  </p:cSld>
+  <p:clrMapOvr>
+    <a:masterClrMapping/>
+  </p:clrMapOvr>
+  <p:timing>
+    <p:tnLst>
+      <p:par>
+        <p:cTn id="1" dur="indefinite" restart="never" nodeType="tmRoot"/>
+      </p:par>
+    </p:tnLst>
+  </p:timing>
+</p:sld>
+</file>
+
+<file path=ppt/slides/slide11.xml><?xml version="1.0" encoding="utf-8"?>
 <p:sld xmlns:a="http://schemas.openxmlformats.org/drawingml/2006/main" xmlns:r="http://schemas.openxmlformats.org/officeDocument/2006/relationships" xmlns:p="http://schemas.openxmlformats.org/presentationml/2006/main">
   <p:cSld>
     <p:spTree>
@@ -7716,161 +7844,46 @@
             <a:fld id="{93395105-7618-4763-9D06-A2B4F6609439}" type="slidenum">
               <a:rPr lang="fr-FR" altLang="fr-FR" smtClean="0"/>
               <a:pPr/>
-              <a:t>10</a:t>
+              <a:t>11</a:t>
             </a:fld>
             <a:endParaRPr lang="fr-FR" altLang="fr-FR" dirty="0"/>
           </a:p>
         </p:txBody>
       </p:sp>
+      <p:pic>
+        <p:nvPicPr>
+          <p:cNvPr id="7" name="Image 6"/>
+          <p:cNvPicPr>
+            <a:picLocks noChangeAspect="1"/>
+          </p:cNvPicPr>
+          <p:nvPr/>
+        </p:nvPicPr>
+        <p:blipFill>
+          <a:blip r:embed="rId3" cstate="print">
+            <a:extLst>
+              <a:ext uri="{28A0092B-C50C-407E-A947-70E740481C1C}">
+                <a14:useLocalDpi xmlns:a14="http://schemas.microsoft.com/office/drawing/2010/main" val="0"/>
+              </a:ext>
+            </a:extLst>
+          </a:blip>
+          <a:stretch>
+            <a:fillRect/>
+          </a:stretch>
+        </p:blipFill>
+        <p:spPr>
+          <a:xfrm>
+            <a:off x="6084168" y="6209005"/>
+            <a:ext cx="2376264" cy="535990"/>
+          </a:xfrm>
+          <a:prstGeom prst="rect">
+            <a:avLst/>
+          </a:prstGeom>
+        </p:spPr>
+      </p:pic>
     </p:spTree>
     <p:extLst>
       <p:ext uri="{BB962C8B-B14F-4D97-AF65-F5344CB8AC3E}">
         <p14:creationId xmlns:p14="http://schemas.microsoft.com/office/powerpoint/2010/main" val="2024243597"/>
-      </p:ext>
-    </p:extLst>
-  </p:cSld>
-  <p:clrMapOvr>
-    <a:masterClrMapping/>
-  </p:clrMapOvr>
-  <p:timing>
-    <p:tnLst>
-      <p:par>
-        <p:cTn id="1" dur="indefinite" restart="never" nodeType="tmRoot"/>
-      </p:par>
-    </p:tnLst>
-  </p:timing>
-</p:sld>
-</file>
-
-<file path=ppt/slides/slide11.xml><?xml version="1.0" encoding="utf-8"?>
-<p:sld xmlns:a="http://schemas.openxmlformats.org/drawingml/2006/main" xmlns:r="http://schemas.openxmlformats.org/officeDocument/2006/relationships" xmlns:p="http://schemas.openxmlformats.org/presentationml/2006/main">
-  <p:cSld>
-    <p:spTree>
-      <p:nvGrpSpPr>
-        <p:cNvPr id="1" name=""/>
-        <p:cNvGrpSpPr/>
-        <p:nvPr/>
-      </p:nvGrpSpPr>
-      <p:grpSpPr>
-        <a:xfrm>
-          <a:off x="0" y="0"/>
-          <a:ext cx="0" cy="0"/>
-          <a:chOff x="0" y="0"/>
-          <a:chExt cx="0" cy="0"/>
-        </a:xfrm>
-      </p:grpSpPr>
-      <p:sp>
-        <p:nvSpPr>
-          <p:cNvPr id="2" name="Title 1"/>
-          <p:cNvSpPr>
-            <a:spLocks noGrp="1"/>
-          </p:cNvSpPr>
-          <p:nvPr>
-            <p:ph type="title"/>
-          </p:nvPr>
-        </p:nvSpPr>
-        <p:spPr/>
-        <p:txBody>
-          <a:bodyPr/>
-          <a:lstStyle/>
-          <a:p>
-            <a:r>
-              <a:rPr lang="fr-FR" dirty="0" smtClean="0"/>
-              <a:t>Résultats</a:t>
-            </a:r>
-            <a:endParaRPr lang="fr-FR" dirty="0"/>
-          </a:p>
-        </p:txBody>
-      </p:sp>
-      <p:sp>
-        <p:nvSpPr>
-          <p:cNvPr id="3" name="Content Placeholder 2"/>
-          <p:cNvSpPr>
-            <a:spLocks noGrp="1"/>
-          </p:cNvSpPr>
-          <p:nvPr>
-            <p:ph idx="1"/>
-          </p:nvPr>
-        </p:nvSpPr>
-        <p:spPr>
-          <a:xfrm>
-            <a:off x="457200" y="1981200"/>
-            <a:ext cx="8229600" cy="3464024"/>
-          </a:xfrm>
-        </p:spPr>
-        <p:txBody>
-          <a:bodyPr/>
-          <a:lstStyle/>
-          <a:p>
-            <a:r>
-              <a:rPr lang="fr-FR" dirty="0" smtClean="0"/>
-              <a:t>Schématique finie et presque routée</a:t>
-            </a:r>
-          </a:p>
-          <a:p>
-            <a:r>
-              <a:rPr lang="fr-FR" dirty="0" smtClean="0"/>
-              <a:t>Système </a:t>
-            </a:r>
-            <a:r>
-              <a:rPr lang="fr-FR" dirty="0" err="1" smtClean="0"/>
-              <a:t>bootable</a:t>
-            </a:r>
-            <a:r>
-              <a:rPr lang="fr-FR" dirty="0" smtClean="0"/>
-              <a:t> et chaîne de construction du </a:t>
-            </a:r>
-            <a:r>
-              <a:rPr lang="fr-FR" dirty="0" err="1" smtClean="0"/>
-              <a:t>firmware</a:t>
-            </a:r>
-            <a:endParaRPr lang="fr-FR" dirty="0" smtClean="0"/>
-          </a:p>
-          <a:p>
-            <a:r>
-              <a:rPr lang="fr-FR" dirty="0" smtClean="0"/>
-              <a:t>Poursuite du projet pendant l’été</a:t>
-            </a:r>
-          </a:p>
-          <a:p>
-            <a:endParaRPr lang="fr-FR" dirty="0"/>
-          </a:p>
-          <a:p>
-            <a:pPr marL="0" indent="0">
-              <a:buNone/>
-            </a:pPr>
-            <a:endParaRPr lang="fr-FR" dirty="0"/>
-          </a:p>
-        </p:txBody>
-      </p:sp>
-      <p:sp>
-        <p:nvSpPr>
-          <p:cNvPr id="4" name="Slide Number Placeholder 3"/>
-          <p:cNvSpPr>
-            <a:spLocks noGrp="1"/>
-          </p:cNvSpPr>
-          <p:nvPr>
-            <p:ph type="sldNum" sz="quarter" idx="11"/>
-          </p:nvPr>
-        </p:nvSpPr>
-        <p:spPr/>
-        <p:txBody>
-          <a:bodyPr/>
-          <a:lstStyle/>
-          <a:p>
-            <a:fld id="{93395105-7618-4763-9D06-A2B4F6609439}" type="slidenum">
-              <a:rPr lang="fr-FR" altLang="fr-FR" smtClean="0"/>
-              <a:pPr/>
-              <a:t>11</a:t>
-            </a:fld>
-            <a:endParaRPr lang="fr-FR" altLang="fr-FR" dirty="0"/>
-          </a:p>
-        </p:txBody>
-      </p:sp>
-    </p:spTree>
-    <p:extLst>
-      <p:ext uri="{BB962C8B-B14F-4D97-AF65-F5344CB8AC3E}">
-        <p14:creationId xmlns:p14="http://schemas.microsoft.com/office/powerpoint/2010/main" val="2742570832"/>
       </p:ext>
     </p:extLst>
   </p:cSld>
@@ -7921,7 +7934,7 @@
           <a:p>
             <a:r>
               <a:rPr lang="fr-FR" dirty="0" smtClean="0"/>
-              <a:t>Ce que nous avons appris</a:t>
+              <a:t>Résultats</a:t>
             </a:r>
             <a:endParaRPr lang="fr-FR" dirty="0"/>
           </a:p>
@@ -7940,7 +7953,7 @@
         <p:spPr>
           <a:xfrm>
             <a:off x="457200" y="1981200"/>
-            <a:ext cx="8229600" cy="4112096"/>
+            <a:ext cx="8229600" cy="3464024"/>
           </a:xfrm>
         </p:spPr>
         <p:txBody>
@@ -7949,81 +7962,35 @@
           <a:p>
             <a:r>
               <a:rPr lang="fr-FR" dirty="0" smtClean="0"/>
-              <a:t>Connaissances techniques</a:t>
-            </a:r>
-          </a:p>
-          <a:p>
-            <a:pPr lvl="1"/>
-            <a:r>
-              <a:rPr lang="fr-FR" dirty="0" smtClean="0"/>
-              <a:t>ARM</a:t>
-            </a:r>
-          </a:p>
-          <a:p>
-            <a:pPr lvl="1"/>
-            <a:r>
-              <a:rPr lang="fr-FR" dirty="0" smtClean="0"/>
-              <a:t>Dimensionnement d’alimentations</a:t>
-            </a:r>
-          </a:p>
-          <a:p>
-            <a:pPr lvl="1"/>
-            <a:r>
-              <a:rPr lang="fr-FR" dirty="0" smtClean="0"/>
-              <a:t>Choix des composants (mémoires)</a:t>
-            </a:r>
-          </a:p>
-          <a:p>
-            <a:pPr lvl="1"/>
-            <a:r>
-              <a:rPr lang="fr-FR" dirty="0" smtClean="0"/>
-              <a:t>Eléments d’un système GNU/Linux</a:t>
-            </a:r>
-          </a:p>
-          <a:p>
-            <a:pPr lvl="1"/>
+              <a:t>Schématique finie et presque routée</a:t>
+            </a:r>
+          </a:p>
+          <a:p>
+            <a:r>
+              <a:rPr lang="fr-FR" dirty="0" smtClean="0"/>
+              <a:t>Système </a:t>
+            </a:r>
+            <a:r>
+              <a:rPr lang="fr-FR" dirty="0" err="1" smtClean="0"/>
+              <a:t>bootable</a:t>
+            </a:r>
+            <a:r>
+              <a:rPr lang="fr-FR" dirty="0" smtClean="0"/>
+              <a:t> et chaîne de construction du </a:t>
+            </a:r>
+            <a:r>
+              <a:rPr lang="fr-FR" dirty="0" err="1" smtClean="0"/>
+              <a:t>firmware</a:t>
+            </a:r>
             <a:endParaRPr lang="fr-FR" dirty="0" smtClean="0"/>
           </a:p>
           <a:p>
             <a:r>
               <a:rPr lang="fr-FR" dirty="0" smtClean="0"/>
-              <a:t>Connaissance du workflow</a:t>
-            </a:r>
-          </a:p>
-          <a:p>
-            <a:pPr lvl="1"/>
-            <a:r>
-              <a:rPr lang="fr-FR" dirty="0" smtClean="0"/>
-              <a:t>Couplage </a:t>
-            </a:r>
-            <a:r>
-              <a:rPr lang="fr-FR" dirty="0" err="1" smtClean="0"/>
-              <a:t>Hard</a:t>
-            </a:r>
-            <a:r>
-              <a:rPr lang="fr-FR" dirty="0" err="1" smtClean="0">
-                <a:sym typeface="Wingdings" panose="05000000000000000000" pitchFamily="2" charset="2"/>
-              </a:rPr>
-              <a:t>Soft</a:t>
-            </a:r>
-            <a:r>
-              <a:rPr lang="fr-FR" dirty="0" smtClean="0">
-                <a:sym typeface="Wingdings" panose="05000000000000000000" pitchFamily="2" charset="2"/>
-              </a:rPr>
-              <a:t> à </a:t>
-            </a:r>
-            <a:r>
-              <a:rPr lang="fr-FR" b="1" dirty="0" smtClean="0">
-                <a:sym typeface="Wingdings" panose="05000000000000000000" pitchFamily="2" charset="2"/>
-              </a:rPr>
-              <a:t>TOUTES</a:t>
-            </a:r>
-            <a:r>
-              <a:rPr lang="fr-FR" dirty="0" smtClean="0">
-                <a:sym typeface="Wingdings" panose="05000000000000000000" pitchFamily="2" charset="2"/>
-              </a:rPr>
-              <a:t> les étapes</a:t>
-            </a:r>
+              <a:t>Poursuite du projet pendant l’été</a:t>
+            </a:r>
+          </a:p>
+          <a:p>
             <a:endParaRPr lang="fr-FR" dirty="0"/>
           </a:p>
           <a:p>
@@ -8058,10 +8025,40 @@
           </a:p>
         </p:txBody>
       </p:sp>
+      <p:pic>
+        <p:nvPicPr>
+          <p:cNvPr id="5" name="Image 4"/>
+          <p:cNvPicPr>
+            <a:picLocks noChangeAspect="1"/>
+          </p:cNvPicPr>
+          <p:nvPr/>
+        </p:nvPicPr>
+        <p:blipFill>
+          <a:blip r:embed="rId3" cstate="print">
+            <a:extLst>
+              <a:ext uri="{28A0092B-C50C-407E-A947-70E740481C1C}">
+                <a14:useLocalDpi xmlns:a14="http://schemas.microsoft.com/office/drawing/2010/main" val="0"/>
+              </a:ext>
+            </a:extLst>
+          </a:blip>
+          <a:stretch>
+            <a:fillRect/>
+          </a:stretch>
+        </p:blipFill>
+        <p:spPr>
+          <a:xfrm>
+            <a:off x="6084168" y="6209005"/>
+            <a:ext cx="2376264" cy="535990"/>
+          </a:xfrm>
+          <a:prstGeom prst="rect">
+            <a:avLst/>
+          </a:prstGeom>
+        </p:spPr>
+      </p:pic>
     </p:spTree>
     <p:extLst>
       <p:ext uri="{BB962C8B-B14F-4D97-AF65-F5344CB8AC3E}">
-        <p14:creationId xmlns:p14="http://schemas.microsoft.com/office/powerpoint/2010/main" val="1220433421"/>
+        <p14:creationId xmlns:p14="http://schemas.microsoft.com/office/powerpoint/2010/main" val="2742570832"/>
       </p:ext>
     </p:extLst>
   </p:cSld>
@@ -8110,14 +8107,17 @@
           <a:bodyPr/>
           <a:lstStyle/>
           <a:p>
-            <a:pPr algn="ctr"/>
+            <a:r>
+              <a:rPr lang="fr-FR" dirty="0" smtClean="0"/>
+              <a:t>Ce que nous avons appris</a:t>
+            </a:r>
             <a:endParaRPr lang="fr-FR" dirty="0"/>
           </a:p>
         </p:txBody>
       </p:sp>
       <p:sp>
         <p:nvSpPr>
-          <p:cNvPr id="4" name="Content Placeholder 3"/>
+          <p:cNvPr id="3" name="Content Placeholder 2"/>
           <p:cNvSpPr>
             <a:spLocks noGrp="1"/>
           </p:cNvSpPr>
@@ -8125,25 +8125,106 @@
             <p:ph idx="1"/>
           </p:nvPr>
         </p:nvSpPr>
-        <p:spPr/>
-        <p:txBody>
-          <a:bodyPr anchor="ctr"/>
+        <p:spPr>
+          <a:xfrm>
+            <a:off x="457200" y="1981200"/>
+            <a:ext cx="8229600" cy="4112096"/>
+          </a:xfrm>
+        </p:spPr>
+        <p:txBody>
+          <a:bodyPr/>
           <a:lstStyle/>
           <a:p>
-            <a:pPr marL="0" indent="0" algn="ctr">
+            <a:r>
+              <a:rPr lang="fr-FR" dirty="0" smtClean="0"/>
+              <a:t>Connaissances techniques</a:t>
+            </a:r>
+          </a:p>
+          <a:p>
+            <a:pPr lvl="1"/>
+            <a:r>
+              <a:rPr lang="fr-FR" dirty="0" smtClean="0"/>
+              <a:t>ARM</a:t>
+            </a:r>
+          </a:p>
+          <a:p>
+            <a:pPr lvl="1"/>
+            <a:r>
+              <a:rPr lang="fr-FR" dirty="0" smtClean="0"/>
+              <a:t>Dimensionnement d’alimentations</a:t>
+            </a:r>
+          </a:p>
+          <a:p>
+            <a:pPr lvl="1"/>
+            <a:r>
+              <a:rPr lang="fr-FR" dirty="0" smtClean="0"/>
+              <a:t>Choix des composants (mémoires)</a:t>
+            </a:r>
+          </a:p>
+          <a:p>
+            <a:pPr lvl="1"/>
+            <a:r>
+              <a:rPr lang="fr-FR" dirty="0" smtClean="0"/>
+              <a:t>Eléments d’un système GNU/Linux</a:t>
+            </a:r>
+          </a:p>
+          <a:p>
+            <a:pPr lvl="1"/>
+            <a:endParaRPr lang="fr-FR" dirty="0" smtClean="0"/>
+          </a:p>
+          <a:p>
+            <a:r>
+              <a:rPr lang="fr-FR" dirty="0" smtClean="0"/>
+              <a:t>Connaissance du workflow</a:t>
+            </a:r>
+          </a:p>
+          <a:p>
+            <a:pPr lvl="1"/>
+            <a:r>
+              <a:rPr lang="fr-FR" dirty="0" smtClean="0"/>
+              <a:t>Couplage </a:t>
+            </a:r>
+            <a:r>
+              <a:rPr lang="fr-FR" dirty="0" err="1" smtClean="0"/>
+              <a:t>Hard</a:t>
+            </a:r>
+            <a:r>
+              <a:rPr lang="fr-FR" dirty="0" err="1" smtClean="0">
+                <a:sym typeface="Wingdings" panose="05000000000000000000" pitchFamily="2" charset="2"/>
+              </a:rPr>
+              <a:t>Soft</a:t>
+            </a:r>
+            <a:r>
+              <a:rPr lang="fr-FR" dirty="0" smtClean="0">
+                <a:sym typeface="Wingdings" panose="05000000000000000000" pitchFamily="2" charset="2"/>
+              </a:rPr>
+              <a:t> à </a:t>
+            </a:r>
+            <a:r>
+              <a:rPr lang="fr-FR" b="1" dirty="0" smtClean="0">
+                <a:sym typeface="Wingdings" panose="05000000000000000000" pitchFamily="2" charset="2"/>
+              </a:rPr>
+              <a:t>TOUTES</a:t>
+            </a:r>
+            <a:r>
+              <a:rPr lang="fr-FR" dirty="0" smtClean="0">
+                <a:sym typeface="Wingdings" panose="05000000000000000000" pitchFamily="2" charset="2"/>
+              </a:rPr>
+              <a:t> les étapes</a:t>
+            </a:r>
+            <a:endParaRPr lang="fr-FR" dirty="0"/>
+          </a:p>
+          <a:p>
+            <a:pPr marL="0" indent="0">
               <a:buNone/>
             </a:pPr>
-            <a:r>
-              <a:rPr lang="fr-FR" sz="6600" dirty="0" smtClean="0"/>
-              <a:t>Merci !</a:t>
-            </a:r>
-            <a:endParaRPr lang="fr-FR" sz="6600" dirty="0"/>
-          </a:p>
-        </p:txBody>
-      </p:sp>
-      <p:sp>
-        <p:nvSpPr>
-          <p:cNvPr id="3" name="Slide Number Placeholder 2"/>
+            <a:endParaRPr lang="fr-FR" dirty="0"/>
+          </a:p>
+        </p:txBody>
+      </p:sp>
+      <p:sp>
+        <p:nvSpPr>
+          <p:cNvPr id="4" name="Slide Number Placeholder 3"/>
           <p:cNvSpPr>
             <a:spLocks noGrp="1"/>
           </p:cNvSpPr>
@@ -8165,6 +8246,158 @@
           </a:p>
         </p:txBody>
       </p:sp>
+      <p:pic>
+        <p:nvPicPr>
+          <p:cNvPr id="5" name="Image 4"/>
+          <p:cNvPicPr>
+            <a:picLocks noChangeAspect="1"/>
+          </p:cNvPicPr>
+          <p:nvPr/>
+        </p:nvPicPr>
+        <p:blipFill>
+          <a:blip r:embed="rId3" cstate="print">
+            <a:extLst>
+              <a:ext uri="{28A0092B-C50C-407E-A947-70E740481C1C}">
+                <a14:useLocalDpi xmlns:a14="http://schemas.microsoft.com/office/drawing/2010/main" val="0"/>
+              </a:ext>
+            </a:extLst>
+          </a:blip>
+          <a:stretch>
+            <a:fillRect/>
+          </a:stretch>
+        </p:blipFill>
+        <p:spPr>
+          <a:xfrm>
+            <a:off x="6084168" y="6209005"/>
+            <a:ext cx="2376264" cy="535990"/>
+          </a:xfrm>
+          <a:prstGeom prst="rect">
+            <a:avLst/>
+          </a:prstGeom>
+        </p:spPr>
+      </p:pic>
+    </p:spTree>
+    <p:extLst>
+      <p:ext uri="{BB962C8B-B14F-4D97-AF65-F5344CB8AC3E}">
+        <p14:creationId xmlns:p14="http://schemas.microsoft.com/office/powerpoint/2010/main" val="1220433421"/>
+      </p:ext>
+    </p:extLst>
+  </p:cSld>
+  <p:clrMapOvr>
+    <a:masterClrMapping/>
+  </p:clrMapOvr>
+  <p:timing>
+    <p:tnLst>
+      <p:par>
+        <p:cTn id="1" dur="indefinite" restart="never" nodeType="tmRoot"/>
+      </p:par>
+    </p:tnLst>
+  </p:timing>
+</p:sld>
+</file>
+
+<file path=ppt/slides/slide14.xml><?xml version="1.0" encoding="utf-8"?>
+<p:sld xmlns:a="http://schemas.openxmlformats.org/drawingml/2006/main" xmlns:r="http://schemas.openxmlformats.org/officeDocument/2006/relationships" xmlns:p="http://schemas.openxmlformats.org/presentationml/2006/main">
+  <p:cSld>
+    <p:spTree>
+      <p:nvGrpSpPr>
+        <p:cNvPr id="1" name=""/>
+        <p:cNvGrpSpPr/>
+        <p:nvPr/>
+      </p:nvGrpSpPr>
+      <p:grpSpPr>
+        <a:xfrm>
+          <a:off x="0" y="0"/>
+          <a:ext cx="0" cy="0"/>
+          <a:chOff x="0" y="0"/>
+          <a:chExt cx="0" cy="0"/>
+        </a:xfrm>
+      </p:grpSpPr>
+      <p:sp>
+        <p:nvSpPr>
+          <p:cNvPr id="4" name="Content Placeholder 3"/>
+          <p:cNvSpPr>
+            <a:spLocks noGrp="1"/>
+          </p:cNvSpPr>
+          <p:nvPr>
+            <p:ph idx="1"/>
+          </p:nvPr>
+        </p:nvSpPr>
+        <p:spPr>
+          <a:xfrm>
+            <a:off x="457200" y="620688"/>
+            <a:ext cx="8229600" cy="5246712"/>
+          </a:xfrm>
+        </p:spPr>
+        <p:txBody>
+          <a:bodyPr anchor="ctr"/>
+          <a:lstStyle/>
+          <a:p>
+            <a:pPr marL="0" indent="0" algn="ctr">
+              <a:buNone/>
+            </a:pPr>
+            <a:r>
+              <a:rPr lang="fr-FR" sz="6600" dirty="0" smtClean="0"/>
+              <a:t>Merci !</a:t>
+            </a:r>
+            <a:endParaRPr lang="fr-FR" sz="6600" dirty="0"/>
+          </a:p>
+        </p:txBody>
+      </p:sp>
+      <p:sp>
+        <p:nvSpPr>
+          <p:cNvPr id="3" name="Slide Number Placeholder 2"/>
+          <p:cNvSpPr>
+            <a:spLocks noGrp="1"/>
+          </p:cNvSpPr>
+          <p:nvPr>
+            <p:ph type="sldNum" sz="quarter" idx="11"/>
+          </p:nvPr>
+        </p:nvSpPr>
+        <p:spPr/>
+        <p:txBody>
+          <a:bodyPr/>
+          <a:lstStyle/>
+          <a:p>
+            <a:fld id="{93395105-7618-4763-9D06-A2B4F6609439}" type="slidenum">
+              <a:rPr lang="fr-FR" altLang="fr-FR" smtClean="0"/>
+              <a:pPr/>
+              <a:t>14</a:t>
+            </a:fld>
+            <a:endParaRPr lang="fr-FR" altLang="fr-FR" dirty="0"/>
+          </a:p>
+        </p:txBody>
+      </p:sp>
+      <p:pic>
+        <p:nvPicPr>
+          <p:cNvPr id="5" name="Image 4"/>
+          <p:cNvPicPr>
+            <a:picLocks noChangeAspect="1"/>
+          </p:cNvPicPr>
+          <p:nvPr/>
+        </p:nvPicPr>
+        <p:blipFill>
+          <a:blip r:embed="rId3" cstate="print">
+            <a:extLst>
+              <a:ext uri="{28A0092B-C50C-407E-A947-70E740481C1C}">
+                <a14:useLocalDpi xmlns:a14="http://schemas.microsoft.com/office/drawing/2010/main" val="0"/>
+              </a:ext>
+            </a:extLst>
+          </a:blip>
+          <a:stretch>
+            <a:fillRect/>
+          </a:stretch>
+        </p:blipFill>
+        <p:spPr>
+          <a:xfrm>
+            <a:off x="6084168" y="6209005"/>
+            <a:ext cx="2376264" cy="535990"/>
+          </a:xfrm>
+          <a:prstGeom prst="rect">
+            <a:avLst/>
+          </a:prstGeom>
+        </p:spPr>
+      </p:pic>
     </p:spTree>
     <p:extLst>
       <p:ext uri="{BB962C8B-B14F-4D97-AF65-F5344CB8AC3E}">
@@ -8247,7 +8480,13 @@
           <a:p>
             <a:r>
               <a:rPr lang="fr-FR" dirty="0" smtClean="0"/>
-              <a:t>Objectifs d’autoformation</a:t>
+              <a:t>Contexte</a:t>
+            </a:r>
+          </a:p>
+          <a:p>
+            <a:r>
+              <a:rPr lang="fr-FR" dirty="0" smtClean="0"/>
+              <a:t>Présentation du projet</a:t>
             </a:r>
           </a:p>
           <a:p>
@@ -8294,6 +8533,36 @@
           </a:p>
         </p:txBody>
       </p:sp>
+      <p:pic>
+        <p:nvPicPr>
+          <p:cNvPr id="6" name="Image 5"/>
+          <p:cNvPicPr>
+            <a:picLocks noChangeAspect="1"/>
+          </p:cNvPicPr>
+          <p:nvPr/>
+        </p:nvPicPr>
+        <p:blipFill>
+          <a:blip r:embed="rId2" cstate="print">
+            <a:extLst>
+              <a:ext uri="{28A0092B-C50C-407E-A947-70E740481C1C}">
+                <a14:useLocalDpi xmlns:a14="http://schemas.microsoft.com/office/drawing/2010/main" val="0"/>
+              </a:ext>
+            </a:extLst>
+          </a:blip>
+          <a:stretch>
+            <a:fillRect/>
+          </a:stretch>
+        </p:blipFill>
+        <p:spPr>
+          <a:xfrm>
+            <a:off x="6084168" y="6209005"/>
+            <a:ext cx="2376264" cy="535990"/>
+          </a:xfrm>
+          <a:prstGeom prst="rect">
+            <a:avLst/>
+          </a:prstGeom>
+        </p:spPr>
+      </p:pic>
     </p:spTree>
     <p:extLst>
       <p:ext uri="{BB962C8B-B14F-4D97-AF65-F5344CB8AC3E}">
@@ -8333,7 +8602,7 @@
       </p:grpSpPr>
       <p:sp>
         <p:nvSpPr>
-          <p:cNvPr id="2" name="Title 1"/>
+          <p:cNvPr id="2" name="Titre 1"/>
           <p:cNvSpPr>
             <a:spLocks noGrp="1"/>
           </p:cNvSpPr>
@@ -8348,7 +8617,7 @@
           <a:p>
             <a:r>
               <a:rPr lang="fr-FR" dirty="0" smtClean="0"/>
-              <a:t>Objectifs d’autoformation</a:t>
+              <a:t>Contexte</a:t>
             </a:r>
             <a:endParaRPr lang="fr-FR" dirty="0"/>
           </a:p>
@@ -8356,7 +8625,7 @@
       </p:sp>
       <p:sp>
         <p:nvSpPr>
-          <p:cNvPr id="3" name="Content Placeholder 2"/>
+          <p:cNvPr id="3" name="Espace réservé du contenu 2"/>
           <p:cNvSpPr>
             <a:spLocks noGrp="1"/>
           </p:cNvSpPr>
@@ -8364,81 +8633,43 @@
             <p:ph idx="1"/>
           </p:nvPr>
         </p:nvSpPr>
-        <p:spPr>
-          <a:xfrm>
-            <a:off x="457200" y="2413248"/>
-            <a:ext cx="8229600" cy="2887960"/>
-          </a:xfrm>
-        </p:spPr>
+        <p:spPr/>
         <p:txBody>
           <a:bodyPr/>
           <a:lstStyle/>
           <a:p>
-            <a:pPr lvl="1">
-              <a:lnSpc>
-                <a:spcPct val="150000"/>
-              </a:lnSpc>
-            </a:pPr>
-            <a:r>
-              <a:rPr lang="fr-FR" dirty="0" smtClean="0"/>
-              <a:t>Architecture ARM</a:t>
-            </a:r>
-          </a:p>
-          <a:p>
-            <a:pPr lvl="2">
-              <a:lnSpc>
-                <a:spcPct val="150000"/>
-              </a:lnSpc>
-            </a:pPr>
+            <a:r>
+              <a:rPr lang="fr-FR" dirty="0" smtClean="0"/>
+              <a:t>Projet proposé</a:t>
+            </a:r>
+          </a:p>
+          <a:p>
+            <a:r>
+              <a:rPr lang="fr-FR" dirty="0" smtClean="0"/>
+              <a:t>Réaliser une </a:t>
+            </a:r>
             <a:r>
               <a:rPr lang="fr-FR" dirty="0"/>
-              <a:t> En 2010, ARM était présent dans plus de 95% des smartphones, 10% </a:t>
-            </a:r>
-            <a:r>
-              <a:rPr lang="fr-FR" dirty="0" smtClean="0"/>
-              <a:t>des ordinateurs </a:t>
+              <a:t>carte de développement construite autour d’un </a:t>
+            </a:r>
+            <a:r>
+              <a:rPr lang="fr-FR" b="1" dirty="0" smtClean="0"/>
+              <a:t>ARM Cortex-M4 </a:t>
             </a:r>
             <a:r>
               <a:rPr lang="fr-FR" dirty="0"/>
-              <a:t>portables et 35% des télévisions connectées et set-top </a:t>
-            </a:r>
-            <a:r>
-              <a:rPr lang="fr-FR" dirty="0" smtClean="0"/>
-              <a:t>box</a:t>
-            </a:r>
-          </a:p>
-          <a:p>
-            <a:pPr lvl="2">
-              <a:lnSpc>
-                <a:spcPct val="150000"/>
-              </a:lnSpc>
-            </a:pPr>
-            <a:r>
-              <a:rPr lang="fr-FR" dirty="0" smtClean="0"/>
-              <a:t>En </a:t>
-            </a:r>
-            <a:r>
-              <a:rPr lang="fr-FR" dirty="0"/>
-              <a:t>2014, </a:t>
-            </a:r>
-            <a:r>
-              <a:rPr lang="fr-FR" dirty="0" smtClean="0"/>
-              <a:t>+ de </a:t>
-            </a:r>
-            <a:r>
-              <a:rPr lang="fr-FR" dirty="0"/>
-              <a:t>50 milliards de chipsets à base d’ARM ont été </a:t>
-            </a:r>
-            <a:r>
-              <a:rPr lang="fr-FR" dirty="0" smtClean="0"/>
-              <a:t>produits</a:t>
-            </a:r>
-          </a:p>
-        </p:txBody>
-      </p:sp>
-      <p:sp>
-        <p:nvSpPr>
-          <p:cNvPr id="4" name="Slide Number Placeholder 3"/>
+              <a:t>dans le but d’y utiliser un système </a:t>
+            </a:r>
+            <a:r>
+              <a:rPr lang="fr-FR" b="1" dirty="0"/>
+              <a:t>GNU/Linux</a:t>
+            </a:r>
+          </a:p>
+        </p:txBody>
+      </p:sp>
+      <p:sp>
+        <p:nvSpPr>
+          <p:cNvPr id="4" name="Espace réservé du numéro de diapositive 3"/>
           <p:cNvSpPr>
             <a:spLocks noGrp="1"/>
           </p:cNvSpPr>
@@ -8460,10 +8691,40 @@
           </a:p>
         </p:txBody>
       </p:sp>
+      <p:pic>
+        <p:nvPicPr>
+          <p:cNvPr id="6" name="Image 5"/>
+          <p:cNvPicPr>
+            <a:picLocks noChangeAspect="1"/>
+          </p:cNvPicPr>
+          <p:nvPr/>
+        </p:nvPicPr>
+        <p:blipFill>
+          <a:blip r:embed="rId2" cstate="print">
+            <a:extLst>
+              <a:ext uri="{28A0092B-C50C-407E-A947-70E740481C1C}">
+                <a14:useLocalDpi xmlns:a14="http://schemas.microsoft.com/office/drawing/2010/main" val="0"/>
+              </a:ext>
+            </a:extLst>
+          </a:blip>
+          <a:stretch>
+            <a:fillRect/>
+          </a:stretch>
+        </p:blipFill>
+        <p:spPr>
+          <a:xfrm>
+            <a:off x="6084168" y="6209005"/>
+            <a:ext cx="2376264" cy="535990"/>
+          </a:xfrm>
+          <a:prstGeom prst="rect">
+            <a:avLst/>
+          </a:prstGeom>
+        </p:spPr>
+      </p:pic>
     </p:spTree>
     <p:extLst>
       <p:ext uri="{BB962C8B-B14F-4D97-AF65-F5344CB8AC3E}">
-        <p14:creationId xmlns:p14="http://schemas.microsoft.com/office/powerpoint/2010/main" val="432318626"/>
+        <p14:creationId xmlns:p14="http://schemas.microsoft.com/office/powerpoint/2010/main" val="1855199036"/>
       </p:ext>
     </p:extLst>
   </p:cSld>
@@ -8499,7 +8760,7 @@
       </p:grpSpPr>
       <p:sp>
         <p:nvSpPr>
-          <p:cNvPr id="2" name="Titre 1"/>
+          <p:cNvPr id="2" name="Title 1"/>
           <p:cNvSpPr>
             <a:spLocks noGrp="1"/>
           </p:cNvSpPr>
@@ -8514,14 +8775,14 @@
           <a:p>
             <a:r>
               <a:rPr lang="fr-FR" dirty="0"/>
-              <a:t>Objectifs d’autoformation</a:t>
-            </a:r>
-          </a:p>
-        </p:txBody>
-      </p:sp>
-      <p:sp>
-        <p:nvSpPr>
-          <p:cNvPr id="3" name="Espace réservé du contenu 2"/>
+              <a:t>Présentation du projet</a:t>
+            </a:r>
+          </a:p>
+        </p:txBody>
+      </p:sp>
+      <p:sp>
+        <p:nvSpPr>
+          <p:cNvPr id="3" name="Content Placeholder 2"/>
           <p:cNvSpPr>
             <a:spLocks noGrp="1"/>
           </p:cNvSpPr>
@@ -8529,7 +8790,12 @@
             <p:ph idx="1"/>
           </p:nvPr>
         </p:nvSpPr>
-        <p:spPr/>
+        <p:spPr>
+          <a:xfrm>
+            <a:off x="457200" y="2413248"/>
+            <a:ext cx="8229600" cy="2887960"/>
+          </a:xfrm>
+        </p:spPr>
         <p:txBody>
           <a:bodyPr/>
           <a:lstStyle/>
@@ -8540,42 +8806,69 @@
               </a:lnSpc>
             </a:pPr>
             <a:r>
-              <a:rPr lang="fr-FR" dirty="0"/>
-              <a:t>Linux embarqué</a:t>
-            </a:r>
-          </a:p>
-          <a:p>
-            <a:pPr lvl="1">
+              <a:rPr lang="fr-FR" dirty="0" smtClean="0"/>
+              <a:t>Architecture ARM</a:t>
+            </a:r>
+          </a:p>
+          <a:p>
+            <a:pPr lvl="2">
               <a:lnSpc>
                 <a:spcPct val="150000"/>
               </a:lnSpc>
             </a:pPr>
             <a:r>
+              <a:rPr lang="fr-FR" dirty="0" smtClean="0"/>
+              <a:t> </a:t>
+            </a:r>
+            <a:r>
               <a:rPr lang="fr-FR" dirty="0"/>
-              <a:t>Développement d’une carte</a:t>
-            </a:r>
-          </a:p>
-          <a:p>
-            <a:pPr lvl="1">
+              <a:t>En 2010, ARM était présent dans plus de 95% des smartphones, 10% </a:t>
+            </a:r>
+            <a:r>
+              <a:rPr lang="fr-FR" dirty="0" smtClean="0"/>
+              <a:t>des ordinateurs </a:t>
+            </a:r>
+            <a:r>
+              <a:rPr lang="fr-FR" dirty="0"/>
+              <a:t>portables et 35% des télévisions connectées et set-top </a:t>
+            </a:r>
+            <a:r>
+              <a:rPr lang="fr-FR" dirty="0" smtClean="0"/>
+              <a:t>box</a:t>
+            </a:r>
+          </a:p>
+          <a:p>
+            <a:pPr lvl="2">
               <a:lnSpc>
                 <a:spcPct val="150000"/>
               </a:lnSpc>
             </a:pPr>
             <a:r>
+              <a:rPr lang="fr-FR" dirty="0" smtClean="0"/>
+              <a:t>En </a:t>
+            </a:r>
+            <a:r>
               <a:rPr lang="fr-FR" dirty="0"/>
-              <a:t>Travail d’équipe </a:t>
-            </a:r>
-            <a:r>
-              <a:rPr lang="fr-FR" dirty="0" smtClean="0"/>
-              <a:t>multidisciplinaire</a:t>
-            </a:r>
-            <a:endParaRPr lang="fr-FR" dirty="0"/>
-          </a:p>
-        </p:txBody>
-      </p:sp>
-      <p:sp>
-        <p:nvSpPr>
-          <p:cNvPr id="4" name="Espace réservé du numéro de diapositive 3"/>
+              <a:t>2014, </a:t>
+            </a:r>
+            <a:r>
+              <a:rPr lang="fr-FR" dirty="0" smtClean="0"/>
+              <a:t>+ de </a:t>
+            </a:r>
+            <a:r>
+              <a:rPr lang="fr-FR" dirty="0"/>
+              <a:t>50 milliards de chipsets à base d’ARM ont été </a:t>
+            </a:r>
+            <a:r>
+              <a:rPr lang="fr-FR" dirty="0" smtClean="0"/>
+              <a:t>produits</a:t>
+            </a:r>
+          </a:p>
+        </p:txBody>
+      </p:sp>
+      <p:sp>
+        <p:nvSpPr>
+          <p:cNvPr id="4" name="Slide Number Placeholder 3"/>
           <p:cNvSpPr>
             <a:spLocks noGrp="1"/>
           </p:cNvSpPr>
@@ -8597,16 +8890,161 @@
           </a:p>
         </p:txBody>
       </p:sp>
+      <p:sp>
+        <p:nvSpPr>
+          <p:cNvPr id="5" name="AutoShape 2" descr="ARM corporate logo - limited use"/>
+          <p:cNvSpPr>
+            <a:spLocks noChangeAspect="1" noChangeArrowheads="1"/>
+          </p:cNvSpPr>
+          <p:nvPr/>
+        </p:nvSpPr>
+        <p:spPr bwMode="auto">
+          <a:xfrm>
+            <a:off x="155575" y="-144463"/>
+            <a:ext cx="304800" cy="304801"/>
+          </a:xfrm>
+          <a:prstGeom prst="rect">
+            <a:avLst/>
+          </a:prstGeom>
+          <a:noFill/>
+          <a:extLst>
+            <a:ext uri="{909E8E84-426E-40DD-AFC4-6F175D3DCCD1}">
+              <a14:hiddenFill xmlns:a14="http://schemas.microsoft.com/office/drawing/2010/main">
+                <a:solidFill>
+                  <a:srgbClr val="FFFFFF"/>
+                </a:solidFill>
+              </a14:hiddenFill>
+            </a:ext>
+          </a:extLst>
+        </p:spPr>
+        <p:txBody>
+          <a:bodyPr vert="horz" wrap="square" lIns="91440" tIns="45720" rIns="91440" bIns="45720" numCol="1" anchor="t" anchorCtr="0" compatLnSpc="1">
+            <a:prstTxWarp prst="textNoShape">
+              <a:avLst/>
+            </a:prstTxWarp>
+          </a:bodyPr>
+          <a:lstStyle/>
+          <a:p>
+            <a:endParaRPr lang="fr-FR"/>
+          </a:p>
+        </p:txBody>
+      </p:sp>
+      <p:sp>
+        <p:nvSpPr>
+          <p:cNvPr id="6" name="AutoShape 4" descr="ARM corporate logo - limited use"/>
+          <p:cNvSpPr>
+            <a:spLocks noChangeAspect="1" noChangeArrowheads="1"/>
+          </p:cNvSpPr>
+          <p:nvPr/>
+        </p:nvSpPr>
+        <p:spPr bwMode="auto">
+          <a:xfrm>
+            <a:off x="63500" y="-136525"/>
+            <a:ext cx="304800" cy="304800"/>
+          </a:xfrm>
+          <a:prstGeom prst="rect">
+            <a:avLst/>
+          </a:prstGeom>
+          <a:noFill/>
+          <a:extLst>
+            <a:ext uri="{909E8E84-426E-40DD-AFC4-6F175D3DCCD1}">
+              <a14:hiddenFill xmlns:a14="http://schemas.microsoft.com/office/drawing/2010/main">
+                <a:solidFill>
+                  <a:srgbClr val="FFFFFF"/>
+                </a:solidFill>
+              </a14:hiddenFill>
+            </a:ext>
+          </a:extLst>
+        </p:spPr>
+        <p:txBody>
+          <a:bodyPr vert="horz" wrap="square" lIns="91440" tIns="45720" rIns="91440" bIns="45720" numCol="1" anchor="t" anchorCtr="0" compatLnSpc="1">
+            <a:prstTxWarp prst="textNoShape">
+              <a:avLst/>
+            </a:prstTxWarp>
+          </a:bodyPr>
+          <a:lstStyle/>
+          <a:p>
+            <a:endParaRPr lang="fr-FR"/>
+          </a:p>
+        </p:txBody>
+      </p:sp>
+      <p:pic>
+        <p:nvPicPr>
+          <p:cNvPr id="7" name="Image 6"/>
+          <p:cNvPicPr>
+            <a:picLocks noChangeAspect="1"/>
+          </p:cNvPicPr>
+          <p:nvPr/>
+        </p:nvPicPr>
+        <p:blipFill>
+          <a:blip r:embed="rId3">
+            <a:extLst>
+              <a:ext uri="{28A0092B-C50C-407E-A947-70E740481C1C}">
+                <a14:useLocalDpi xmlns:a14="http://schemas.microsoft.com/office/drawing/2010/main" val="0"/>
+              </a:ext>
+            </a:extLst>
+          </a:blip>
+          <a:stretch>
+            <a:fillRect/>
+          </a:stretch>
+        </p:blipFill>
+        <p:spPr>
+          <a:xfrm>
+            <a:off x="3143250" y="1466056"/>
+            <a:ext cx="2857500" cy="1181100"/>
+          </a:xfrm>
+          <a:prstGeom prst="rect">
+            <a:avLst/>
+          </a:prstGeom>
+        </p:spPr>
+      </p:pic>
+      <p:pic>
+        <p:nvPicPr>
+          <p:cNvPr id="9" name="Image 8"/>
+          <p:cNvPicPr>
+            <a:picLocks noChangeAspect="1"/>
+          </p:cNvPicPr>
+          <p:nvPr/>
+        </p:nvPicPr>
+        <p:blipFill>
+          <a:blip r:embed="rId4" cstate="print">
+            <a:extLst>
+              <a:ext uri="{28A0092B-C50C-407E-A947-70E740481C1C}">
+                <a14:useLocalDpi xmlns:a14="http://schemas.microsoft.com/office/drawing/2010/main" val="0"/>
+              </a:ext>
+            </a:extLst>
+          </a:blip>
+          <a:stretch>
+            <a:fillRect/>
+          </a:stretch>
+        </p:blipFill>
+        <p:spPr>
+          <a:xfrm>
+            <a:off x="6084168" y="6209005"/>
+            <a:ext cx="2376264" cy="535990"/>
+          </a:xfrm>
+          <a:prstGeom prst="rect">
+            <a:avLst/>
+          </a:prstGeom>
+        </p:spPr>
+      </p:pic>
     </p:spTree>
     <p:extLst>
       <p:ext uri="{BB962C8B-B14F-4D97-AF65-F5344CB8AC3E}">
-        <p14:creationId xmlns:p14="http://schemas.microsoft.com/office/powerpoint/2010/main" val="316674389"/>
+        <p14:creationId xmlns:p14="http://schemas.microsoft.com/office/powerpoint/2010/main" val="432318626"/>
       </p:ext>
     </p:extLst>
   </p:cSld>
   <p:clrMapOvr>
     <a:masterClrMapping/>
   </p:clrMapOvr>
+  <p:timing>
+    <p:tnLst>
+      <p:par>
+        <p:cTn id="1" dur="indefinite" restart="never" nodeType="tmRoot"/>
+      </p:par>
+    </p:tnLst>
+  </p:timing>
 </p:sld>
 </file>
 
@@ -8629,7 +9067,7 @@
       </p:grpSpPr>
       <p:sp>
         <p:nvSpPr>
-          <p:cNvPr id="2" name="Title 1"/>
+          <p:cNvPr id="2" name="Titre 1"/>
           <p:cNvSpPr>
             <a:spLocks noGrp="1"/>
           </p:cNvSpPr>
@@ -8643,19 +9081,20 @@
           <a:lstStyle/>
           <a:p>
             <a:r>
-              <a:rPr lang="fr-FR" dirty="0" smtClean="0"/>
-              <a:t>Démarche de développement</a:t>
-            </a:r>
-            <a:br>
-              <a:rPr lang="fr-FR" dirty="0" smtClean="0"/>
-            </a:br>
+              <a:rPr lang="fr-FR" dirty="0"/>
+              <a:t>Présentation du </a:t>
+            </a:r>
+            <a:r>
+              <a:rPr lang="fr-FR" dirty="0" smtClean="0"/>
+              <a:t>projet</a:t>
+            </a:r>
             <a:endParaRPr lang="fr-FR" dirty="0"/>
           </a:p>
         </p:txBody>
       </p:sp>
       <p:sp>
         <p:nvSpPr>
-          <p:cNvPr id="3" name="Content Placeholder 2"/>
+          <p:cNvPr id="3" name="Espace réservé du contenu 2"/>
           <p:cNvSpPr>
             <a:spLocks noGrp="1"/>
           </p:cNvSpPr>
@@ -8668,43 +9107,48 @@
           <a:bodyPr/>
           <a:lstStyle/>
           <a:p>
-            <a:r>
-              <a:rPr lang="fr-FR" dirty="0" smtClean="0"/>
-              <a:t>Cahier des Charges</a:t>
-            </a:r>
-          </a:p>
-          <a:p>
-            <a:pPr lvl="1"/>
-            <a:r>
-              <a:rPr lang="fr-FR" dirty="0" smtClean="0"/>
-              <a:t>Portage du noyau Linux/uClinux </a:t>
-            </a:r>
-          </a:p>
-          <a:p>
-            <a:pPr lvl="1"/>
-            <a:r>
-              <a:rPr lang="fr-FR" dirty="0" smtClean="0"/>
-              <a:t>Carte réalisable (moyens financiers, connaissances, temps de travail)</a:t>
-            </a:r>
-          </a:p>
-          <a:p>
-            <a:pPr lvl="1"/>
-            <a:r>
-              <a:rPr lang="fr-FR" dirty="0" smtClean="0"/>
-              <a:t>Périphériques IHM et M2M</a:t>
-            </a:r>
-          </a:p>
-          <a:p>
-            <a:pPr marL="457200" lvl="1" indent="0">
-              <a:buNone/>
+            <a:pPr lvl="1">
+              <a:lnSpc>
+                <a:spcPct val="150000"/>
+              </a:lnSpc>
             </a:pPr>
+            <a:r>
+              <a:rPr lang="fr-FR" dirty="0"/>
+              <a:t>Linux embarqué</a:t>
+            </a:r>
+          </a:p>
+          <a:p>
+            <a:pPr lvl="1">
+              <a:lnSpc>
+                <a:spcPct val="150000"/>
+              </a:lnSpc>
+            </a:pPr>
+            <a:r>
+              <a:rPr lang="fr-FR" dirty="0"/>
+              <a:t>Développement d’une carte</a:t>
+            </a:r>
+          </a:p>
+          <a:p>
+            <a:pPr lvl="1">
+              <a:lnSpc>
+                <a:spcPct val="150000"/>
+              </a:lnSpc>
+            </a:pPr>
+            <a:r>
+              <a:rPr lang="fr-FR" dirty="0"/>
+              <a:t>Travail d’équipe </a:t>
+            </a:r>
+            <a:r>
+              <a:rPr lang="fr-FR" dirty="0" smtClean="0"/>
+              <a:t>multidisciplinaire</a:t>
+            </a:r>
             <a:endParaRPr lang="fr-FR" dirty="0"/>
           </a:p>
         </p:txBody>
       </p:sp>
       <p:sp>
         <p:nvSpPr>
-          <p:cNvPr id="4" name="Slide Number Placeholder 3"/>
+          <p:cNvPr id="4" name="Espace réservé du numéro de diapositive 3"/>
           <p:cNvSpPr>
             <a:spLocks noGrp="1"/>
           </p:cNvSpPr>
@@ -8726,10 +9170,40 @@
           </a:p>
         </p:txBody>
       </p:sp>
+      <p:pic>
+        <p:nvPicPr>
+          <p:cNvPr id="6" name="Image 5"/>
+          <p:cNvPicPr>
+            <a:picLocks noChangeAspect="1"/>
+          </p:cNvPicPr>
+          <p:nvPr/>
+        </p:nvPicPr>
+        <p:blipFill>
+          <a:blip r:embed="rId3" cstate="print">
+            <a:extLst>
+              <a:ext uri="{28A0092B-C50C-407E-A947-70E740481C1C}">
+                <a14:useLocalDpi xmlns:a14="http://schemas.microsoft.com/office/drawing/2010/main" val="0"/>
+              </a:ext>
+            </a:extLst>
+          </a:blip>
+          <a:stretch>
+            <a:fillRect/>
+          </a:stretch>
+        </p:blipFill>
+        <p:spPr>
+          <a:xfrm>
+            <a:off x="6084168" y="6209005"/>
+            <a:ext cx="2376264" cy="535990"/>
+          </a:xfrm>
+          <a:prstGeom prst="rect">
+            <a:avLst/>
+          </a:prstGeom>
+        </p:spPr>
+      </p:pic>
     </p:spTree>
     <p:extLst>
       <p:ext uri="{BB962C8B-B14F-4D97-AF65-F5344CB8AC3E}">
-        <p14:creationId xmlns:p14="http://schemas.microsoft.com/office/powerpoint/2010/main" val="3338568253"/>
+        <p14:creationId xmlns:p14="http://schemas.microsoft.com/office/powerpoint/2010/main" val="316674389"/>
       </p:ext>
     </p:extLst>
   </p:cSld>
@@ -8799,96 +9273,36 @@
             <p:ph idx="1"/>
           </p:nvPr>
         </p:nvSpPr>
-        <p:spPr>
-          <a:xfrm>
-            <a:off x="467544" y="1556792"/>
-            <a:ext cx="8229600" cy="4968552"/>
-          </a:xfrm>
-        </p:spPr>
+        <p:spPr/>
         <p:txBody>
           <a:bodyPr/>
           <a:lstStyle/>
           <a:p>
             <a:r>
               <a:rPr lang="fr-FR" dirty="0" smtClean="0"/>
-              <a:t>Choix techniques</a:t>
+              <a:t>Cahier des Charges</a:t>
             </a:r>
           </a:p>
           <a:p>
             <a:pPr lvl="1"/>
             <a:r>
               <a:rPr lang="fr-FR" dirty="0" smtClean="0"/>
-              <a:t>Alimentations</a:t>
+              <a:t>Portage du noyau Linux/uClinux </a:t>
             </a:r>
           </a:p>
           <a:p>
             <a:pPr lvl="1"/>
             <a:r>
               <a:rPr lang="fr-FR" dirty="0" smtClean="0"/>
-              <a:t>Microcontrôleur (prix de la carte et difficulté de mise en œuvre/</a:t>
-            </a:r>
-            <a:r>
-              <a:rPr lang="fr-FR" dirty="0" err="1" smtClean="0"/>
-              <a:t>debug</a:t>
-            </a:r>
-            <a:r>
-              <a:rPr lang="fr-FR" dirty="0" smtClean="0"/>
-              <a:t>)</a:t>
+              <a:t>Carte réalisable (moyens financiers, connaissances, temps de travail)</a:t>
             </a:r>
           </a:p>
           <a:p>
             <a:pPr lvl="1"/>
             <a:r>
               <a:rPr lang="fr-FR" dirty="0" smtClean="0"/>
-              <a:t>NOR: 32Mo, </a:t>
-            </a:r>
-            <a:r>
-              <a:rPr lang="fr-FR" dirty="0" err="1" smtClean="0"/>
-              <a:t>eXecute</a:t>
-            </a:r>
-            <a:r>
-              <a:rPr lang="fr-FR" dirty="0" smtClean="0"/>
-              <a:t> In Place</a:t>
-            </a:r>
-          </a:p>
-          <a:p>
-            <a:pPr lvl="1"/>
-            <a:r>
-              <a:rPr lang="fr-FR" dirty="0" smtClean="0"/>
-              <a:t>SDRAM: 32Mo</a:t>
-            </a:r>
-          </a:p>
-          <a:p>
-            <a:pPr lvl="1"/>
-            <a:r>
-              <a:rPr lang="fr-FR" dirty="0" smtClean="0"/>
-              <a:t>LCD</a:t>
-            </a:r>
-          </a:p>
-          <a:p>
-            <a:pPr lvl="1"/>
-            <a:r>
-              <a:rPr lang="fr-FR" dirty="0" smtClean="0"/>
-              <a:t>USB</a:t>
-            </a:r>
-          </a:p>
-          <a:p>
-            <a:pPr lvl="1"/>
-            <a:r>
-              <a:rPr lang="fr-FR" dirty="0" smtClean="0"/>
-              <a:t>UART</a:t>
-            </a:r>
-          </a:p>
-          <a:p>
-            <a:pPr lvl="1"/>
-            <a:r>
-              <a:rPr lang="fr-FR" dirty="0" smtClean="0"/>
-              <a:t>GPIO</a:t>
-            </a:r>
-          </a:p>
-          <a:p>
-            <a:pPr lvl="1"/>
-            <a:endParaRPr lang="fr-FR" dirty="0" smtClean="0"/>
+              <a:t>Périphériques IHM et M2M</a:t>
+            </a:r>
           </a:p>
           <a:p>
             <a:pPr marL="457200" lvl="1" indent="0">
@@ -8922,10 +9336,70 @@
           </a:p>
         </p:txBody>
       </p:sp>
+      <p:pic>
+        <p:nvPicPr>
+          <p:cNvPr id="5" name="Image 4"/>
+          <p:cNvPicPr>
+            <a:picLocks noChangeAspect="1"/>
+          </p:cNvPicPr>
+          <p:nvPr/>
+        </p:nvPicPr>
+        <p:blipFill>
+          <a:blip r:embed="rId3">
+            <a:extLst>
+              <a:ext uri="{28A0092B-C50C-407E-A947-70E740481C1C}">
+                <a14:useLocalDpi xmlns:a14="http://schemas.microsoft.com/office/drawing/2010/main" val="0"/>
+              </a:ext>
+            </a:extLst>
+          </a:blip>
+          <a:stretch>
+            <a:fillRect/>
+          </a:stretch>
+        </p:blipFill>
+        <p:spPr>
+          <a:xfrm>
+            <a:off x="6781800" y="2420888"/>
+            <a:ext cx="1905000" cy="2209800"/>
+          </a:xfrm>
+          <a:prstGeom prst="rect">
+            <a:avLst/>
+          </a:prstGeom>
+        </p:spPr>
+      </p:pic>
+      <p:pic>
+        <p:nvPicPr>
+          <p:cNvPr id="7" name="Image 6"/>
+          <p:cNvPicPr>
+            <a:picLocks noChangeAspect="1"/>
+          </p:cNvPicPr>
+          <p:nvPr/>
+        </p:nvPicPr>
+        <p:blipFill>
+          <a:blip r:embed="rId4" cstate="print">
+            <a:extLst>
+              <a:ext uri="{28A0092B-C50C-407E-A947-70E740481C1C}">
+                <a14:useLocalDpi xmlns:a14="http://schemas.microsoft.com/office/drawing/2010/main" val="0"/>
+              </a:ext>
+            </a:extLst>
+          </a:blip>
+          <a:stretch>
+            <a:fillRect/>
+          </a:stretch>
+        </p:blipFill>
+        <p:spPr>
+          <a:xfrm>
+            <a:off x="6084168" y="6209005"/>
+            <a:ext cx="2376264" cy="535990"/>
+          </a:xfrm>
+          <a:prstGeom prst="rect">
+            <a:avLst/>
+          </a:prstGeom>
+        </p:spPr>
+      </p:pic>
     </p:spTree>
     <p:extLst>
       <p:ext uri="{BB962C8B-B14F-4D97-AF65-F5344CB8AC3E}">
-        <p14:creationId xmlns:p14="http://schemas.microsoft.com/office/powerpoint/2010/main" val="1747106552"/>
+        <p14:creationId xmlns:p14="http://schemas.microsoft.com/office/powerpoint/2010/main" val="3338568253"/>
       </p:ext>
     </p:extLst>
   </p:cSld>
@@ -8997,8 +9471,8 @@
         </p:nvSpPr>
         <p:spPr>
           <a:xfrm>
-            <a:off x="467544" y="1412776"/>
-            <a:ext cx="8229600" cy="4328120"/>
+            <a:off x="467544" y="1556792"/>
+            <a:ext cx="8229600" cy="4968552"/>
           </a:xfrm>
         </p:spPr>
         <p:txBody>
@@ -9007,95 +9481,90 @@
           <a:p>
             <a:r>
               <a:rPr lang="fr-FR" dirty="0" smtClean="0"/>
-              <a:t>Choix des composants</a:t>
+              <a:t>Choix techniques</a:t>
             </a:r>
           </a:p>
           <a:p>
             <a:pPr lvl="1"/>
             <a:r>
               <a:rPr lang="fr-FR" dirty="0" smtClean="0"/>
-              <a:t>SMT32F429ZI</a:t>
+              <a:t>Alimentations</a:t>
             </a:r>
           </a:p>
           <a:p>
             <a:pPr lvl="1"/>
             <a:r>
               <a:rPr lang="fr-FR" dirty="0" smtClean="0"/>
-              <a:t>NOR</a:t>
-            </a:r>
-            <a:r>
-              <a:rPr lang="fr-FR" dirty="0"/>
-              <a:t>: </a:t>
-            </a:r>
-            <a:r>
-              <a:rPr lang="fr-FR" dirty="0" err="1"/>
-              <a:t>Spansion</a:t>
-            </a:r>
-            <a:r>
-              <a:rPr lang="fr-FR" dirty="0"/>
-              <a:t> </a:t>
-            </a:r>
-            <a:r>
-              <a:rPr lang="fr-FR" dirty="0" smtClean="0"/>
-              <a:t>S29GL256P90TFIR20 (32Mo)</a:t>
+              <a:t>Microcontrôleur (prix de la carte et difficulté de mise en œuvre/</a:t>
+            </a:r>
+            <a:r>
+              <a:rPr lang="fr-FR" dirty="0" err="1" smtClean="0"/>
+              <a:t>debug</a:t>
+            </a:r>
+            <a:r>
+              <a:rPr lang="fr-FR" dirty="0" smtClean="0"/>
+              <a:t>)</a:t>
             </a:r>
           </a:p>
           <a:p>
             <a:pPr lvl="1"/>
             <a:r>
               <a:rPr lang="fr-FR" dirty="0" smtClean="0"/>
-              <a:t>SDRAM</a:t>
-            </a:r>
-            <a:r>
-              <a:rPr lang="fr-FR" dirty="0"/>
-              <a:t>: Micron </a:t>
-            </a:r>
-            <a:r>
-              <a:rPr lang="fr-FR" dirty="0" smtClean="0"/>
-              <a:t>MT48LC32M8A2P7E (32Mo)</a:t>
+              <a:t>NOR: 32Mo, </a:t>
+            </a:r>
+            <a:r>
+              <a:rPr lang="fr-FR" dirty="0" err="1" smtClean="0"/>
+              <a:t>eXecute</a:t>
+            </a:r>
+            <a:r>
+              <a:rPr lang="fr-FR" dirty="0" smtClean="0"/>
+              <a:t> In Place</a:t>
             </a:r>
           </a:p>
           <a:p>
             <a:pPr lvl="1"/>
             <a:r>
               <a:rPr lang="fr-FR" dirty="0" smtClean="0"/>
-              <a:t>LCD: écran New </a:t>
-            </a:r>
-            <a:r>
-              <a:rPr lang="fr-FR" dirty="0" err="1" smtClean="0"/>
-              <a:t>Haven</a:t>
-            </a:r>
-            <a:r>
-              <a:rPr lang="fr-FR" dirty="0" smtClean="0"/>
-              <a:t> Display récupéré avec driver </a:t>
-            </a:r>
-            <a:r>
-              <a:rPr lang="fr-FR" dirty="0" err="1" smtClean="0"/>
-              <a:t>Orise</a:t>
-            </a:r>
+              <a:t>SDRAM: 32Mo</a:t>
+            </a:r>
+          </a:p>
+          <a:p>
+            <a:pPr lvl="1"/>
+            <a:r>
+              <a:rPr lang="fr-FR" dirty="0" smtClean="0"/>
+              <a:t>LCD</a:t>
+            </a:r>
+          </a:p>
+          <a:p>
+            <a:pPr lvl="1"/>
+            <a:r>
+              <a:rPr lang="fr-FR" dirty="0" smtClean="0"/>
+              <a:t>USB</a:t>
+            </a:r>
+          </a:p>
+          <a:p>
+            <a:pPr lvl="1"/>
+            <a:r>
+              <a:rPr lang="fr-FR" dirty="0" smtClean="0"/>
+              <a:t>UART</a:t>
+            </a:r>
+          </a:p>
+          <a:p>
+            <a:pPr lvl="1"/>
+            <a:r>
+              <a:rPr lang="fr-FR" dirty="0" smtClean="0"/>
+              <a:t>GPIO</a:t>
+            </a:r>
+          </a:p>
+          <a:p>
+            <a:pPr lvl="1"/>
             <a:endParaRPr lang="fr-FR" dirty="0" smtClean="0"/>
           </a:p>
           <a:p>
-            <a:pPr lvl="1"/>
-            <a:r>
-              <a:rPr lang="fr-FR" dirty="0" smtClean="0"/>
-              <a:t>USB: PHY intégré au STM32F429</a:t>
-            </a:r>
-          </a:p>
-          <a:p>
-            <a:pPr lvl="1"/>
-            <a:r>
-              <a:rPr lang="fr-FR" dirty="0" smtClean="0"/>
-              <a:t>Alimentations: Buck (3,3V) et </a:t>
-            </a:r>
-            <a:r>
-              <a:rPr lang="fr-FR" dirty="0" err="1" smtClean="0"/>
-              <a:t>Boost</a:t>
-            </a:r>
-            <a:r>
-              <a:rPr lang="fr-FR" dirty="0" smtClean="0"/>
-              <a:t> (21V) TI</a:t>
-            </a:r>
+            <a:pPr marL="457200" lvl="1" indent="0">
+              <a:buNone/>
+            </a:pPr>
+            <a:endParaRPr lang="fr-FR" dirty="0"/>
           </a:p>
         </p:txBody>
       </p:sp>
@@ -9123,6 +9592,297 @@
           </a:p>
         </p:txBody>
       </p:sp>
+      <p:pic>
+        <p:nvPicPr>
+          <p:cNvPr id="5" name="Image 4"/>
+          <p:cNvPicPr>
+            <a:picLocks noChangeAspect="1"/>
+          </p:cNvPicPr>
+          <p:nvPr/>
+        </p:nvPicPr>
+        <p:blipFill>
+          <a:blip r:embed="rId3" cstate="print">
+            <a:extLst>
+              <a:ext uri="{28A0092B-C50C-407E-A947-70E740481C1C}">
+                <a14:useLocalDpi xmlns:a14="http://schemas.microsoft.com/office/drawing/2010/main" val="0"/>
+              </a:ext>
+            </a:extLst>
+          </a:blip>
+          <a:stretch>
+            <a:fillRect/>
+          </a:stretch>
+        </p:blipFill>
+        <p:spPr>
+          <a:xfrm>
+            <a:off x="6084168" y="6209005"/>
+            <a:ext cx="2376264" cy="535990"/>
+          </a:xfrm>
+          <a:prstGeom prst="rect">
+            <a:avLst/>
+          </a:prstGeom>
+        </p:spPr>
+      </p:pic>
+    </p:spTree>
+    <p:extLst>
+      <p:ext uri="{BB962C8B-B14F-4D97-AF65-F5344CB8AC3E}">
+        <p14:creationId xmlns:p14="http://schemas.microsoft.com/office/powerpoint/2010/main" val="1747106552"/>
+      </p:ext>
+    </p:extLst>
+  </p:cSld>
+  <p:clrMapOvr>
+    <a:masterClrMapping/>
+  </p:clrMapOvr>
+  <p:timing>
+    <p:tnLst>
+      <p:par>
+        <p:cTn id="1" dur="indefinite" restart="never" nodeType="tmRoot"/>
+      </p:par>
+    </p:tnLst>
+  </p:timing>
+</p:sld>
+</file>
+
+<file path=ppt/slides/slide8.xml><?xml version="1.0" encoding="utf-8"?>
+<p:sld xmlns:a="http://schemas.openxmlformats.org/drawingml/2006/main" xmlns:r="http://schemas.openxmlformats.org/officeDocument/2006/relationships" xmlns:p="http://schemas.openxmlformats.org/presentationml/2006/main">
+  <p:cSld>
+    <p:spTree>
+      <p:nvGrpSpPr>
+        <p:cNvPr id="1" name=""/>
+        <p:cNvGrpSpPr/>
+        <p:nvPr/>
+      </p:nvGrpSpPr>
+      <p:grpSpPr>
+        <a:xfrm>
+          <a:off x="0" y="0"/>
+          <a:ext cx="0" cy="0"/>
+          <a:chOff x="0" y="0"/>
+          <a:chExt cx="0" cy="0"/>
+        </a:xfrm>
+      </p:grpSpPr>
+      <p:sp>
+        <p:nvSpPr>
+          <p:cNvPr id="2" name="Title 1"/>
+          <p:cNvSpPr>
+            <a:spLocks noGrp="1"/>
+          </p:cNvSpPr>
+          <p:nvPr>
+            <p:ph type="title"/>
+          </p:nvPr>
+        </p:nvSpPr>
+        <p:spPr/>
+        <p:txBody>
+          <a:bodyPr/>
+          <a:lstStyle/>
+          <a:p>
+            <a:r>
+              <a:rPr lang="fr-FR" dirty="0" smtClean="0"/>
+              <a:t>Démarche de développement</a:t>
+            </a:r>
+            <a:br>
+              <a:rPr lang="fr-FR" dirty="0" smtClean="0"/>
+            </a:br>
+            <a:endParaRPr lang="fr-FR" dirty="0"/>
+          </a:p>
+        </p:txBody>
+      </p:sp>
+      <p:sp>
+        <p:nvSpPr>
+          <p:cNvPr id="3" name="Content Placeholder 2"/>
+          <p:cNvSpPr>
+            <a:spLocks noGrp="1"/>
+          </p:cNvSpPr>
+          <p:nvPr>
+            <p:ph idx="1"/>
+          </p:nvPr>
+        </p:nvSpPr>
+        <p:spPr>
+          <a:xfrm>
+            <a:off x="467544" y="1412776"/>
+            <a:ext cx="8229600" cy="4328120"/>
+          </a:xfrm>
+        </p:spPr>
+        <p:txBody>
+          <a:bodyPr/>
+          <a:lstStyle/>
+          <a:p>
+            <a:r>
+              <a:rPr lang="fr-FR" dirty="0" smtClean="0"/>
+              <a:t>Choix des composants</a:t>
+            </a:r>
+          </a:p>
+          <a:p>
+            <a:pPr lvl="1"/>
+            <a:r>
+              <a:rPr lang="fr-FR" dirty="0" smtClean="0"/>
+              <a:t>STM32F429ZI</a:t>
+            </a:r>
+          </a:p>
+          <a:p>
+            <a:pPr lvl="1"/>
+            <a:r>
+              <a:rPr lang="fr-FR" dirty="0" smtClean="0"/>
+              <a:t>NOR</a:t>
+            </a:r>
+            <a:r>
+              <a:rPr lang="fr-FR" dirty="0"/>
+              <a:t>: </a:t>
+            </a:r>
+            <a:r>
+              <a:rPr lang="fr-FR" dirty="0" err="1"/>
+              <a:t>Spansion</a:t>
+            </a:r>
+            <a:r>
+              <a:rPr lang="fr-FR" dirty="0"/>
+              <a:t> </a:t>
+            </a:r>
+            <a:r>
+              <a:rPr lang="fr-FR" dirty="0" smtClean="0"/>
+              <a:t>S29GL256P90TFIR20 (32Mo)</a:t>
+            </a:r>
+          </a:p>
+          <a:p>
+            <a:pPr lvl="1"/>
+            <a:r>
+              <a:rPr lang="fr-FR" dirty="0" smtClean="0"/>
+              <a:t>SDRAM</a:t>
+            </a:r>
+            <a:r>
+              <a:rPr lang="fr-FR" dirty="0"/>
+              <a:t>: Micron </a:t>
+            </a:r>
+            <a:r>
+              <a:rPr lang="fr-FR" dirty="0" smtClean="0"/>
+              <a:t>MT48LC32M8A2P7E (32Mo)</a:t>
+            </a:r>
+          </a:p>
+          <a:p>
+            <a:pPr lvl="1"/>
+            <a:r>
+              <a:rPr lang="fr-FR" dirty="0" smtClean="0"/>
+              <a:t>LCD: écran New </a:t>
+            </a:r>
+            <a:r>
+              <a:rPr lang="fr-FR" dirty="0" err="1" smtClean="0"/>
+              <a:t>Haven</a:t>
+            </a:r>
+            <a:r>
+              <a:rPr lang="fr-FR" dirty="0" smtClean="0"/>
+              <a:t> Display récupéré avec driver </a:t>
+            </a:r>
+            <a:r>
+              <a:rPr lang="fr-FR" dirty="0" err="1" smtClean="0"/>
+              <a:t>Orise</a:t>
+            </a:r>
+            <a:endParaRPr lang="fr-FR" dirty="0" smtClean="0"/>
+          </a:p>
+          <a:p>
+            <a:pPr lvl="1"/>
+            <a:r>
+              <a:rPr lang="fr-FR" dirty="0" smtClean="0"/>
+              <a:t>USB: PHY intégré au STM32F429</a:t>
+            </a:r>
+          </a:p>
+          <a:p>
+            <a:pPr lvl="1"/>
+            <a:r>
+              <a:rPr lang="fr-FR" dirty="0" smtClean="0"/>
+              <a:t>Alimentations: Buck (3,3V) et </a:t>
+            </a:r>
+            <a:r>
+              <a:rPr lang="fr-FR" dirty="0" err="1" smtClean="0"/>
+              <a:t>Boost</a:t>
+            </a:r>
+            <a:r>
+              <a:rPr lang="fr-FR" dirty="0" smtClean="0"/>
+              <a:t> (21V) TI</a:t>
+            </a:r>
+          </a:p>
+        </p:txBody>
+      </p:sp>
+      <p:sp>
+        <p:nvSpPr>
+          <p:cNvPr id="4" name="Slide Number Placeholder 3"/>
+          <p:cNvSpPr>
+            <a:spLocks noGrp="1"/>
+          </p:cNvSpPr>
+          <p:nvPr>
+            <p:ph type="sldNum" sz="quarter" idx="11"/>
+          </p:nvPr>
+        </p:nvSpPr>
+        <p:spPr/>
+        <p:txBody>
+          <a:bodyPr/>
+          <a:lstStyle/>
+          <a:p>
+            <a:fld id="{93395105-7618-4763-9D06-A2B4F6609439}" type="slidenum">
+              <a:rPr lang="fr-FR" altLang="fr-FR" smtClean="0"/>
+              <a:pPr/>
+              <a:t>8</a:t>
+            </a:fld>
+            <a:endParaRPr lang="fr-FR" altLang="fr-FR" dirty="0"/>
+          </a:p>
+        </p:txBody>
+      </p:sp>
+      <p:pic>
+        <p:nvPicPr>
+          <p:cNvPr id="5" name="Image 4"/>
+          <p:cNvPicPr>
+            <a:picLocks noChangeAspect="1"/>
+          </p:cNvPicPr>
+          <p:nvPr/>
+        </p:nvPicPr>
+        <p:blipFill>
+          <a:blip r:embed="rId3" cstate="print">
+            <a:extLst>
+              <a:ext uri="{28A0092B-C50C-407E-A947-70E740481C1C}">
+                <a14:useLocalDpi xmlns:a14="http://schemas.microsoft.com/office/drawing/2010/main" val="0"/>
+              </a:ext>
+            </a:extLst>
+          </a:blip>
+          <a:stretch>
+            <a:fillRect/>
+          </a:stretch>
+        </p:blipFill>
+        <p:spPr>
+          <a:xfrm>
+            <a:off x="6228184" y="1828800"/>
+            <a:ext cx="2232248" cy="697578"/>
+          </a:xfrm>
+          <a:prstGeom prst="rect">
+            <a:avLst/>
+          </a:prstGeom>
+        </p:spPr>
+      </p:pic>
+      <p:pic>
+        <p:nvPicPr>
+          <p:cNvPr id="6" name="Image 5"/>
+          <p:cNvPicPr>
+            <a:picLocks noChangeAspect="1"/>
+          </p:cNvPicPr>
+          <p:nvPr/>
+        </p:nvPicPr>
+        <p:blipFill>
+          <a:blip r:embed="rId4" cstate="print">
+            <a:extLst>
+              <a:ext uri="{28A0092B-C50C-407E-A947-70E740481C1C}">
+                <a14:useLocalDpi xmlns:a14="http://schemas.microsoft.com/office/drawing/2010/main" val="0"/>
+              </a:ext>
+            </a:extLst>
+          </a:blip>
+          <a:stretch>
+            <a:fillRect/>
+          </a:stretch>
+        </p:blipFill>
+        <p:spPr>
+          <a:xfrm>
+            <a:off x="6084168" y="6209005"/>
+            <a:ext cx="2376264" cy="535990"/>
+          </a:xfrm>
+          <a:prstGeom prst="rect">
+            <a:avLst/>
+          </a:prstGeom>
+        </p:spPr>
+      </p:pic>
     </p:spTree>
     <p:extLst>
       <p:ext uri="{BB962C8B-B14F-4D97-AF65-F5344CB8AC3E}">
@@ -9143,7 +9903,7 @@
 </p:sld>
 </file>
 
-<file path=ppt/slides/slide8.xml><?xml version="1.0" encoding="utf-8"?>
+<file path=ppt/slides/slide9.xml><?xml version="1.0" encoding="utf-8"?>
 <p:sld xmlns:a="http://schemas.openxmlformats.org/drawingml/2006/main" xmlns:r="http://schemas.openxmlformats.org/officeDocument/2006/relationships" xmlns:p="http://schemas.openxmlformats.org/presentationml/2006/main">
   <p:cSld>
     <p:spTree>
@@ -9480,26 +10240,26 @@
               <a:buNone/>
             </a:pPr>
             <a:r>
-              <a:rPr lang="fr-FR" b="1" kern="0" dirty="0" smtClean="0"/>
+              <a:rPr lang="fr-FR" sz="2800" b="1" kern="0" dirty="0" smtClean="0"/>
               <a:t>Aller retour </a:t>
             </a:r>
             <a:r>
-              <a:rPr lang="fr-FR" b="1" kern="0" dirty="0" err="1" smtClean="0"/>
+              <a:rPr lang="fr-FR" sz="2800" b="1" kern="0" dirty="0" err="1" smtClean="0"/>
               <a:t>Hard</a:t>
             </a:r>
             <a:r>
-              <a:rPr lang="fr-FR" b="1" kern="0" dirty="0" err="1" smtClean="0">
+              <a:rPr lang="fr-FR" sz="2800" b="1" kern="0" dirty="0" err="1" smtClean="0">
                 <a:sym typeface="Wingdings" panose="05000000000000000000" pitchFamily="2" charset="2"/>
               </a:rPr>
               <a:t>Soft</a:t>
             </a:r>
             <a:r>
-              <a:rPr lang="fr-FR" b="1" kern="0" dirty="0" smtClean="0">
+              <a:rPr lang="fr-FR" sz="2800" b="1" kern="0" dirty="0" smtClean="0">
                 <a:sym typeface="Wingdings" panose="05000000000000000000" pitchFamily="2" charset="2"/>
               </a:rPr>
               <a:t> nécessaires</a:t>
             </a:r>
-            <a:endParaRPr lang="fr-FR" b="1" kern="0" dirty="0"/>
+            <a:endParaRPr lang="fr-FR" sz="2800" b="1" kern="0" dirty="0"/>
           </a:p>
         </p:txBody>
       </p:sp>
@@ -9521,7 +10281,7 @@
             <a:fld id="{93395105-7618-4763-9D06-A2B4F6609439}" type="slidenum">
               <a:rPr lang="fr-FR" altLang="fr-FR" smtClean="0"/>
               <a:pPr/>
-              <a:t>8</a:t>
+              <a:t>9</a:t>
             </a:fld>
             <a:endParaRPr lang="fr-FR" altLang="fr-FR" dirty="0"/>
           </a:p>
@@ -9549,8 +10309,194 @@
         </p:blipFill>
         <p:spPr>
           <a:xfrm>
-            <a:off x="2350156" y="3914946"/>
-            <a:ext cx="4443687" cy="2790654"/>
+            <a:off x="2350157" y="3845386"/>
+            <a:ext cx="4209717" cy="2643720"/>
+          </a:xfrm>
+          <a:prstGeom prst="rect">
+            <a:avLst/>
+          </a:prstGeom>
+        </p:spPr>
+      </p:pic>
+      <p:cxnSp>
+        <p:nvCxnSpPr>
+          <p:cNvPr id="10" name="Connecteur droit avec flèche 9"/>
+          <p:cNvCxnSpPr/>
+          <p:nvPr/>
+        </p:nvCxnSpPr>
+        <p:spPr bwMode="auto">
+          <a:xfrm>
+            <a:off x="2123728" y="3861048"/>
+            <a:ext cx="0" cy="2574630"/>
+          </a:xfrm>
+          <a:prstGeom prst="straightConnector1">
+            <a:avLst/>
+          </a:prstGeom>
+          <a:solidFill>
+            <a:schemeClr val="accent1"/>
+          </a:solidFill>
+          <a:ln w="9525" cap="flat" cmpd="sng" algn="ctr">
+            <a:solidFill>
+              <a:schemeClr val="tx1"/>
+            </a:solidFill>
+            <a:prstDash val="solid"/>
+            <a:round/>
+            <a:headEnd type="triangle"/>
+            <a:tailEnd type="triangle"/>
+          </a:ln>
+          <a:effectLst/>
+          <a:extLst>
+            <a:ext uri="{AF507438-7753-43E0-B8FC-AC1667EBCBE1}">
+              <a14:hiddenEffects xmlns:a14="http://schemas.microsoft.com/office/drawing/2010/main">
+                <a:effectLst>
+                  <a:outerShdw dist="35921" dir="2700000" algn="ctr" rotWithShape="0">
+                    <a:schemeClr val="bg2"/>
+                  </a:outerShdw>
+                </a:effectLst>
+              </a14:hiddenEffects>
+            </a:ext>
+          </a:extLst>
+        </p:spPr>
+      </p:cxnSp>
+      <p:cxnSp>
+        <p:nvCxnSpPr>
+          <p:cNvPr id="13" name="Connecteur droit avec flèche 12"/>
+          <p:cNvCxnSpPr/>
+          <p:nvPr/>
+        </p:nvCxnSpPr>
+        <p:spPr bwMode="auto">
+          <a:xfrm flipH="1">
+            <a:off x="2332646" y="6597352"/>
+            <a:ext cx="4255578" cy="0"/>
+          </a:xfrm>
+          <a:prstGeom prst="straightConnector1">
+            <a:avLst/>
+          </a:prstGeom>
+          <a:solidFill>
+            <a:schemeClr val="accent1"/>
+          </a:solidFill>
+          <a:ln w="9525" cap="flat" cmpd="sng" algn="ctr">
+            <a:solidFill>
+              <a:schemeClr val="tx1"/>
+            </a:solidFill>
+            <a:prstDash val="solid"/>
+            <a:round/>
+            <a:headEnd type="triangle"/>
+            <a:tailEnd type="triangle"/>
+          </a:ln>
+          <a:effectLst/>
+          <a:extLst>
+            <a:ext uri="{AF507438-7753-43E0-B8FC-AC1667EBCBE1}">
+              <a14:hiddenEffects xmlns:a14="http://schemas.microsoft.com/office/drawing/2010/main">
+                <a:effectLst>
+                  <a:outerShdw dist="35921" dir="2700000" algn="ctr" rotWithShape="0">
+                    <a:schemeClr val="bg2"/>
+                  </a:outerShdw>
+                </a:effectLst>
+              </a14:hiddenEffects>
+            </a:ext>
+          </a:extLst>
+        </p:spPr>
+      </p:cxnSp>
+      <p:sp>
+        <p:nvSpPr>
+          <p:cNvPr id="19" name="ZoneTexte 18"/>
+          <p:cNvSpPr txBox="1"/>
+          <p:nvPr/>
+        </p:nvSpPr>
+        <p:spPr>
+          <a:xfrm>
+            <a:off x="4127006" y="6531307"/>
+            <a:ext cx="889987" cy="369332"/>
+          </a:xfrm>
+          <a:prstGeom prst="rect">
+            <a:avLst/>
+          </a:prstGeom>
+          <a:noFill/>
+        </p:spPr>
+        <p:txBody>
+          <a:bodyPr wrap="none" rtlCol="0">
+            <a:spAutoFit/>
+          </a:bodyPr>
+          <a:lstStyle/>
+          <a:p>
+            <a:r>
+              <a:rPr lang="fr-FR" dirty="0" smtClean="0">
+                <a:solidFill>
+                  <a:srgbClr val="FF0000"/>
+                </a:solidFill>
+              </a:rPr>
+              <a:t>70 mm</a:t>
+            </a:r>
+            <a:endParaRPr lang="fr-FR" dirty="0">
+              <a:solidFill>
+                <a:srgbClr val="FF0000"/>
+              </a:solidFill>
+            </a:endParaRPr>
+          </a:p>
+        </p:txBody>
+      </p:sp>
+      <p:sp>
+        <p:nvSpPr>
+          <p:cNvPr id="21" name="ZoneTexte 20"/>
+          <p:cNvSpPr txBox="1"/>
+          <p:nvPr/>
+        </p:nvSpPr>
+        <p:spPr>
+          <a:xfrm>
+            <a:off x="1233741" y="4982580"/>
+            <a:ext cx="889987" cy="369332"/>
+          </a:xfrm>
+          <a:prstGeom prst="rect">
+            <a:avLst/>
+          </a:prstGeom>
+          <a:noFill/>
+        </p:spPr>
+        <p:txBody>
+          <a:bodyPr wrap="none" rtlCol="0">
+            <a:spAutoFit/>
+          </a:bodyPr>
+          <a:lstStyle/>
+          <a:p>
+            <a:r>
+              <a:rPr lang="fr-FR" dirty="0" smtClean="0">
+                <a:solidFill>
+                  <a:srgbClr val="FF0000"/>
+                </a:solidFill>
+              </a:rPr>
+              <a:t>43 mm</a:t>
+            </a:r>
+            <a:endParaRPr lang="fr-FR" dirty="0">
+              <a:solidFill>
+                <a:srgbClr val="FF0000"/>
+              </a:solidFill>
+            </a:endParaRPr>
+          </a:p>
+        </p:txBody>
+      </p:sp>
+      <p:pic>
+        <p:nvPicPr>
+          <p:cNvPr id="22" name="Image 21"/>
+          <p:cNvPicPr>
+            <a:picLocks noChangeAspect="1"/>
+          </p:cNvPicPr>
+          <p:nvPr/>
+        </p:nvPicPr>
+        <p:blipFill>
+          <a:blip r:embed="rId4" cstate="print">
+            <a:extLst>
+              <a:ext uri="{28A0092B-C50C-407E-A947-70E740481C1C}">
+                <a14:useLocalDpi xmlns:a14="http://schemas.microsoft.com/office/drawing/2010/main" val="0"/>
+              </a:ext>
+            </a:extLst>
+          </a:blip>
+          <a:stretch>
+            <a:fillRect/>
+          </a:stretch>
+        </p:blipFill>
+        <p:spPr>
+          <a:xfrm>
+            <a:off x="6811352" y="6373029"/>
+            <a:ext cx="1649079" cy="371966"/>
           </a:xfrm>
           <a:prstGeom prst="rect">
             <a:avLst/>
@@ -9561,173 +10507,6 @@
     <p:extLst>
       <p:ext uri="{BB962C8B-B14F-4D97-AF65-F5344CB8AC3E}">
         <p14:creationId xmlns:p14="http://schemas.microsoft.com/office/powerpoint/2010/main" val="2403331861"/>
-      </p:ext>
-    </p:extLst>
-  </p:cSld>
-  <p:clrMapOvr>
-    <a:masterClrMapping/>
-  </p:clrMapOvr>
-  <p:timing>
-    <p:tnLst>
-      <p:par>
-        <p:cTn id="1" dur="indefinite" restart="never" nodeType="tmRoot"/>
-      </p:par>
-    </p:tnLst>
-  </p:timing>
-</p:sld>
-</file>
-
-<file path=ppt/slides/slide9.xml><?xml version="1.0" encoding="utf-8"?>
-<p:sld xmlns:a="http://schemas.openxmlformats.org/drawingml/2006/main" xmlns:r="http://schemas.openxmlformats.org/officeDocument/2006/relationships" xmlns:p="http://schemas.openxmlformats.org/presentationml/2006/main">
-  <p:cSld>
-    <p:spTree>
-      <p:nvGrpSpPr>
-        <p:cNvPr id="1" name=""/>
-        <p:cNvGrpSpPr/>
-        <p:nvPr/>
-      </p:nvGrpSpPr>
-      <p:grpSpPr>
-        <a:xfrm>
-          <a:off x="0" y="0"/>
-          <a:ext cx="0" cy="0"/>
-          <a:chOff x="0" y="0"/>
-          <a:chExt cx="0" cy="0"/>
-        </a:xfrm>
-      </p:grpSpPr>
-      <p:sp>
-        <p:nvSpPr>
-          <p:cNvPr id="2" name="Title 1"/>
-          <p:cNvSpPr>
-            <a:spLocks noGrp="1"/>
-          </p:cNvSpPr>
-          <p:nvPr>
-            <p:ph type="title"/>
-          </p:nvPr>
-        </p:nvSpPr>
-        <p:spPr/>
-        <p:txBody>
-          <a:bodyPr/>
-          <a:lstStyle/>
-          <a:p>
-            <a:r>
-              <a:rPr lang="fr-FR" dirty="0" smtClean="0"/>
-              <a:t>Démarche de développement</a:t>
-            </a:r>
-            <a:br>
-              <a:rPr lang="fr-FR" dirty="0" smtClean="0"/>
-            </a:br>
-            <a:endParaRPr lang="fr-FR" dirty="0"/>
-          </a:p>
-        </p:txBody>
-      </p:sp>
-      <p:sp>
-        <p:nvSpPr>
-          <p:cNvPr id="3" name="Content Placeholder 2"/>
-          <p:cNvSpPr>
-            <a:spLocks noGrp="1"/>
-          </p:cNvSpPr>
-          <p:nvPr>
-            <p:ph idx="1"/>
-          </p:nvPr>
-        </p:nvSpPr>
-        <p:spPr>
-          <a:xfrm>
-            <a:off x="457200" y="1981200"/>
-            <a:ext cx="8229600" cy="2239888"/>
-          </a:xfrm>
-        </p:spPr>
-        <p:txBody>
-          <a:bodyPr/>
-          <a:lstStyle/>
-          <a:p>
-            <a:r>
-              <a:rPr lang="fr-FR" dirty="0" smtClean="0"/>
-              <a:t>Tests</a:t>
-            </a:r>
-          </a:p>
-          <a:p>
-            <a:pPr lvl="1"/>
-            <a:r>
-              <a:rPr lang="fr-FR" dirty="0" smtClean="0"/>
-              <a:t>Hard: alimentations, court-circuits</a:t>
-            </a:r>
-          </a:p>
-          <a:p>
-            <a:pPr lvl="1"/>
-            <a:r>
-              <a:rPr lang="fr-FR" dirty="0" smtClean="0"/>
-              <a:t>Soft: </a:t>
-            </a:r>
-          </a:p>
-          <a:p>
-            <a:pPr lvl="2"/>
-            <a:r>
-              <a:rPr lang="fr-FR" dirty="0" smtClean="0"/>
-              <a:t>Mémoires (U-Boot, </a:t>
-            </a:r>
-            <a:r>
-              <a:rPr lang="fr-FR" dirty="0" err="1" smtClean="0"/>
-              <a:t>OpenOCD</a:t>
-            </a:r>
-            <a:r>
-              <a:rPr lang="fr-FR" dirty="0" smtClean="0"/>
-              <a:t>)</a:t>
-            </a:r>
-          </a:p>
-          <a:p>
-            <a:pPr lvl="2"/>
-            <a:r>
-              <a:rPr lang="fr-FR" dirty="0" err="1" smtClean="0"/>
-              <a:t>Debug</a:t>
-            </a:r>
-            <a:r>
-              <a:rPr lang="fr-FR" dirty="0"/>
-              <a:t> </a:t>
-            </a:r>
-            <a:r>
-              <a:rPr lang="fr-FR" dirty="0" smtClean="0"/>
-              <a:t>(GDB et </a:t>
-            </a:r>
-            <a:r>
-              <a:rPr lang="fr-FR" dirty="0" err="1" smtClean="0"/>
-              <a:t>OpenOCD</a:t>
-            </a:r>
-            <a:r>
-              <a:rPr lang="fr-FR" dirty="0" smtClean="0"/>
-              <a:t>)</a:t>
-            </a:r>
-            <a:endParaRPr lang="fr-FR" dirty="0"/>
-          </a:p>
-        </p:txBody>
-      </p:sp>
-      <p:sp>
-        <p:nvSpPr>
-          <p:cNvPr id="4" name="Slide Number Placeholder 3"/>
-          <p:cNvSpPr>
-            <a:spLocks noGrp="1"/>
-          </p:cNvSpPr>
-          <p:nvPr>
-            <p:ph type="sldNum" sz="quarter" idx="11"/>
-          </p:nvPr>
-        </p:nvSpPr>
-        <p:spPr/>
-        <p:txBody>
-          <a:bodyPr/>
-          <a:lstStyle/>
-          <a:p>
-            <a:fld id="{93395105-7618-4763-9D06-A2B4F6609439}" type="slidenum">
-              <a:rPr lang="fr-FR" altLang="fr-FR" smtClean="0"/>
-              <a:pPr/>
-              <a:t>9</a:t>
-            </a:fld>
-            <a:endParaRPr lang="fr-FR" altLang="fr-FR" dirty="0"/>
-          </a:p>
-        </p:txBody>
-      </p:sp>
-    </p:spTree>
-    <p:extLst>
-      <p:ext uri="{BB962C8B-B14F-4D97-AF65-F5344CB8AC3E}">
-        <p14:creationId xmlns:p14="http://schemas.microsoft.com/office/powerpoint/2010/main" val="854690931"/>
       </p:ext>
     </p:extLst>
   </p:cSld>

</xml_diff>